<commit_message>
Add week 3 module
</commit_message>
<xml_diff>
--- a/modules/week03/slides-03.pptx
+++ b/modules/week03/slides-03.pptx
@@ -9,18 +9,18 @@
     <p:notesMasterId r:id="rId15"/>
   </p:notesMasterIdLst>
   <p:sldIdLst>
-    <p:sldId id="256" r:id="rId3"/>
-    <p:sldId id="257" r:id="rId4"/>
-    <p:sldId id="262" r:id="rId5"/>
-    <p:sldId id="263" r:id="rId6"/>
-    <p:sldId id="302" r:id="rId7"/>
-    <p:sldId id="264" r:id="rId8"/>
-    <p:sldId id="261" r:id="rId9"/>
-    <p:sldId id="299" r:id="rId10"/>
-    <p:sldId id="300" r:id="rId11"/>
-    <p:sldId id="303" r:id="rId12"/>
-    <p:sldId id="301" r:id="rId13"/>
-    <p:sldId id="304" r:id="rId14"/>
+    <p:sldId id="305" r:id="rId3"/>
+    <p:sldId id="256" r:id="rId4"/>
+    <p:sldId id="257" r:id="rId5"/>
+    <p:sldId id="262" r:id="rId6"/>
+    <p:sldId id="306" r:id="rId7"/>
+    <p:sldId id="263" r:id="rId8"/>
+    <p:sldId id="302" r:id="rId9"/>
+    <p:sldId id="264" r:id="rId10"/>
+    <p:sldId id="261" r:id="rId11"/>
+    <p:sldId id="299" r:id="rId12"/>
+    <p:sldId id="300" r:id="rId13"/>
+    <p:sldId id="303" r:id="rId14"/>
   </p:sldIdLst>
   <p:sldSz cx="9144000" cy="5143500" type="screen16x9"/>
   <p:notesSz cx="6858000" cy="9144000"/>
@@ -36,29 +36,22 @@
       <p:italic r:id="rId19"/>
     </p:embeddedFont>
     <p:embeddedFont>
-      <p:font typeface="Calibri" panose="020F0502020204030204" pitchFamily="34" charset="0"/>
+      <p:font typeface="Century Gothic" panose="020B0502020202020204" pitchFamily="34" charset="0"/>
       <p:regular r:id="rId20"/>
       <p:bold r:id="rId21"/>
       <p:italic r:id="rId22"/>
       <p:boldItalic r:id="rId23"/>
     </p:embeddedFont>
     <p:embeddedFont>
-      <p:font typeface="Century Gothic" panose="020B0502020202020204" pitchFamily="34" charset="0"/>
+      <p:font typeface="Lobster" pitchFamily="2" charset="77"/>
       <p:regular r:id="rId24"/>
-      <p:bold r:id="rId25"/>
-      <p:italic r:id="rId26"/>
-      <p:boldItalic r:id="rId27"/>
-    </p:embeddedFont>
-    <p:embeddedFont>
-      <p:font typeface="Lobster" pitchFamily="2" charset="77"/>
-      <p:regular r:id="rId28"/>
     </p:embeddedFont>
     <p:embeddedFont>
       <p:font typeface="Nunito Sans" pitchFamily="2" charset="77"/>
-      <p:regular r:id="rId29"/>
-      <p:bold r:id="rId30"/>
-      <p:italic r:id="rId31"/>
-      <p:boldItalic r:id="rId32"/>
+      <p:regular r:id="rId25"/>
+      <p:bold r:id="rId26"/>
+      <p:italic r:id="rId27"/>
+      <p:boldItalic r:id="rId28"/>
     </p:embeddedFont>
   </p:embeddedFontLst>
   <p:defaultTextStyle>
@@ -15465,7 +15458,7 @@
   <p:cSld>
     <p:spTree>
       <p:nvGrpSpPr>
-        <p:cNvPr id="1" name="Shape 137"/>
+        <p:cNvPr id="1" name=""/>
         <p:cNvGrpSpPr/>
         <p:nvPr/>
       </p:nvGrpSpPr>
@@ -15477,382 +15470,42 @@
           <a:chExt cx="0" cy="0"/>
         </a:xfrm>
       </p:grpSpPr>
-      <p:sp>
-        <p:nvSpPr>
-          <p:cNvPr id="138" name="Google Shape;138;p27"/>
-          <p:cNvSpPr txBox="1">
-            <a:spLocks noGrp="1"/>
-          </p:cNvSpPr>
-          <p:nvPr>
-            <p:ph type="ctrTitle"/>
-          </p:nvPr>
-        </p:nvSpPr>
+      <p:pic>
+        <p:nvPicPr>
+          <p:cNvPr id="5" name="Picture 4" descr="A graph with lines on it&#10;&#10;Description automatically generated">
+            <a:extLst>
+              <a:ext uri="{FF2B5EF4-FFF2-40B4-BE49-F238E27FC236}">
+                <a16:creationId xmlns:a16="http://schemas.microsoft.com/office/drawing/2014/main" id="{85DE8DA2-008B-B696-2906-590548B9AD72}"/>
+              </a:ext>
+            </a:extLst>
+          </p:cNvPr>
+          <p:cNvPicPr>
+            <a:picLocks noChangeAspect="1"/>
+          </p:cNvPicPr>
+          <p:nvPr/>
+        </p:nvPicPr>
+        <p:blipFill>
+          <a:blip r:embed="rId2"/>
+          <a:stretch>
+            <a:fillRect/>
+          </a:stretch>
+        </p:blipFill>
         <p:spPr>
           <a:xfrm>
-            <a:off x="1801300" y="1805666"/>
-            <a:ext cx="5822400" cy="669384"/>
+            <a:off x="1560457" y="598890"/>
+            <a:ext cx="6023085" cy="4270290"/>
           </a:xfrm>
           <a:prstGeom prst="rect">
             <a:avLst/>
           </a:prstGeom>
         </p:spPr>
-        <p:txBody>
-          <a:bodyPr spcFirstLastPara="1" wrap="square" lIns="68575" tIns="34275" rIns="68575" bIns="34275" anchor="b" anchorCtr="0">
-            <a:spAutoFit/>
-          </a:bodyPr>
-          <a:lstStyle/>
-          <a:p>
-            <a:pPr marL="0" lvl="0" indent="0" algn="l" rtl="0">
-              <a:lnSpc>
-                <a:spcPct val="100000"/>
-              </a:lnSpc>
-              <a:spcBef>
-                <a:spcPts val="0"/>
-              </a:spcBef>
-              <a:spcAft>
-                <a:spcPts val="0"/>
-              </a:spcAft>
-              <a:buNone/>
-            </a:pPr>
-            <a:r>
-              <a:rPr lang="en" sz="3900" dirty="0">
-                <a:solidFill>
-                  <a:srgbClr val="FCFCFC"/>
-                </a:solidFill>
-              </a:rPr>
-              <a:t>SQLite and SQL</a:t>
-            </a:r>
-            <a:endParaRPr sz="3900" dirty="0">
-              <a:solidFill>
-                <a:srgbClr val="FCFCFC"/>
-              </a:solidFill>
-            </a:endParaRPr>
-          </a:p>
-        </p:txBody>
-      </p:sp>
-      <p:sp>
-        <p:nvSpPr>
-          <p:cNvPr id="139" name="Google Shape;139;p27"/>
-          <p:cNvSpPr txBox="1"/>
-          <p:nvPr/>
-        </p:nvSpPr>
-        <p:spPr>
-          <a:xfrm>
-            <a:off x="1819925" y="499050"/>
-            <a:ext cx="7116900" cy="384900"/>
-          </a:xfrm>
-          <a:prstGeom prst="rect">
-            <a:avLst/>
-          </a:prstGeom>
-          <a:noFill/>
-          <a:ln>
-            <a:noFill/>
-          </a:ln>
-        </p:spPr>
-        <p:txBody>
-          <a:bodyPr spcFirstLastPara="1" wrap="square" lIns="91425" tIns="91425" rIns="91425" bIns="91425" anchor="t" anchorCtr="0">
-            <a:spAutoFit/>
-          </a:bodyPr>
-          <a:lstStyle/>
-          <a:p>
-            <a:pPr marL="0" lvl="0" indent="0" algn="l" rtl="0">
-              <a:spcBef>
-                <a:spcPts val="0"/>
-              </a:spcBef>
-              <a:spcAft>
-                <a:spcPts val="0"/>
-              </a:spcAft>
-              <a:buNone/>
-            </a:pPr>
-            <a:endParaRPr sz="1300" i="1">
-              <a:solidFill>
-                <a:srgbClr val="F1C232"/>
-              </a:solidFill>
-              <a:latin typeface="Lobster"/>
-              <a:ea typeface="Lobster"/>
-              <a:cs typeface="Lobster"/>
-              <a:sym typeface="Lobster"/>
-            </a:endParaRPr>
-          </a:p>
-        </p:txBody>
-      </p:sp>
-      <p:sp>
-        <p:nvSpPr>
-          <p:cNvPr id="140" name="Google Shape;140;p27"/>
-          <p:cNvSpPr txBox="1"/>
-          <p:nvPr/>
-        </p:nvSpPr>
-        <p:spPr>
-          <a:xfrm>
-            <a:off x="4289450" y="3754650"/>
-            <a:ext cx="4469100" cy="936000"/>
-          </a:xfrm>
-          <a:prstGeom prst="rect">
-            <a:avLst/>
-          </a:prstGeom>
-          <a:noFill/>
-          <a:ln>
-            <a:noFill/>
-          </a:ln>
-        </p:spPr>
-        <p:txBody>
-          <a:bodyPr spcFirstLastPara="1" wrap="square" lIns="64000" tIns="36575" rIns="64000" bIns="36575" anchor="t" anchorCtr="0">
-            <a:spAutoFit/>
-          </a:bodyPr>
-          <a:lstStyle/>
-          <a:p>
-            <a:pPr marL="0" lvl="0" indent="0" algn="l" rtl="0">
-              <a:spcBef>
-                <a:spcPts val="0"/>
-              </a:spcBef>
-              <a:spcAft>
-                <a:spcPts val="0"/>
-              </a:spcAft>
-              <a:buNone/>
-            </a:pPr>
-            <a:r>
-              <a:rPr lang="en-US" sz="1700" dirty="0">
-                <a:solidFill>
-                  <a:srgbClr val="FFFFFF"/>
-                </a:solidFill>
-                <a:latin typeface="Nunito Sans"/>
-                <a:ea typeface="Nunito Sans"/>
-                <a:cs typeface="Nunito Sans"/>
-                <a:sym typeface="Nunito Sans"/>
-              </a:rPr>
-              <a:t>Greg </a:t>
-            </a:r>
-            <a:r>
-              <a:rPr lang="en-US" sz="1700" dirty="0" err="1">
-                <a:solidFill>
-                  <a:srgbClr val="FFFFFF"/>
-                </a:solidFill>
-                <a:latin typeface="Nunito Sans"/>
-                <a:ea typeface="Nunito Sans"/>
-                <a:cs typeface="Nunito Sans"/>
-                <a:sym typeface="Nunito Sans"/>
-              </a:rPr>
-              <a:t>Janée</a:t>
-            </a:r>
-            <a:endParaRPr sz="1700" dirty="0">
-              <a:solidFill>
-                <a:srgbClr val="FFFFFF"/>
-              </a:solidFill>
-              <a:latin typeface="Nunito Sans"/>
-              <a:ea typeface="Nunito Sans"/>
-              <a:cs typeface="Nunito Sans"/>
-              <a:sym typeface="Nunito Sans"/>
-            </a:endParaRPr>
-          </a:p>
-          <a:p>
-            <a:pPr marL="0" lvl="0" indent="0" algn="l" rtl="0">
-              <a:spcBef>
-                <a:spcPts val="0"/>
-              </a:spcBef>
-              <a:spcAft>
-                <a:spcPts val="0"/>
-              </a:spcAft>
-              <a:buNone/>
-            </a:pPr>
-            <a:r>
-              <a:rPr lang="en" sz="1300" dirty="0">
-                <a:solidFill>
-                  <a:srgbClr val="FEBC11"/>
-                </a:solidFill>
-                <a:latin typeface="Nunito Sans"/>
-                <a:ea typeface="Nunito Sans"/>
-                <a:cs typeface="Nunito Sans"/>
-                <a:sym typeface="Nunito Sans"/>
-              </a:rPr>
-              <a:t>Research Data Services, UCSB Library</a:t>
-            </a:r>
-            <a:endParaRPr sz="1300" dirty="0">
-              <a:solidFill>
-                <a:srgbClr val="FEBC11"/>
-              </a:solidFill>
-              <a:latin typeface="Nunito Sans"/>
-              <a:ea typeface="Nunito Sans"/>
-              <a:cs typeface="Nunito Sans"/>
-              <a:sym typeface="Nunito Sans"/>
-            </a:endParaRPr>
-          </a:p>
-          <a:p>
-            <a:pPr marL="0" lvl="0" indent="0" algn="l" rtl="0">
-              <a:spcBef>
-                <a:spcPts val="0"/>
-              </a:spcBef>
-              <a:spcAft>
-                <a:spcPts val="0"/>
-              </a:spcAft>
-              <a:buNone/>
-            </a:pPr>
-            <a:r>
-              <a:rPr lang="en" sz="1300" dirty="0" err="1">
-                <a:solidFill>
-                  <a:srgbClr val="FEBC11"/>
-                </a:solidFill>
-                <a:latin typeface="Nunito Sans"/>
-                <a:ea typeface="Nunito Sans"/>
-                <a:cs typeface="Nunito Sans"/>
-                <a:sym typeface="Nunito Sans"/>
-              </a:rPr>
-              <a:t>rds@library.ucsb.edu</a:t>
-            </a:r>
-            <a:endParaRPr sz="1300" dirty="0">
-              <a:solidFill>
-                <a:srgbClr val="FEBC11"/>
-              </a:solidFill>
-              <a:latin typeface="Nunito Sans"/>
-              <a:ea typeface="Nunito Sans"/>
-              <a:cs typeface="Nunito Sans"/>
-              <a:sym typeface="Nunito Sans"/>
-            </a:endParaRPr>
-          </a:p>
-          <a:p>
-            <a:pPr marL="0" lvl="0" indent="0" algn="l" rtl="0">
-              <a:spcBef>
-                <a:spcPts val="0"/>
-              </a:spcBef>
-              <a:spcAft>
-                <a:spcPts val="0"/>
-              </a:spcAft>
-              <a:buNone/>
-            </a:pPr>
-            <a:endParaRPr sz="1300" dirty="0">
-              <a:solidFill>
-                <a:srgbClr val="FEBC11"/>
-              </a:solidFill>
-              <a:latin typeface="Century Gothic"/>
-              <a:ea typeface="Century Gothic"/>
-              <a:cs typeface="Century Gothic"/>
-              <a:sym typeface="Century Gothic"/>
-            </a:endParaRPr>
-          </a:p>
-        </p:txBody>
-      </p:sp>
-      <p:sp>
-        <p:nvSpPr>
-          <p:cNvPr id="141" name="Google Shape;141;p27"/>
-          <p:cNvSpPr txBox="1"/>
-          <p:nvPr/>
-        </p:nvSpPr>
-        <p:spPr>
-          <a:xfrm>
-            <a:off x="200025" y="247650"/>
-            <a:ext cx="7116900" cy="846600"/>
-          </a:xfrm>
-          <a:prstGeom prst="rect">
-            <a:avLst/>
-          </a:prstGeom>
-          <a:noFill/>
-          <a:ln>
-            <a:noFill/>
-          </a:ln>
-        </p:spPr>
-        <p:txBody>
-          <a:bodyPr spcFirstLastPara="1" wrap="square" lIns="91425" tIns="91425" rIns="91425" bIns="91425" anchor="t" anchorCtr="0">
-            <a:spAutoFit/>
-          </a:bodyPr>
-          <a:lstStyle/>
-          <a:p>
-            <a:pPr marL="0" lvl="0" indent="0" algn="l" rtl="0">
-              <a:spcBef>
-                <a:spcPts val="0"/>
-              </a:spcBef>
-              <a:spcAft>
-                <a:spcPts val="0"/>
-              </a:spcAft>
-              <a:buNone/>
-            </a:pPr>
-            <a:r>
-              <a:rPr lang="en" sz="1500" b="1" dirty="0">
-                <a:solidFill>
-                  <a:schemeClr val="lt2"/>
-                </a:solidFill>
-                <a:latin typeface="Nunito Sans"/>
-                <a:ea typeface="Nunito Sans"/>
-                <a:cs typeface="Nunito Sans"/>
-                <a:sym typeface="Nunito Sans"/>
-              </a:rPr>
-              <a:t>EDS213 - Databases &amp; Data Management</a:t>
-            </a:r>
-            <a:endParaRPr sz="1500" b="1" dirty="0">
-              <a:solidFill>
-                <a:schemeClr val="lt2"/>
-              </a:solidFill>
-              <a:latin typeface="Nunito Sans"/>
-              <a:ea typeface="Nunito Sans"/>
-              <a:cs typeface="Nunito Sans"/>
-              <a:sym typeface="Nunito Sans"/>
-            </a:endParaRPr>
-          </a:p>
-          <a:p>
-            <a:pPr marL="0" lvl="0" indent="0" algn="l" rtl="0">
-              <a:spcBef>
-                <a:spcPts val="0"/>
-              </a:spcBef>
-              <a:spcAft>
-                <a:spcPts val="0"/>
-              </a:spcAft>
-              <a:buNone/>
-            </a:pPr>
-            <a:r>
-              <a:rPr lang="en" sz="1500" b="1" dirty="0">
-                <a:solidFill>
-                  <a:schemeClr val="lt2"/>
-                </a:solidFill>
-                <a:latin typeface="Nunito Sans"/>
-                <a:ea typeface="Nunito Sans"/>
-                <a:cs typeface="Nunito Sans"/>
-                <a:sym typeface="Nunito Sans"/>
-              </a:rPr>
-              <a:t>Week </a:t>
-            </a:r>
-            <a:r>
-              <a:rPr lang="en-US" sz="1500" b="1" dirty="0">
-                <a:solidFill>
-                  <a:schemeClr val="lt2"/>
-                </a:solidFill>
-                <a:latin typeface="Nunito Sans"/>
-                <a:ea typeface="Nunito Sans"/>
-                <a:cs typeface="Nunito Sans"/>
-                <a:sym typeface="Nunito Sans"/>
-              </a:rPr>
-              <a:t>3</a:t>
-            </a:r>
-            <a:endParaRPr sz="1500" b="1" dirty="0">
-              <a:solidFill>
-                <a:schemeClr val="lt2"/>
-              </a:solidFill>
-              <a:latin typeface="Nunito Sans"/>
-              <a:ea typeface="Nunito Sans"/>
-              <a:cs typeface="Nunito Sans"/>
-              <a:sym typeface="Nunito Sans"/>
-            </a:endParaRPr>
-          </a:p>
-          <a:p>
-            <a:pPr marL="0" lvl="0" indent="0" algn="l" rtl="0">
-              <a:spcBef>
-                <a:spcPts val="0"/>
-              </a:spcBef>
-              <a:spcAft>
-                <a:spcPts val="0"/>
-              </a:spcAft>
-              <a:buNone/>
-            </a:pPr>
-            <a:endParaRPr sz="1300" i="1" dirty="0">
-              <a:solidFill>
-                <a:srgbClr val="F1C232"/>
-              </a:solidFill>
-              <a:latin typeface="Lobster"/>
-              <a:ea typeface="Lobster"/>
-              <a:cs typeface="Lobster"/>
-              <a:sym typeface="Lobster"/>
-            </a:endParaRPr>
-          </a:p>
-        </p:txBody>
-      </p:sp>
+      </p:pic>
     </p:spTree>
+    <p:extLst>
+      <p:ext uri="{BB962C8B-B14F-4D97-AF65-F5344CB8AC3E}">
+        <p14:creationId xmlns:p14="http://schemas.microsoft.com/office/powerpoint/2010/main" val="1706905883"/>
+      </p:ext>
+    </p:extLst>
   </p:cSld>
   <p:clrMapOvr>
     <a:masterClrMapping/>
@@ -15882,7 +15535,7 @@
           <p:cNvPr id="2" name="Title 1">
             <a:extLst>
               <a:ext uri="{FF2B5EF4-FFF2-40B4-BE49-F238E27FC236}">
-                <a16:creationId xmlns:a16="http://schemas.microsoft.com/office/drawing/2014/main" id="{888C0087-9E81-8473-117D-170BA1B20C82}"/>
+                <a16:creationId xmlns:a16="http://schemas.microsoft.com/office/drawing/2014/main" id="{3983CC3A-88D2-560B-B5EE-EC61D5A52242}"/>
               </a:ext>
             </a:extLst>
           </p:cNvPr>
@@ -15906,17 +15559,17 @@
                   <a:srgbClr val="004B83"/>
                 </a:solidFill>
               </a:rPr>
-              <a:t>Roadmap</a:t>
+              <a:t>Local vs client/server databases</a:t>
             </a:r>
           </a:p>
         </p:txBody>
       </p:sp>
       <p:sp>
         <p:nvSpPr>
-          <p:cNvPr id="5" name="Text Placeholder 4">
+          <p:cNvPr id="3" name="Text Placeholder 2">
             <a:extLst>
               <a:ext uri="{FF2B5EF4-FFF2-40B4-BE49-F238E27FC236}">
-                <a16:creationId xmlns:a16="http://schemas.microsoft.com/office/drawing/2014/main" id="{9DFFC402-F27F-3F34-0869-B308FBB37450}"/>
+                <a16:creationId xmlns:a16="http://schemas.microsoft.com/office/drawing/2014/main" id="{F193F1C7-E077-68D2-7E2A-8BAB71A382D9}"/>
               </a:ext>
             </a:extLst>
           </p:cNvPr>
@@ -15927,18 +15580,54 @@
             <p:ph type="body" idx="1"/>
           </p:nvPr>
         </p:nvSpPr>
-        <p:spPr/>
+        <p:spPr>
+          <a:xfrm>
+            <a:off x="311700" y="1160224"/>
+            <a:ext cx="3999900" cy="3416400"/>
+          </a:xfrm>
+        </p:spPr>
         <p:txBody>
           <a:bodyPr>
-            <a:normAutofit fontScale="92500" lnSpcReduction="10000"/>
+            <a:normAutofit/>
           </a:bodyPr>
           <a:lstStyle/>
+          <a:p>
+            <a:pPr marL="139700" indent="0">
+              <a:buNone/>
+            </a:pPr>
+            <a:r>
+              <a:rPr lang="en-US" b="1" u="sng" dirty="0">
+                <a:latin typeface="Avenir Book" panose="02000503020000020003" pitchFamily="2" charset="0"/>
+              </a:rPr>
+              <a:t>Local (</a:t>
+            </a:r>
+            <a:r>
+              <a:rPr lang="en-US" b="1" u="sng" dirty="0" err="1">
+                <a:latin typeface="Avenir Book" panose="02000503020000020003" pitchFamily="2" charset="0"/>
+              </a:rPr>
+              <a:t>DuckDB</a:t>
+            </a:r>
+            <a:r>
+              <a:rPr lang="en-US" b="1" u="sng" dirty="0">
+                <a:latin typeface="Avenir Book" panose="02000503020000020003" pitchFamily="2" charset="0"/>
+              </a:rPr>
+              <a:t>, SQLite)</a:t>
+            </a:r>
+            <a:br>
+              <a:rPr lang="en-US" b="1" u="sng" dirty="0">
+                <a:latin typeface="Avenir Book" panose="02000503020000020003" pitchFamily="2" charset="0"/>
+              </a:rPr>
+            </a:br>
+            <a:endParaRPr lang="en-US" b="1" u="sng" dirty="0">
+              <a:latin typeface="Avenir Book" panose="02000503020000020003" pitchFamily="2" charset="0"/>
+            </a:endParaRPr>
+          </a:p>
           <a:p>
             <a:r>
               <a:rPr lang="en-US" dirty="0">
                 <a:latin typeface="Avenir Book" panose="02000503020000020003" pitchFamily="2" charset="0"/>
               </a:rPr>
-              <a:t>Today</a:t>
+              <a:t>Storage</a:t>
             </a:r>
           </a:p>
           <a:p>
@@ -15947,7 +15636,15 @@
               <a:rPr lang="en-US" dirty="0">
                 <a:latin typeface="Avenir Book" panose="02000503020000020003" pitchFamily="2" charset="0"/>
               </a:rPr>
-              <a:t>Running SQLite</a:t>
+              <a:t>(Single) local file</a:t>
+            </a:r>
+          </a:p>
+          <a:p>
+            <a:r>
+              <a:rPr lang="en-US" dirty="0">
+                <a:latin typeface="Avenir Book" panose="02000503020000020003" pitchFamily="2" charset="0"/>
+              </a:rPr>
+              <a:t>Access</a:t>
             </a:r>
           </a:p>
           <a:p>
@@ -15956,7 +15653,7 @@
               <a:rPr lang="en-US" dirty="0">
                 <a:latin typeface="Avenir Book" panose="02000503020000020003" pitchFamily="2" charset="0"/>
               </a:rPr>
-              <a:t>Getting help</a:t>
+              <a:t>Command line tool or library open that file</a:t>
             </a:r>
           </a:p>
           <a:p>
@@ -15965,7 +15662,15 @@
               <a:rPr lang="en-US" dirty="0">
                 <a:latin typeface="Avenir Book" panose="02000503020000020003" pitchFamily="2" charset="0"/>
               </a:rPr>
-              <a:t>SQL syntax</a:t>
+              <a:t>No authentication, etc.</a:t>
+            </a:r>
+          </a:p>
+          <a:p>
+            <a:r>
+              <a:rPr lang="en-US" dirty="0">
+                <a:latin typeface="Avenir Book" panose="02000503020000020003" pitchFamily="2" charset="0"/>
+              </a:rPr>
+              <a:t>Support for SQL standard</a:t>
             </a:r>
           </a:p>
           <a:p>
@@ -15974,7 +15679,15 @@
               <a:rPr lang="en-US" dirty="0">
                 <a:latin typeface="Avenir Book" panose="02000503020000020003" pitchFamily="2" charset="0"/>
               </a:rPr>
-              <a:t>Queries, distinct, limits</a:t>
+              <a:t>Essentials there, but many pieces missing</a:t>
+            </a:r>
+          </a:p>
+          <a:p>
+            <a:r>
+              <a:rPr lang="en-US" dirty="0">
+                <a:latin typeface="Avenir Book" panose="02000503020000020003" pitchFamily="2" charset="0"/>
+              </a:rPr>
+              <a:t>Installation; management</a:t>
             </a:r>
           </a:p>
           <a:p>
@@ -15983,7 +15696,15 @@
               <a:rPr lang="en-US" dirty="0">
                 <a:latin typeface="Avenir Book" panose="02000503020000020003" pitchFamily="2" charset="0"/>
               </a:rPr>
-              <a:t>Ordering</a:t>
+              <a:t>Super easy; nil</a:t>
+            </a:r>
+          </a:p>
+          <a:p>
+            <a:r>
+              <a:rPr lang="en-US" dirty="0">
+                <a:latin typeface="Avenir Book" panose="02000503020000020003" pitchFamily="2" charset="0"/>
+              </a:rPr>
+              <a:t>Data portability</a:t>
             </a:r>
           </a:p>
           <a:p>
@@ -15992,97 +15713,10 @@
               <a:rPr lang="en-US" dirty="0">
                 <a:latin typeface="Avenir Book" panose="02000503020000020003" pitchFamily="2" charset="0"/>
               </a:rPr>
-              <a:t>Filtering</a:t>
+              <a:t>Great</a:t>
             </a:r>
           </a:p>
           <a:p>
-            <a:pPr lvl="1"/>
-            <a:r>
-              <a:rPr lang="en-US" dirty="0">
-                <a:latin typeface="Avenir Book" panose="02000503020000020003" pitchFamily="2" charset="0"/>
-              </a:rPr>
-              <a:t>Expressions</a:t>
-            </a:r>
-          </a:p>
-          <a:p>
-            <a:pPr lvl="1"/>
-            <a:r>
-              <a:rPr lang="en-US" dirty="0">
-                <a:latin typeface="Avenir Book" panose="02000503020000020003" pitchFamily="2" charset="0"/>
-              </a:rPr>
-              <a:t>Set operations</a:t>
-            </a:r>
-          </a:p>
-          <a:p>
-            <a:pPr lvl="1"/>
-            <a:r>
-              <a:rPr lang="en-US" dirty="0">
-                <a:latin typeface="Avenir Book" panose="02000503020000020003" pitchFamily="2" charset="0"/>
-              </a:rPr>
-              <a:t>NULL processing</a:t>
-            </a:r>
-          </a:p>
-          <a:p>
-            <a:pPr lvl="1"/>
-            <a:endParaRPr lang="en-US" dirty="0">
-              <a:latin typeface="Avenir Book" panose="02000503020000020003" pitchFamily="2" charset="0"/>
-            </a:endParaRPr>
-          </a:p>
-          <a:p>
-            <a:r>
-              <a:rPr lang="en-US" dirty="0">
-                <a:latin typeface="Avenir Book" panose="02000503020000020003" pitchFamily="2" charset="0"/>
-              </a:rPr>
-              <a:t>Wednesday</a:t>
-            </a:r>
-          </a:p>
-          <a:p>
-            <a:pPr lvl="1"/>
-            <a:r>
-              <a:rPr lang="en-US" dirty="0">
-                <a:latin typeface="Avenir Book" panose="02000503020000020003" pitchFamily="2" charset="0"/>
-              </a:rPr>
-              <a:t>Nesting, temporary tables</a:t>
-            </a:r>
-          </a:p>
-          <a:p>
-            <a:pPr lvl="1"/>
-            <a:r>
-              <a:rPr lang="en-US" dirty="0">
-                <a:latin typeface="Avenir Book" panose="02000503020000020003" pitchFamily="2" charset="0"/>
-              </a:rPr>
-              <a:t>Aggregate functions</a:t>
-            </a:r>
-          </a:p>
-          <a:p>
-            <a:pPr lvl="1"/>
-            <a:r>
-              <a:rPr lang="en-US" dirty="0">
-                <a:latin typeface="Avenir Book" panose="02000503020000020003" pitchFamily="2" charset="0"/>
-              </a:rPr>
-              <a:t>Grouping</a:t>
-            </a:r>
-          </a:p>
-          <a:p>
-            <a:pPr lvl="1"/>
-            <a:r>
-              <a:rPr lang="en-US" dirty="0">
-                <a:latin typeface="Avenir Book" panose="02000503020000020003" pitchFamily="2" charset="0"/>
-              </a:rPr>
-              <a:t>Joins: inner, outer, self</a:t>
-            </a:r>
-          </a:p>
-          <a:p>
-            <a:pPr lvl="1"/>
-            <a:r>
-              <a:rPr lang="en-US" dirty="0">
-                <a:latin typeface="Avenir Book" panose="02000503020000020003" pitchFamily="2" charset="0"/>
-              </a:rPr>
-              <a:t>Views</a:t>
-            </a:r>
-          </a:p>
-          <a:p>
-            <a:pPr lvl="1"/>
             <a:endParaRPr lang="en-US" dirty="0">
               <a:latin typeface="Avenir Book" panose="02000503020000020003" pitchFamily="2" charset="0"/>
             </a:endParaRPr>
@@ -16091,10 +15725,10 @@
       </p:sp>
       <p:sp>
         <p:nvSpPr>
-          <p:cNvPr id="6" name="Text Placeholder 5">
+          <p:cNvPr id="5" name="Text Placeholder 4">
             <a:extLst>
               <a:ext uri="{FF2B5EF4-FFF2-40B4-BE49-F238E27FC236}">
-                <a16:creationId xmlns:a16="http://schemas.microsoft.com/office/drawing/2014/main" id="{ADE49C61-7758-10C7-D5A1-C33EC0C9F7BA}"/>
+                <a16:creationId xmlns:a16="http://schemas.microsoft.com/office/drawing/2014/main" id="{2C0BF0BB-D4A5-F8CB-F94E-192EFE9AF1EC}"/>
               </a:ext>
             </a:extLst>
           </p:cNvPr>
@@ -16112,11 +15746,22 @@
           </a:bodyPr>
           <a:lstStyle/>
           <a:p>
+            <a:pPr marL="139700" indent="0">
+              <a:buNone/>
+            </a:pPr>
+            <a:r>
+              <a:rPr lang="en-US" b="1" u="sng" dirty="0">
+                <a:latin typeface="Avenir Book" panose="02000503020000020003" pitchFamily="2" charset="0"/>
+              </a:rPr>
+              <a:t>Client/server RDBMS (Oracle, SQL Server, PostgreSQL, MySQL, …)</a:t>
+            </a:r>
+          </a:p>
+          <a:p>
             <a:r>
               <a:rPr lang="en-US" dirty="0">
                 <a:latin typeface="Avenir Book" panose="02000503020000020003" pitchFamily="2" charset="0"/>
               </a:rPr>
-              <a:t>Week 5</a:t>
+              <a:t>Storage</a:t>
             </a:r>
           </a:p>
           <a:p>
@@ -16125,7 +15770,15 @@
               <a:rPr lang="en-US" dirty="0">
                 <a:latin typeface="Avenir Book" panose="02000503020000020003" pitchFamily="2" charset="0"/>
               </a:rPr>
-              <a:t>Data management statements</a:t>
+              <a:t>A mystery</a:t>
+            </a:r>
+          </a:p>
+          <a:p>
+            <a:r>
+              <a:rPr lang="en-US" dirty="0">
+                <a:latin typeface="Avenir Book" panose="02000503020000020003" pitchFamily="2" charset="0"/>
+              </a:rPr>
+              <a:t>Access</a:t>
             </a:r>
           </a:p>
           <a:p>
@@ -16134,7 +15787,7 @@
               <a:rPr lang="en-US" dirty="0">
                 <a:latin typeface="Avenir Book" panose="02000503020000020003" pitchFamily="2" charset="0"/>
               </a:rPr>
-              <a:t>Reading, writing data</a:t>
+              <a:t>Command line tool or library talk over network (even on same machine)</a:t>
             </a:r>
           </a:p>
           <a:p>
@@ -16143,21 +15796,15 @@
               <a:rPr lang="en-US" dirty="0">
                 <a:latin typeface="Avenir Book" panose="02000503020000020003" pitchFamily="2" charset="0"/>
               </a:rPr>
-              <a:t>Triggers</a:t>
+              <a:t>User accounts, authentication, permissions</a:t>
             </a:r>
-          </a:p>
-          <a:p>
-            <a:pPr lvl="1"/>
-            <a:endParaRPr lang="en-US" dirty="0">
-              <a:latin typeface="Avenir Book" panose="02000503020000020003" pitchFamily="2" charset="0"/>
-            </a:endParaRPr>
           </a:p>
           <a:p>
             <a:r>
               <a:rPr lang="en-US" dirty="0">
                 <a:latin typeface="Avenir Book" panose="02000503020000020003" pitchFamily="2" charset="0"/>
               </a:rPr>
-              <a:t>Week 9</a:t>
+              <a:t>Support for SQL standard</a:t>
             </a:r>
           </a:p>
           <a:p>
@@ -16166,7 +15813,15 @@
               <a:rPr lang="en-US" dirty="0">
                 <a:latin typeface="Avenir Book" panose="02000503020000020003" pitchFamily="2" charset="0"/>
               </a:rPr>
-              <a:t>Concurrency, transactions</a:t>
+              <a:t>Very good</a:t>
+            </a:r>
+          </a:p>
+          <a:p>
+            <a:r>
+              <a:rPr lang="en-US" dirty="0">
+                <a:latin typeface="Avenir Book" panose="02000503020000020003" pitchFamily="2" charset="0"/>
+              </a:rPr>
+              <a:t>Installation; management</a:t>
             </a:r>
           </a:p>
           <a:p>
@@ -16175,7 +15830,15 @@
               <a:rPr lang="en-US" dirty="0">
                 <a:latin typeface="Avenir Book" panose="02000503020000020003" pitchFamily="2" charset="0"/>
               </a:rPr>
-              <a:t>Backups</a:t>
+              <a:t>Easy; obscure</a:t>
+            </a:r>
+          </a:p>
+          <a:p>
+            <a:r>
+              <a:rPr lang="en-US" dirty="0">
+                <a:latin typeface="Avenir Book" panose="02000503020000020003" pitchFamily="2" charset="0"/>
+              </a:rPr>
+              <a:t>Data portability</a:t>
             </a:r>
           </a:p>
           <a:p>
@@ -16184,14 +15847,8 @@
               <a:rPr lang="en-US" dirty="0">
                 <a:latin typeface="Avenir Book" panose="02000503020000020003" pitchFamily="2" charset="0"/>
               </a:rPr>
-              <a:t>Indexes</a:t>
+              <a:t>Weak to nil</a:t>
             </a:r>
-          </a:p>
-          <a:p>
-            <a:pPr lvl="1"/>
-            <a:endParaRPr lang="en-US" dirty="0">
-              <a:latin typeface="Avenir Book" panose="02000503020000020003" pitchFamily="2" charset="0"/>
-            </a:endParaRPr>
           </a:p>
         </p:txBody>
       </p:sp>
@@ -16200,7 +15857,7 @@
           <p:cNvPr id="4" name="Slide Number Placeholder 3">
             <a:extLst>
               <a:ext uri="{FF2B5EF4-FFF2-40B4-BE49-F238E27FC236}">
-                <a16:creationId xmlns:a16="http://schemas.microsoft.com/office/drawing/2014/main" id="{0BAB0C3C-1CF2-22B2-6E5A-4E8041AE08F3}"/>
+                <a16:creationId xmlns:a16="http://schemas.microsoft.com/office/drawing/2014/main" id="{F75D26E5-4B9C-AE7C-4F67-C282F63E900E}"/>
               </a:ext>
             </a:extLst>
           </p:cNvPr>
@@ -16236,7 +15893,7 @@
     </p:spTree>
     <p:extLst>
       <p:ext uri="{BB962C8B-B14F-4D97-AF65-F5344CB8AC3E}">
-        <p14:creationId xmlns:p14="http://schemas.microsoft.com/office/powerpoint/2010/main" val="1345126142"/>
+        <p14:creationId xmlns:p14="http://schemas.microsoft.com/office/powerpoint/2010/main" val="425826323"/>
       </p:ext>
     </p:extLst>
   </p:cSld>
@@ -16268,7 +15925,7 @@
           <p:cNvPr id="2" name="Title 1">
             <a:extLst>
               <a:ext uri="{FF2B5EF4-FFF2-40B4-BE49-F238E27FC236}">
-                <a16:creationId xmlns:a16="http://schemas.microsoft.com/office/drawing/2014/main" id="{D0D90E94-5E30-BFD4-573B-74F3BC143D3C}"/>
+                <a16:creationId xmlns:a16="http://schemas.microsoft.com/office/drawing/2014/main" id="{8AC5CCEB-A687-D6ED-B4AF-5079878958D3}"/>
               </a:ext>
             </a:extLst>
           </p:cNvPr>
@@ -16286,7 +15943,68 @@
           <a:p>
             <a:r>
               <a:rPr lang="en-US" dirty="0"/>
-              <a:t>SQLite architecture</a:t>
+              <a:t>Our running</a:t>
+            </a:r>
+            <a:br>
+              <a:rPr lang="en-US" dirty="0"/>
+            </a:br>
+            <a:r>
+              <a:rPr lang="en-US" dirty="0"/>
+              <a:t>example</a:t>
+            </a:r>
+          </a:p>
+        </p:txBody>
+      </p:sp>
+      <p:sp>
+        <p:nvSpPr>
+          <p:cNvPr id="3" name="Text Placeholder 2">
+            <a:extLst>
+              <a:ext uri="{FF2B5EF4-FFF2-40B4-BE49-F238E27FC236}">
+                <a16:creationId xmlns:a16="http://schemas.microsoft.com/office/drawing/2014/main" id="{8D4858E6-4CF3-6CBA-F078-C3696711D9E1}"/>
+              </a:ext>
+            </a:extLst>
+          </p:cNvPr>
+          <p:cNvSpPr>
+            <a:spLocks noGrp="1"/>
+          </p:cNvSpPr>
+          <p:nvPr>
+            <p:ph type="body" idx="1"/>
+          </p:nvPr>
+        </p:nvSpPr>
+        <p:spPr/>
+        <p:txBody>
+          <a:bodyPr/>
+          <a:lstStyle/>
+          <a:p>
+            <a:endParaRPr lang="en-US" dirty="0"/>
+          </a:p>
+          <a:p>
+            <a:endParaRPr lang="en-US" dirty="0"/>
+          </a:p>
+          <a:p>
+            <a:r>
+              <a:rPr lang="en-US" dirty="0"/>
+              <a:t>Crow’s foot: many side</a:t>
+            </a:r>
+            <a:br>
+              <a:rPr lang="en-US" dirty="0"/>
+            </a:br>
+            <a:r>
+              <a:rPr lang="en-US" dirty="0"/>
+              <a:t>of many-to-one</a:t>
+            </a:r>
+            <a:br>
+              <a:rPr lang="en-US" dirty="0"/>
+            </a:br>
+            <a:r>
+              <a:rPr lang="en-US" dirty="0"/>
+              <a:t>relationship</a:t>
+            </a:r>
+          </a:p>
+          <a:p>
+            <a:r>
+              <a:rPr lang="en-US" dirty="0"/>
+              <a:t>Primary keys in bold</a:t>
             </a:r>
           </a:p>
         </p:txBody>
@@ -16296,7 +16014,7 @@
           <p:cNvPr id="4" name="Slide Number Placeholder 3">
             <a:extLst>
               <a:ext uri="{FF2B5EF4-FFF2-40B4-BE49-F238E27FC236}">
-                <a16:creationId xmlns:a16="http://schemas.microsoft.com/office/drawing/2014/main" id="{C59D0C33-7696-4290-F4BB-6E6CE96124F7}"/>
+                <a16:creationId xmlns:a16="http://schemas.microsoft.com/office/drawing/2014/main" id="{FE817B71-1919-0615-A618-ECA54F9954BE}"/>
               </a:ext>
             </a:extLst>
           </p:cNvPr>
@@ -16329,468 +16047,40 @@
           </a:p>
         </p:txBody>
       </p:sp>
-      <p:sp>
-        <p:nvSpPr>
-          <p:cNvPr id="5" name="Rectangle 4">
+      <p:pic>
+        <p:nvPicPr>
+          <p:cNvPr id="6" name="Picture 5">
             <a:extLst>
               <a:ext uri="{FF2B5EF4-FFF2-40B4-BE49-F238E27FC236}">
-                <a16:creationId xmlns:a16="http://schemas.microsoft.com/office/drawing/2014/main" id="{641341E6-2F9F-AEA9-BF35-D18D6F92F8CD}"/>
+                <a16:creationId xmlns:a16="http://schemas.microsoft.com/office/drawing/2014/main" id="{22F1DBE0-0A13-753A-6AE0-935AF8A47957}"/>
               </a:ext>
             </a:extLst>
           </p:cNvPr>
-          <p:cNvSpPr/>
+          <p:cNvPicPr>
+            <a:picLocks noChangeAspect="1"/>
+          </p:cNvPicPr>
           <p:nvPr/>
-        </p:nvSpPr>
+        </p:nvPicPr>
+        <p:blipFill>
+          <a:blip r:embed="rId2"/>
+          <a:stretch>
+            <a:fillRect/>
+          </a:stretch>
+        </p:blipFill>
         <p:spPr>
           <a:xfrm>
-            <a:off x="2181851" y="1917377"/>
-            <a:ext cx="1983783" cy="787697"/>
+            <a:off x="3582876" y="4"/>
+            <a:ext cx="5062409" cy="5143500"/>
           </a:xfrm>
           <a:prstGeom prst="rect">
             <a:avLst/>
           </a:prstGeom>
-          <a:noFill/>
         </p:spPr>
-        <p:style>
-          <a:lnRef idx="2">
-            <a:schemeClr val="accent1">
-              <a:shade val="50000"/>
-            </a:schemeClr>
-          </a:lnRef>
-          <a:fillRef idx="1">
-            <a:schemeClr val="accent1"/>
-          </a:fillRef>
-          <a:effectRef idx="0">
-            <a:schemeClr val="accent1"/>
-          </a:effectRef>
-          <a:fontRef idx="minor">
-            <a:schemeClr val="lt1"/>
-          </a:fontRef>
-        </p:style>
-        <p:txBody>
-          <a:bodyPr rtlCol="0" anchor="ctr"/>
-          <a:lstStyle/>
-          <a:p>
-            <a:pPr algn="ctr"/>
-            <a:endParaRPr lang="en-US" dirty="0"/>
-          </a:p>
-        </p:txBody>
-      </p:sp>
-      <p:sp>
-        <p:nvSpPr>
-          <p:cNvPr id="6" name="TextBox 5">
-            <a:extLst>
-              <a:ext uri="{FF2B5EF4-FFF2-40B4-BE49-F238E27FC236}">
-                <a16:creationId xmlns:a16="http://schemas.microsoft.com/office/drawing/2014/main" id="{25BFFA53-CAB4-A8AA-B423-989E274FCEF2}"/>
-              </a:ext>
-            </a:extLst>
-          </p:cNvPr>
-          <p:cNvSpPr txBox="1"/>
-          <p:nvPr/>
-        </p:nvSpPr>
-        <p:spPr>
-          <a:xfrm>
-            <a:off x="2286462" y="2032139"/>
-            <a:ext cx="1693193" cy="523220"/>
-          </a:xfrm>
-          <a:prstGeom prst="rect">
-            <a:avLst/>
-          </a:prstGeom>
-          <a:noFill/>
-        </p:spPr>
-        <p:txBody>
-          <a:bodyPr wrap="square" rtlCol="0">
-            <a:spAutoFit/>
-          </a:bodyPr>
-          <a:lstStyle/>
-          <a:p>
-            <a:r>
-              <a:rPr lang="en-US" dirty="0"/>
-              <a:t>Command line tool</a:t>
-            </a:r>
-          </a:p>
-          <a:p>
-            <a:r>
-              <a:rPr lang="en-US" dirty="0"/>
-              <a:t>or program</a:t>
-            </a:r>
-          </a:p>
-        </p:txBody>
-      </p:sp>
-      <p:sp>
-        <p:nvSpPr>
-          <p:cNvPr id="7" name="TextBox 6">
-            <a:extLst>
-              <a:ext uri="{FF2B5EF4-FFF2-40B4-BE49-F238E27FC236}">
-                <a16:creationId xmlns:a16="http://schemas.microsoft.com/office/drawing/2014/main" id="{9A32B8AD-D445-B7BB-F8BD-BDAF65341CD9}"/>
-              </a:ext>
-            </a:extLst>
-          </p:cNvPr>
-          <p:cNvSpPr txBox="1"/>
-          <p:nvPr/>
-        </p:nvSpPr>
-        <p:spPr>
-          <a:xfrm>
-            <a:off x="2143104" y="1617079"/>
-            <a:ext cx="1379349" cy="307777"/>
-          </a:xfrm>
-          <a:prstGeom prst="rect">
-            <a:avLst/>
-          </a:prstGeom>
-          <a:noFill/>
-        </p:spPr>
-        <p:txBody>
-          <a:bodyPr wrap="square" rtlCol="0">
-            <a:spAutoFit/>
-          </a:bodyPr>
-          <a:lstStyle/>
-          <a:p>
-            <a:r>
-              <a:rPr lang="en-US" b="1" dirty="0"/>
-              <a:t>CLIENT (you)</a:t>
-            </a:r>
-          </a:p>
-        </p:txBody>
-      </p:sp>
-      <p:sp>
-        <p:nvSpPr>
-          <p:cNvPr id="8" name="TextBox 7">
-            <a:extLst>
-              <a:ext uri="{FF2B5EF4-FFF2-40B4-BE49-F238E27FC236}">
-                <a16:creationId xmlns:a16="http://schemas.microsoft.com/office/drawing/2014/main" id="{03B3D1AB-E08B-AFAE-3986-E3A02907FCD4}"/>
-              </a:ext>
-            </a:extLst>
-          </p:cNvPr>
-          <p:cNvSpPr txBox="1"/>
-          <p:nvPr/>
-        </p:nvSpPr>
-        <p:spPr>
-          <a:xfrm>
-            <a:off x="2526687" y="2945423"/>
-            <a:ext cx="1259239" cy="307777"/>
-          </a:xfrm>
-          <a:prstGeom prst="rect">
-            <a:avLst/>
-          </a:prstGeom>
-          <a:noFill/>
-        </p:spPr>
-        <p:txBody>
-          <a:bodyPr wrap="square" rtlCol="0">
-            <a:spAutoFit/>
-          </a:bodyPr>
-          <a:lstStyle/>
-          <a:p>
-            <a:pPr algn="ctr"/>
-            <a:r>
-              <a:rPr lang="en-US" dirty="0"/>
-              <a:t>SQLite library</a:t>
-            </a:r>
-          </a:p>
-        </p:txBody>
-      </p:sp>
-      <p:sp>
-        <p:nvSpPr>
-          <p:cNvPr id="9" name="Rectangle 8">
-            <a:extLst>
-              <a:ext uri="{FF2B5EF4-FFF2-40B4-BE49-F238E27FC236}">
-                <a16:creationId xmlns:a16="http://schemas.microsoft.com/office/drawing/2014/main" id="{BCF43892-52F0-801D-A9A9-F5E36F2D6B49}"/>
-              </a:ext>
-            </a:extLst>
-          </p:cNvPr>
-          <p:cNvSpPr/>
-          <p:nvPr/>
-        </p:nvSpPr>
-        <p:spPr>
-          <a:xfrm>
-            <a:off x="2181851" y="2770814"/>
-            <a:ext cx="1983783" cy="722737"/>
-          </a:xfrm>
-          <a:prstGeom prst="rect">
-            <a:avLst/>
-          </a:prstGeom>
-          <a:noFill/>
-        </p:spPr>
-        <p:style>
-          <a:lnRef idx="2">
-            <a:schemeClr val="accent1">
-              <a:shade val="50000"/>
-            </a:schemeClr>
-          </a:lnRef>
-          <a:fillRef idx="1">
-            <a:schemeClr val="accent1"/>
-          </a:fillRef>
-          <a:effectRef idx="0">
-            <a:schemeClr val="accent1"/>
-          </a:effectRef>
-          <a:fontRef idx="minor">
-            <a:schemeClr val="lt1"/>
-          </a:fontRef>
-        </p:style>
-        <p:txBody>
-          <a:bodyPr rtlCol="0" anchor="ctr"/>
-          <a:lstStyle/>
-          <a:p>
-            <a:pPr algn="ctr"/>
-            <a:endParaRPr lang="en-US" dirty="0"/>
-          </a:p>
-        </p:txBody>
-      </p:sp>
-      <p:sp>
-        <p:nvSpPr>
-          <p:cNvPr id="12" name="Can 11">
-            <a:extLst>
-              <a:ext uri="{FF2B5EF4-FFF2-40B4-BE49-F238E27FC236}">
-                <a16:creationId xmlns:a16="http://schemas.microsoft.com/office/drawing/2014/main" id="{14B768F4-B471-4BC2-6272-697F3772016C}"/>
-              </a:ext>
-            </a:extLst>
-          </p:cNvPr>
-          <p:cNvSpPr/>
-          <p:nvPr/>
-        </p:nvSpPr>
-        <p:spPr>
-          <a:xfrm>
-            <a:off x="5181548" y="3460680"/>
-            <a:ext cx="480447" cy="548126"/>
-          </a:xfrm>
-          <a:prstGeom prst="can">
-            <a:avLst/>
-          </a:prstGeom>
-        </p:spPr>
-        <p:style>
-          <a:lnRef idx="2">
-            <a:schemeClr val="accent1">
-              <a:shade val="50000"/>
-            </a:schemeClr>
-          </a:lnRef>
-          <a:fillRef idx="1">
-            <a:schemeClr val="accent1"/>
-          </a:fillRef>
-          <a:effectRef idx="0">
-            <a:schemeClr val="accent1"/>
-          </a:effectRef>
-          <a:fontRef idx="minor">
-            <a:schemeClr val="lt1"/>
-          </a:fontRef>
-        </p:style>
-        <p:txBody>
-          <a:bodyPr rtlCol="0" anchor="ctr"/>
-          <a:lstStyle/>
-          <a:p>
-            <a:pPr algn="ctr"/>
-            <a:endParaRPr lang="en-US"/>
-          </a:p>
-        </p:txBody>
-      </p:sp>
-      <p:cxnSp>
-        <p:nvCxnSpPr>
-          <p:cNvPr id="20" name="Elbow Connector 19">
-            <a:extLst>
-              <a:ext uri="{FF2B5EF4-FFF2-40B4-BE49-F238E27FC236}">
-                <a16:creationId xmlns:a16="http://schemas.microsoft.com/office/drawing/2014/main" id="{C5720730-8557-E75B-441B-26FD4AF285BF}"/>
-              </a:ext>
-            </a:extLst>
-          </p:cNvPr>
-          <p:cNvCxnSpPr>
-            <a:cxnSpLocks/>
-            <a:stCxn id="9" idx="3"/>
-            <a:endCxn id="12" idx="1"/>
-          </p:cNvCxnSpPr>
-          <p:nvPr/>
-        </p:nvCxnSpPr>
-        <p:spPr>
-          <a:xfrm>
-            <a:off x="4165634" y="3132183"/>
-            <a:ext cx="1256138" cy="328497"/>
-          </a:xfrm>
-          <a:prstGeom prst="bentConnector2">
-            <a:avLst/>
-          </a:prstGeom>
-          <a:ln w="28575">
-            <a:headEnd type="triangle"/>
-            <a:tailEnd type="triangle"/>
-          </a:ln>
-        </p:spPr>
-        <p:style>
-          <a:lnRef idx="1">
-            <a:schemeClr val="accent1"/>
-          </a:lnRef>
-          <a:fillRef idx="0">
-            <a:schemeClr val="accent1"/>
-          </a:fillRef>
-          <a:effectRef idx="0">
-            <a:schemeClr val="accent1"/>
-          </a:effectRef>
-          <a:fontRef idx="minor">
-            <a:schemeClr val="tx1"/>
-          </a:fontRef>
-        </p:style>
-      </p:cxnSp>
-      <p:sp>
-        <p:nvSpPr>
-          <p:cNvPr id="22" name="TextBox 21">
-            <a:extLst>
-              <a:ext uri="{FF2B5EF4-FFF2-40B4-BE49-F238E27FC236}">
-                <a16:creationId xmlns:a16="http://schemas.microsoft.com/office/drawing/2014/main" id="{C4F94292-B919-F703-6B07-7A10A85791F0}"/>
-              </a:ext>
-            </a:extLst>
-          </p:cNvPr>
-          <p:cNvSpPr txBox="1"/>
-          <p:nvPr/>
-        </p:nvSpPr>
-        <p:spPr>
-          <a:xfrm>
-            <a:off x="5661995" y="3580854"/>
-            <a:ext cx="1259239" cy="307777"/>
-          </a:xfrm>
-          <a:prstGeom prst="rect">
-            <a:avLst/>
-          </a:prstGeom>
-          <a:noFill/>
-        </p:spPr>
-        <p:txBody>
-          <a:bodyPr wrap="square" rtlCol="0">
-            <a:spAutoFit/>
-          </a:bodyPr>
-          <a:lstStyle/>
-          <a:p>
-            <a:pPr algn="ctr"/>
-            <a:r>
-              <a:rPr lang="en-US" dirty="0"/>
-              <a:t>Database file</a:t>
-            </a:r>
-          </a:p>
-        </p:txBody>
-      </p:sp>
-      <p:sp>
-        <p:nvSpPr>
-          <p:cNvPr id="23" name="Can 22">
-            <a:extLst>
-              <a:ext uri="{FF2B5EF4-FFF2-40B4-BE49-F238E27FC236}">
-                <a16:creationId xmlns:a16="http://schemas.microsoft.com/office/drawing/2014/main" id="{36D4D760-FD8A-3E5D-C8BE-92CFDE756ED0}"/>
-              </a:ext>
-            </a:extLst>
-          </p:cNvPr>
-          <p:cNvSpPr/>
-          <p:nvPr/>
-        </p:nvSpPr>
-        <p:spPr>
-          <a:xfrm>
-            <a:off x="4433368" y="4008806"/>
-            <a:ext cx="480447" cy="548126"/>
-          </a:xfrm>
-          <a:prstGeom prst="can">
-            <a:avLst/>
-          </a:prstGeom>
-        </p:spPr>
-        <p:style>
-          <a:lnRef idx="2">
-            <a:schemeClr val="accent1">
-              <a:shade val="50000"/>
-            </a:schemeClr>
-          </a:lnRef>
-          <a:fillRef idx="1">
-            <a:schemeClr val="accent1"/>
-          </a:fillRef>
-          <a:effectRef idx="0">
-            <a:schemeClr val="accent1"/>
-          </a:effectRef>
-          <a:fontRef idx="minor">
-            <a:schemeClr val="lt1"/>
-          </a:fontRef>
-        </p:style>
-        <p:txBody>
-          <a:bodyPr rtlCol="0" anchor="ctr"/>
-          <a:lstStyle/>
-          <a:p>
-            <a:pPr algn="ctr"/>
-            <a:endParaRPr lang="en-US"/>
-          </a:p>
-        </p:txBody>
-      </p:sp>
-      <p:sp>
-        <p:nvSpPr>
-          <p:cNvPr id="24" name="TextBox 23">
-            <a:extLst>
-              <a:ext uri="{FF2B5EF4-FFF2-40B4-BE49-F238E27FC236}">
-                <a16:creationId xmlns:a16="http://schemas.microsoft.com/office/drawing/2014/main" id="{7578D0BA-2C70-813A-F375-49E4AF3968D9}"/>
-              </a:ext>
-            </a:extLst>
-          </p:cNvPr>
-          <p:cNvSpPr txBox="1"/>
-          <p:nvPr/>
-        </p:nvSpPr>
-        <p:spPr>
-          <a:xfrm>
-            <a:off x="4874139" y="4128980"/>
-            <a:ext cx="874336" cy="307777"/>
-          </a:xfrm>
-          <a:prstGeom prst="rect">
-            <a:avLst/>
-          </a:prstGeom>
-          <a:noFill/>
-        </p:spPr>
-        <p:txBody>
-          <a:bodyPr wrap="square" rtlCol="0">
-            <a:spAutoFit/>
-          </a:bodyPr>
-          <a:lstStyle/>
-          <a:p>
-            <a:pPr algn="ctr"/>
-            <a:r>
-              <a:rPr lang="en-US" dirty="0"/>
-              <a:t>Log file</a:t>
-            </a:r>
-          </a:p>
-        </p:txBody>
-      </p:sp>
-      <p:cxnSp>
-        <p:nvCxnSpPr>
-          <p:cNvPr id="25" name="Elbow Connector 24">
-            <a:extLst>
-              <a:ext uri="{FF2B5EF4-FFF2-40B4-BE49-F238E27FC236}">
-                <a16:creationId xmlns:a16="http://schemas.microsoft.com/office/drawing/2014/main" id="{E206C562-C2F0-B18E-3849-2199748EE0C9}"/>
-              </a:ext>
-            </a:extLst>
-          </p:cNvPr>
-          <p:cNvCxnSpPr>
-            <a:cxnSpLocks/>
-            <a:stCxn id="9" idx="3"/>
-            <a:endCxn id="23" idx="1"/>
-          </p:cNvCxnSpPr>
-          <p:nvPr/>
-        </p:nvCxnSpPr>
-        <p:spPr>
-          <a:xfrm>
-            <a:off x="4165634" y="3132183"/>
-            <a:ext cx="507958" cy="876623"/>
-          </a:xfrm>
-          <a:prstGeom prst="bentConnector2">
-            <a:avLst/>
-          </a:prstGeom>
-          <a:ln w="28575">
-            <a:headEnd type="triangle"/>
-            <a:tailEnd type="triangle"/>
-          </a:ln>
-        </p:spPr>
-        <p:style>
-          <a:lnRef idx="1">
-            <a:schemeClr val="accent1"/>
-          </a:lnRef>
-          <a:fillRef idx="0">
-            <a:schemeClr val="accent1"/>
-          </a:fillRef>
-          <a:effectRef idx="0">
-            <a:schemeClr val="accent1"/>
-          </a:effectRef>
-          <a:fontRef idx="minor">
-            <a:schemeClr val="tx1"/>
-          </a:fontRef>
-        </p:style>
-      </p:cxnSp>
+      </p:pic>
     </p:spTree>
     <p:extLst>
       <p:ext uri="{BB962C8B-B14F-4D97-AF65-F5344CB8AC3E}">
-        <p14:creationId xmlns:p14="http://schemas.microsoft.com/office/powerpoint/2010/main" val="784822125"/>
+        <p14:creationId xmlns:p14="http://schemas.microsoft.com/office/powerpoint/2010/main" val="2204738551"/>
       </p:ext>
     </p:extLst>
   </p:cSld>
@@ -16846,7 +16136,7 @@
                   <a:srgbClr val="004B83"/>
                 </a:solidFill>
               </a:rPr>
-              <a:t>Roadmap - Wednesday</a:t>
+              <a:t>Roadmap</a:t>
             </a:r>
           </a:p>
         </p:txBody>
@@ -16870,7 +16160,7 @@
         <p:spPr/>
         <p:txBody>
           <a:bodyPr>
-            <a:normAutofit/>
+            <a:normAutofit fontScale="92500" lnSpcReduction="10000"/>
           </a:bodyPr>
           <a:lstStyle/>
           <a:p>
@@ -16884,7 +16174,7 @@
           <a:p>
             <a:pPr lvl="1"/>
             <a:r>
-              <a:rPr lang="en-US" strike="sngStrike" dirty="0">
+              <a:rPr lang="en-US" dirty="0">
                 <a:latin typeface="Avenir Book" panose="02000503020000020003" pitchFamily="2" charset="0"/>
               </a:rPr>
               <a:t>Running SQLite</a:t>
@@ -16893,7 +16183,7 @@
           <a:p>
             <a:pPr lvl="1"/>
             <a:r>
-              <a:rPr lang="en-US" strike="sngStrike" dirty="0">
+              <a:rPr lang="en-US" dirty="0">
                 <a:latin typeface="Avenir Book" panose="02000503020000020003" pitchFamily="2" charset="0"/>
               </a:rPr>
               <a:t>Getting help</a:t>
@@ -16902,7 +16192,7 @@
           <a:p>
             <a:pPr lvl="1"/>
             <a:r>
-              <a:rPr lang="en-US" strike="sngStrike" dirty="0">
+              <a:rPr lang="en-US" dirty="0">
                 <a:latin typeface="Avenir Book" panose="02000503020000020003" pitchFamily="2" charset="0"/>
               </a:rPr>
               <a:t>SQL syntax</a:t>
@@ -16911,7 +16201,7 @@
           <a:p>
             <a:pPr lvl="1"/>
             <a:r>
-              <a:rPr lang="en-US" strike="sngStrike" dirty="0">
+              <a:rPr lang="en-US" dirty="0">
                 <a:latin typeface="Avenir Book" panose="02000503020000020003" pitchFamily="2" charset="0"/>
               </a:rPr>
               <a:t>Queries, distinct, limits</a:t>
@@ -16920,24 +16210,10 @@
           <a:p>
             <a:pPr lvl="1"/>
             <a:r>
-              <a:rPr lang="en-US" strike="sngStrike" dirty="0">
+              <a:rPr lang="en-US" dirty="0">
                 <a:latin typeface="Avenir Book" panose="02000503020000020003" pitchFamily="2" charset="0"/>
               </a:rPr>
               <a:t>Ordering</a:t>
-            </a:r>
-          </a:p>
-          <a:p>
-            <a:pPr lvl="1"/>
-            <a:endParaRPr lang="en-US" dirty="0">
-              <a:latin typeface="Avenir Book" panose="02000503020000020003" pitchFamily="2" charset="0"/>
-            </a:endParaRPr>
-          </a:p>
-          <a:p>
-            <a:r>
-              <a:rPr lang="en-US" dirty="0">
-                <a:latin typeface="Avenir Book" panose="02000503020000020003" pitchFamily="2" charset="0"/>
-              </a:rPr>
-              <a:t>Wednesday</a:t>
             </a:r>
           </a:p>
           <a:p>
@@ -16964,16 +16240,7 @@
               <a:rPr lang="en-US" dirty="0">
                 <a:latin typeface="Avenir Book" panose="02000503020000020003" pitchFamily="2" charset="0"/>
               </a:rPr>
-              <a:t>Aggregation, grouping</a:t>
-            </a:r>
-          </a:p>
-          <a:p>
-            <a:pPr lvl="1"/>
-            <a:r>
-              <a:rPr lang="en-US" dirty="0">
-                <a:latin typeface="Avenir Book" panose="02000503020000020003" pitchFamily="2" charset="0"/>
-              </a:rPr>
-              <a:t>Nested queries, temporary tables</a:t>
+              <a:t>Set operations</a:t>
             </a:r>
           </a:p>
           <a:p>
@@ -16987,12 +16254,68 @@
           </a:p>
           <a:p>
             <a:pPr lvl="1"/>
+            <a:endParaRPr lang="en-US" dirty="0">
+              <a:latin typeface="Avenir Book" panose="02000503020000020003" pitchFamily="2" charset="0"/>
+            </a:endParaRPr>
+          </a:p>
+          <a:p>
             <a:r>
               <a:rPr lang="en-US" dirty="0">
                 <a:latin typeface="Avenir Book" panose="02000503020000020003" pitchFamily="2" charset="0"/>
               </a:rPr>
-              <a:t>Joins: inner, outer</a:t>
+              <a:t>Wednesday</a:t>
             </a:r>
+          </a:p>
+          <a:p>
+            <a:pPr lvl="1"/>
+            <a:r>
+              <a:rPr lang="en-US" dirty="0">
+                <a:latin typeface="Avenir Book" panose="02000503020000020003" pitchFamily="2" charset="0"/>
+              </a:rPr>
+              <a:t>Nesting, temporary tables</a:t>
+            </a:r>
+          </a:p>
+          <a:p>
+            <a:pPr lvl="1"/>
+            <a:r>
+              <a:rPr lang="en-US" dirty="0">
+                <a:latin typeface="Avenir Book" panose="02000503020000020003" pitchFamily="2" charset="0"/>
+              </a:rPr>
+              <a:t>Aggregate functions</a:t>
+            </a:r>
+          </a:p>
+          <a:p>
+            <a:pPr lvl="1"/>
+            <a:r>
+              <a:rPr lang="en-US" dirty="0">
+                <a:latin typeface="Avenir Book" panose="02000503020000020003" pitchFamily="2" charset="0"/>
+              </a:rPr>
+              <a:t>Grouping</a:t>
+            </a:r>
+          </a:p>
+          <a:p>
+            <a:pPr lvl="1"/>
+            <a:r>
+              <a:rPr lang="en-US" dirty="0">
+                <a:latin typeface="Avenir Book" panose="02000503020000020003" pitchFamily="2" charset="0"/>
+              </a:rPr>
+              <a:t>Joins: inner, outer, self</a:t>
+            </a:r>
+          </a:p>
+          <a:p>
+            <a:pPr lvl="1"/>
+            <a:r>
+              <a:rPr lang="en-US" dirty="0">
+                <a:latin typeface="Avenir Book" panose="02000503020000020003" pitchFamily="2" charset="0"/>
+              </a:rPr>
+              <a:t>Views</a:t>
+            </a:r>
+          </a:p>
+          <a:p>
+            <a:pPr lvl="1"/>
+            <a:endParaRPr lang="en-US" dirty="0">
+              <a:latin typeface="Avenir Book" panose="02000503020000020003" pitchFamily="2" charset="0"/>
+            </a:endParaRPr>
           </a:p>
         </p:txBody>
       </p:sp>
@@ -17023,34 +16346,7 @@
               <a:rPr lang="en-US" dirty="0">
                 <a:latin typeface="Avenir Book" panose="02000503020000020003" pitchFamily="2" charset="0"/>
               </a:rPr>
-              <a:t>Week 5</a:t>
-            </a:r>
-          </a:p>
-          <a:p>
-            <a:pPr lvl="1"/>
-            <a:r>
-              <a:rPr lang="en-US" dirty="0">
-                <a:latin typeface="Avenir Book" panose="02000503020000020003" pitchFamily="2" charset="0"/>
-              </a:rPr>
-              <a:t>Joins review, self-joins</a:t>
-            </a:r>
-          </a:p>
-          <a:p>
-            <a:pPr lvl="1"/>
-            <a:r>
-              <a:rPr lang="en-US" dirty="0">
-                <a:latin typeface="Avenir Book" panose="02000503020000020003" pitchFamily="2" charset="0"/>
-              </a:rPr>
-              <a:t>Views</a:t>
-            </a:r>
-          </a:p>
-          <a:p>
-            <a:pPr lvl="1"/>
-            <a:r>
-              <a:rPr lang="en-US" dirty="0">
-                <a:latin typeface="Avenir Book" panose="02000503020000020003" pitchFamily="2" charset="0"/>
-              </a:rPr>
-              <a:t>Set operations</a:t>
+              <a:t>Week 4</a:t>
             </a:r>
           </a:p>
           <a:p>
@@ -17073,25 +16369,25 @@
           </a:p>
           <a:p>
             <a:pPr lvl="1"/>
+            <a:endParaRPr lang="en-US" dirty="0">
+              <a:latin typeface="Avenir Book" panose="02000503020000020003" pitchFamily="2" charset="0"/>
+            </a:endParaRPr>
+          </a:p>
+          <a:p>
+            <a:r>
+              <a:rPr lang="en-US" dirty="0">
+                <a:latin typeface="Avenir Book" panose="02000503020000020003" pitchFamily="2" charset="0"/>
+              </a:rPr>
+              <a:t>Week 5</a:t>
+            </a:r>
+          </a:p>
+          <a:p>
+            <a:pPr lvl="1"/>
             <a:r>
               <a:rPr lang="en-US" dirty="0">
                 <a:latin typeface="Avenir Book" panose="02000503020000020003" pitchFamily="2" charset="0"/>
               </a:rPr>
               <a:t>Triggers</a:t>
-            </a:r>
-          </a:p>
-          <a:p>
-            <a:pPr lvl="1"/>
-            <a:endParaRPr lang="en-US" dirty="0">
-              <a:latin typeface="Avenir Book" panose="02000503020000020003" pitchFamily="2" charset="0"/>
-            </a:endParaRPr>
-          </a:p>
-          <a:p>
-            <a:r>
-              <a:rPr lang="en-US" dirty="0">
-                <a:latin typeface="Avenir Book" panose="02000503020000020003" pitchFamily="2" charset="0"/>
-              </a:rPr>
-              <a:t>Week 9</a:t>
             </a:r>
           </a:p>
           <a:p>
@@ -17170,7 +16466,7 @@
     </p:spTree>
     <p:extLst>
       <p:ext uri="{BB962C8B-B14F-4D97-AF65-F5344CB8AC3E}">
-        <p14:creationId xmlns:p14="http://schemas.microsoft.com/office/powerpoint/2010/main" val="2929310514"/>
+        <p14:creationId xmlns:p14="http://schemas.microsoft.com/office/powerpoint/2010/main" val="1345126142"/>
       </p:ext>
     </p:extLst>
   </p:cSld>
@@ -17181,6 +16477,422 @@
 </file>
 
 <file path=ppt/slides/slide2.xml><?xml version="1.0" encoding="utf-8"?>
+<p:sld xmlns:a="http://schemas.openxmlformats.org/drawingml/2006/main" xmlns:r="http://schemas.openxmlformats.org/officeDocument/2006/relationships" xmlns:p="http://schemas.openxmlformats.org/presentationml/2006/main">
+  <p:cSld>
+    <p:spTree>
+      <p:nvGrpSpPr>
+        <p:cNvPr id="1" name="Shape 137"/>
+        <p:cNvGrpSpPr/>
+        <p:nvPr/>
+      </p:nvGrpSpPr>
+      <p:grpSpPr>
+        <a:xfrm>
+          <a:off x="0" y="0"/>
+          <a:ext cx="0" cy="0"/>
+          <a:chOff x="0" y="0"/>
+          <a:chExt cx="0" cy="0"/>
+        </a:xfrm>
+      </p:grpSpPr>
+      <p:sp>
+        <p:nvSpPr>
+          <p:cNvPr id="138" name="Google Shape;138;p27"/>
+          <p:cNvSpPr txBox="1">
+            <a:spLocks noGrp="1"/>
+          </p:cNvSpPr>
+          <p:nvPr>
+            <p:ph type="ctrTitle"/>
+          </p:nvPr>
+        </p:nvSpPr>
+        <p:spPr>
+          <a:xfrm>
+            <a:off x="1801300" y="1805666"/>
+            <a:ext cx="5822400" cy="669384"/>
+          </a:xfrm>
+          <a:prstGeom prst="rect">
+            <a:avLst/>
+          </a:prstGeom>
+        </p:spPr>
+        <p:txBody>
+          <a:bodyPr spcFirstLastPara="1" wrap="square" lIns="68575" tIns="34275" rIns="68575" bIns="34275" anchor="b" anchorCtr="0">
+            <a:spAutoFit/>
+          </a:bodyPr>
+          <a:lstStyle/>
+          <a:p>
+            <a:pPr marL="0" lvl="0" indent="0" algn="l" rtl="0">
+              <a:lnSpc>
+                <a:spcPct val="100000"/>
+              </a:lnSpc>
+              <a:spcBef>
+                <a:spcPts val="0"/>
+              </a:spcBef>
+              <a:spcAft>
+                <a:spcPts val="0"/>
+              </a:spcAft>
+              <a:buNone/>
+            </a:pPr>
+            <a:r>
+              <a:rPr lang="en-US" sz="3900" dirty="0">
+                <a:solidFill>
+                  <a:srgbClr val="FCFCFC"/>
+                </a:solidFill>
+              </a:rPr>
+              <a:t>I</a:t>
+            </a:r>
+            <a:r>
+              <a:rPr lang="en" sz="3900" dirty="0" err="1">
+                <a:solidFill>
+                  <a:srgbClr val="FCFCFC"/>
+                </a:solidFill>
+              </a:rPr>
+              <a:t>ntroduction</a:t>
+            </a:r>
+            <a:r>
+              <a:rPr lang="en" sz="3900" dirty="0">
+                <a:solidFill>
+                  <a:srgbClr val="FCFCFC"/>
+                </a:solidFill>
+              </a:rPr>
+              <a:t> to SQL</a:t>
+            </a:r>
+            <a:endParaRPr sz="3900" dirty="0">
+              <a:solidFill>
+                <a:srgbClr val="FCFCFC"/>
+              </a:solidFill>
+            </a:endParaRPr>
+          </a:p>
+        </p:txBody>
+      </p:sp>
+      <p:sp>
+        <p:nvSpPr>
+          <p:cNvPr id="139" name="Google Shape;139;p27"/>
+          <p:cNvSpPr txBox="1"/>
+          <p:nvPr/>
+        </p:nvSpPr>
+        <p:spPr>
+          <a:xfrm>
+            <a:off x="1819925" y="499050"/>
+            <a:ext cx="7116900" cy="384900"/>
+          </a:xfrm>
+          <a:prstGeom prst="rect">
+            <a:avLst/>
+          </a:prstGeom>
+          <a:noFill/>
+          <a:ln>
+            <a:noFill/>
+          </a:ln>
+        </p:spPr>
+        <p:txBody>
+          <a:bodyPr spcFirstLastPara="1" wrap="square" lIns="91425" tIns="91425" rIns="91425" bIns="91425" anchor="t" anchorCtr="0">
+            <a:spAutoFit/>
+          </a:bodyPr>
+          <a:lstStyle/>
+          <a:p>
+            <a:pPr marL="0" lvl="0" indent="0" algn="l" rtl="0">
+              <a:spcBef>
+                <a:spcPts val="0"/>
+              </a:spcBef>
+              <a:spcAft>
+                <a:spcPts val="0"/>
+              </a:spcAft>
+              <a:buNone/>
+            </a:pPr>
+            <a:endParaRPr sz="1300" i="1">
+              <a:solidFill>
+                <a:srgbClr val="F1C232"/>
+              </a:solidFill>
+              <a:latin typeface="Lobster"/>
+              <a:ea typeface="Lobster"/>
+              <a:cs typeface="Lobster"/>
+              <a:sym typeface="Lobster"/>
+            </a:endParaRPr>
+          </a:p>
+        </p:txBody>
+      </p:sp>
+      <p:sp>
+        <p:nvSpPr>
+          <p:cNvPr id="140" name="Google Shape;140;p27"/>
+          <p:cNvSpPr txBox="1"/>
+          <p:nvPr/>
+        </p:nvSpPr>
+        <p:spPr>
+          <a:xfrm>
+            <a:off x="4289450" y="3754650"/>
+            <a:ext cx="4469100" cy="936000"/>
+          </a:xfrm>
+          <a:prstGeom prst="rect">
+            <a:avLst/>
+          </a:prstGeom>
+          <a:noFill/>
+          <a:ln>
+            <a:noFill/>
+          </a:ln>
+        </p:spPr>
+        <p:txBody>
+          <a:bodyPr spcFirstLastPara="1" wrap="square" lIns="64000" tIns="36575" rIns="64000" bIns="36575" anchor="t" anchorCtr="0">
+            <a:spAutoFit/>
+          </a:bodyPr>
+          <a:lstStyle/>
+          <a:p>
+            <a:pPr marL="0" lvl="0" indent="0" algn="l" rtl="0">
+              <a:spcBef>
+                <a:spcPts val="0"/>
+              </a:spcBef>
+              <a:spcAft>
+                <a:spcPts val="0"/>
+              </a:spcAft>
+              <a:buNone/>
+            </a:pPr>
+            <a:r>
+              <a:rPr lang="en-US" sz="1700" dirty="0">
+                <a:solidFill>
+                  <a:srgbClr val="FFFFFF"/>
+                </a:solidFill>
+                <a:latin typeface="Nunito Sans"/>
+                <a:ea typeface="Nunito Sans"/>
+                <a:cs typeface="Nunito Sans"/>
+                <a:sym typeface="Nunito Sans"/>
+              </a:rPr>
+              <a:t>Greg </a:t>
+            </a:r>
+            <a:r>
+              <a:rPr lang="en-US" sz="1700" dirty="0" err="1">
+                <a:solidFill>
+                  <a:srgbClr val="FFFFFF"/>
+                </a:solidFill>
+                <a:latin typeface="Nunito Sans"/>
+                <a:ea typeface="Nunito Sans"/>
+                <a:cs typeface="Nunito Sans"/>
+                <a:sym typeface="Nunito Sans"/>
+              </a:rPr>
+              <a:t>Janée</a:t>
+            </a:r>
+            <a:endParaRPr sz="1700" dirty="0">
+              <a:solidFill>
+                <a:srgbClr val="FFFFFF"/>
+              </a:solidFill>
+              <a:latin typeface="Nunito Sans"/>
+              <a:ea typeface="Nunito Sans"/>
+              <a:cs typeface="Nunito Sans"/>
+              <a:sym typeface="Nunito Sans"/>
+            </a:endParaRPr>
+          </a:p>
+          <a:p>
+            <a:pPr marL="0" lvl="0" indent="0" algn="l" rtl="0">
+              <a:spcBef>
+                <a:spcPts val="0"/>
+              </a:spcBef>
+              <a:spcAft>
+                <a:spcPts val="0"/>
+              </a:spcAft>
+              <a:buNone/>
+            </a:pPr>
+            <a:r>
+              <a:rPr lang="en" sz="1300" dirty="0">
+                <a:solidFill>
+                  <a:srgbClr val="FEBC11"/>
+                </a:solidFill>
+                <a:latin typeface="Nunito Sans"/>
+                <a:ea typeface="Nunito Sans"/>
+                <a:cs typeface="Nunito Sans"/>
+                <a:sym typeface="Nunito Sans"/>
+              </a:rPr>
+              <a:t>Research Data Services, UCSB Library</a:t>
+            </a:r>
+            <a:endParaRPr sz="1300" dirty="0">
+              <a:solidFill>
+                <a:srgbClr val="FEBC11"/>
+              </a:solidFill>
+              <a:latin typeface="Nunito Sans"/>
+              <a:ea typeface="Nunito Sans"/>
+              <a:cs typeface="Nunito Sans"/>
+              <a:sym typeface="Nunito Sans"/>
+            </a:endParaRPr>
+          </a:p>
+          <a:p>
+            <a:pPr marL="0" lvl="0" indent="0" algn="l" rtl="0">
+              <a:spcBef>
+                <a:spcPts val="0"/>
+              </a:spcBef>
+              <a:spcAft>
+                <a:spcPts val="0"/>
+              </a:spcAft>
+              <a:buNone/>
+            </a:pPr>
+            <a:r>
+              <a:rPr lang="en" sz="1300" dirty="0" err="1">
+                <a:solidFill>
+                  <a:srgbClr val="FEBC11"/>
+                </a:solidFill>
+                <a:latin typeface="Nunito Sans"/>
+                <a:ea typeface="Nunito Sans"/>
+                <a:cs typeface="Nunito Sans"/>
+                <a:sym typeface="Nunito Sans"/>
+              </a:rPr>
+              <a:t>rds@library.ucsb.edu</a:t>
+            </a:r>
+            <a:endParaRPr sz="1300" dirty="0">
+              <a:solidFill>
+                <a:srgbClr val="FEBC11"/>
+              </a:solidFill>
+              <a:latin typeface="Nunito Sans"/>
+              <a:ea typeface="Nunito Sans"/>
+              <a:cs typeface="Nunito Sans"/>
+              <a:sym typeface="Nunito Sans"/>
+            </a:endParaRPr>
+          </a:p>
+          <a:p>
+            <a:pPr marL="0" lvl="0" indent="0" algn="l" rtl="0">
+              <a:spcBef>
+                <a:spcPts val="0"/>
+              </a:spcBef>
+              <a:spcAft>
+                <a:spcPts val="0"/>
+              </a:spcAft>
+              <a:buNone/>
+            </a:pPr>
+            <a:endParaRPr sz="1300" dirty="0">
+              <a:solidFill>
+                <a:srgbClr val="FEBC11"/>
+              </a:solidFill>
+              <a:latin typeface="Century Gothic"/>
+              <a:ea typeface="Century Gothic"/>
+              <a:cs typeface="Century Gothic"/>
+              <a:sym typeface="Century Gothic"/>
+            </a:endParaRPr>
+          </a:p>
+        </p:txBody>
+      </p:sp>
+      <p:sp>
+        <p:nvSpPr>
+          <p:cNvPr id="141" name="Google Shape;141;p27"/>
+          <p:cNvSpPr txBox="1"/>
+          <p:nvPr/>
+        </p:nvSpPr>
+        <p:spPr>
+          <a:xfrm>
+            <a:off x="200025" y="247650"/>
+            <a:ext cx="7116900" cy="846600"/>
+          </a:xfrm>
+          <a:prstGeom prst="rect">
+            <a:avLst/>
+          </a:prstGeom>
+          <a:noFill/>
+          <a:ln>
+            <a:noFill/>
+          </a:ln>
+        </p:spPr>
+        <p:txBody>
+          <a:bodyPr spcFirstLastPara="1" wrap="square" lIns="91425" tIns="91425" rIns="91425" bIns="91425" anchor="t" anchorCtr="0">
+            <a:spAutoFit/>
+          </a:bodyPr>
+          <a:lstStyle/>
+          <a:p>
+            <a:pPr marL="0" lvl="0" indent="0" algn="l" rtl="0">
+              <a:spcBef>
+                <a:spcPts val="0"/>
+              </a:spcBef>
+              <a:spcAft>
+                <a:spcPts val="0"/>
+              </a:spcAft>
+              <a:buNone/>
+            </a:pPr>
+            <a:r>
+              <a:rPr lang="en" sz="1500" b="1" dirty="0">
+                <a:solidFill>
+                  <a:schemeClr val="lt2"/>
+                </a:solidFill>
+                <a:latin typeface="Nunito Sans"/>
+                <a:ea typeface="Nunito Sans"/>
+                <a:cs typeface="Nunito Sans"/>
+                <a:sym typeface="Nunito Sans"/>
+              </a:rPr>
+              <a:t>EDS213 - Databases &amp; Data Management</a:t>
+            </a:r>
+            <a:endParaRPr sz="1500" b="1" dirty="0">
+              <a:solidFill>
+                <a:schemeClr val="lt2"/>
+              </a:solidFill>
+              <a:latin typeface="Nunito Sans"/>
+              <a:ea typeface="Nunito Sans"/>
+              <a:cs typeface="Nunito Sans"/>
+              <a:sym typeface="Nunito Sans"/>
+            </a:endParaRPr>
+          </a:p>
+          <a:p>
+            <a:pPr marL="0" lvl="0" indent="0" algn="l" rtl="0">
+              <a:spcBef>
+                <a:spcPts val="0"/>
+              </a:spcBef>
+              <a:spcAft>
+                <a:spcPts val="0"/>
+              </a:spcAft>
+              <a:buNone/>
+            </a:pPr>
+            <a:r>
+              <a:rPr lang="en" sz="1500" b="1" dirty="0">
+                <a:solidFill>
+                  <a:schemeClr val="lt2"/>
+                </a:solidFill>
+                <a:latin typeface="Nunito Sans"/>
+                <a:ea typeface="Nunito Sans"/>
+                <a:cs typeface="Nunito Sans"/>
+                <a:sym typeface="Nunito Sans"/>
+              </a:rPr>
+              <a:t>Week </a:t>
+            </a:r>
+            <a:r>
+              <a:rPr lang="en-US" sz="1500" b="1" dirty="0">
+                <a:solidFill>
+                  <a:schemeClr val="lt2"/>
+                </a:solidFill>
+                <a:latin typeface="Nunito Sans"/>
+                <a:ea typeface="Nunito Sans"/>
+                <a:cs typeface="Nunito Sans"/>
+                <a:sym typeface="Nunito Sans"/>
+              </a:rPr>
+              <a:t>3</a:t>
+            </a:r>
+            <a:endParaRPr sz="1500" b="1" dirty="0">
+              <a:solidFill>
+                <a:schemeClr val="lt2"/>
+              </a:solidFill>
+              <a:latin typeface="Nunito Sans"/>
+              <a:ea typeface="Nunito Sans"/>
+              <a:cs typeface="Nunito Sans"/>
+              <a:sym typeface="Nunito Sans"/>
+            </a:endParaRPr>
+          </a:p>
+          <a:p>
+            <a:pPr marL="0" lvl="0" indent="0" algn="l" rtl="0">
+              <a:spcBef>
+                <a:spcPts val="0"/>
+              </a:spcBef>
+              <a:spcAft>
+                <a:spcPts val="0"/>
+              </a:spcAft>
+              <a:buNone/>
+            </a:pPr>
+            <a:endParaRPr sz="1300" i="1" dirty="0">
+              <a:solidFill>
+                <a:srgbClr val="F1C232"/>
+              </a:solidFill>
+              <a:latin typeface="Lobster"/>
+              <a:ea typeface="Lobster"/>
+              <a:cs typeface="Lobster"/>
+              <a:sym typeface="Lobster"/>
+            </a:endParaRPr>
+          </a:p>
+        </p:txBody>
+      </p:sp>
+    </p:spTree>
+  </p:cSld>
+  <p:clrMapOvr>
+    <a:masterClrMapping/>
+  </p:clrMapOvr>
+</p:sld>
+</file>
+
+<file path=ppt/slides/slide3.xml><?xml version="1.0" encoding="utf-8"?>
 <p:sld xmlns:a="http://schemas.openxmlformats.org/drawingml/2006/main" xmlns:r="http://schemas.openxmlformats.org/officeDocument/2006/relationships" xmlns:p="http://schemas.openxmlformats.org/presentationml/2006/main">
   <p:cSld>
     <p:spTree>
@@ -17254,7 +16966,7 @@
           <a:p>
             <a:r>
               <a:rPr lang="en-US" dirty="0"/>
-              <a:t>Understand how SQLite differs from client/server databases</a:t>
+              <a:t>Understand how local databases differ from client/server databases</a:t>
             </a:r>
           </a:p>
           <a:p>
@@ -17303,7 +17015,7 @@
             </a:pPr>
             <a:fld id="{00000000-1234-1234-1234-123412341234}" type="slidenum">
               <a:rPr lang="en" smtClean="0"/>
-              <a:t>2</a:t>
+              <a:t>3</a:t>
             </a:fld>
             <a:endParaRPr lang="en" dirty="0"/>
           </a:p>
@@ -17317,7 +17029,7 @@
 </p:sld>
 </file>
 
-<file path=ppt/slides/slide3.xml><?xml version="1.0" encoding="utf-8"?>
+<file path=ppt/slides/slide4.xml><?xml version="1.0" encoding="utf-8"?>
 <p:sld xmlns:a="http://schemas.openxmlformats.org/drawingml/2006/main" xmlns:r="http://schemas.openxmlformats.org/officeDocument/2006/relationships" xmlns:p="http://schemas.openxmlformats.org/presentationml/2006/main">
   <p:cSld>
     <p:spTree>
@@ -17455,7 +17167,7 @@
             </a:pPr>
             <a:fld id="{00000000-1234-1234-1234-123412341234}" type="slidenum">
               <a:rPr lang="en" smtClean="0"/>
-              <a:t>3</a:t>
+              <a:t>4</a:t>
             </a:fld>
             <a:endParaRPr lang="en" dirty="0"/>
           </a:p>
@@ -17474,7 +17186,158 @@
 </p:sld>
 </file>
 
-<file path=ppt/slides/slide4.xml><?xml version="1.0" encoding="utf-8"?>
+<file path=ppt/slides/slide5.xml><?xml version="1.0" encoding="utf-8"?>
+<p:sld xmlns:a="http://schemas.openxmlformats.org/drawingml/2006/main" xmlns:r="http://schemas.openxmlformats.org/officeDocument/2006/relationships" xmlns:p="http://schemas.openxmlformats.org/presentationml/2006/main">
+  <p:cSld>
+    <p:spTree>
+      <p:nvGrpSpPr>
+        <p:cNvPr id="1" name=""/>
+        <p:cNvGrpSpPr/>
+        <p:nvPr/>
+      </p:nvGrpSpPr>
+      <p:grpSpPr>
+        <a:xfrm>
+          <a:off x="0" y="0"/>
+          <a:ext cx="0" cy="0"/>
+          <a:chOff x="0" y="0"/>
+          <a:chExt cx="0" cy="0"/>
+        </a:xfrm>
+      </p:grpSpPr>
+      <p:sp>
+        <p:nvSpPr>
+          <p:cNvPr id="2" name="Title 1">
+            <a:extLst>
+              <a:ext uri="{FF2B5EF4-FFF2-40B4-BE49-F238E27FC236}">
+                <a16:creationId xmlns:a16="http://schemas.microsoft.com/office/drawing/2014/main" id="{9DB64351-6E83-9234-4859-236F6C357363}"/>
+              </a:ext>
+            </a:extLst>
+          </p:cNvPr>
+          <p:cNvSpPr>
+            <a:spLocks noGrp="1"/>
+          </p:cNvSpPr>
+          <p:nvPr>
+            <p:ph type="title"/>
+          </p:nvPr>
+        </p:nvSpPr>
+        <p:spPr/>
+        <p:txBody>
+          <a:bodyPr/>
+          <a:lstStyle/>
+          <a:p>
+            <a:r>
+              <a:rPr lang="en-US" dirty="0"/>
+              <a:t>Homework answer</a:t>
+            </a:r>
+          </a:p>
+        </p:txBody>
+      </p:sp>
+      <p:sp>
+        <p:nvSpPr>
+          <p:cNvPr id="3" name="Text Placeholder 2">
+            <a:extLst>
+              <a:ext uri="{FF2B5EF4-FFF2-40B4-BE49-F238E27FC236}">
+                <a16:creationId xmlns:a16="http://schemas.microsoft.com/office/drawing/2014/main" id="{5410EFCE-8B20-519F-B33B-5DC35F362F82}"/>
+              </a:ext>
+            </a:extLst>
+          </p:cNvPr>
+          <p:cNvSpPr>
+            <a:spLocks noGrp="1"/>
+          </p:cNvSpPr>
+          <p:nvPr>
+            <p:ph type="body" idx="1"/>
+          </p:nvPr>
+        </p:nvSpPr>
+        <p:spPr/>
+        <p:txBody>
+          <a:bodyPr/>
+          <a:lstStyle/>
+          <a:p>
+            <a:endParaRPr lang="en-US"/>
+          </a:p>
+        </p:txBody>
+      </p:sp>
+      <p:sp>
+        <p:nvSpPr>
+          <p:cNvPr id="4" name="Slide Number Placeholder 3">
+            <a:extLst>
+              <a:ext uri="{FF2B5EF4-FFF2-40B4-BE49-F238E27FC236}">
+                <a16:creationId xmlns:a16="http://schemas.microsoft.com/office/drawing/2014/main" id="{F50187C7-4764-37F3-A9AC-DCFA68ACA6D6}"/>
+              </a:ext>
+            </a:extLst>
+          </p:cNvPr>
+          <p:cNvSpPr>
+            <a:spLocks noGrp="1"/>
+          </p:cNvSpPr>
+          <p:nvPr>
+            <p:ph type="sldNum" idx="12"/>
+          </p:nvPr>
+        </p:nvSpPr>
+        <p:spPr/>
+        <p:txBody>
+          <a:bodyPr/>
+          <a:lstStyle/>
+          <a:p>
+            <a:pPr marL="0" lvl="0" indent="0" algn="r" rtl="0">
+              <a:spcBef>
+                <a:spcPts val="0"/>
+              </a:spcBef>
+              <a:spcAft>
+                <a:spcPts val="0"/>
+              </a:spcAft>
+              <a:buNone/>
+            </a:pPr>
+            <a:fld id="{00000000-1234-1234-1234-123412341234}" type="slidenum">
+              <a:rPr lang="en" smtClean="0"/>
+              <a:t>5</a:t>
+            </a:fld>
+            <a:endParaRPr lang="en" dirty="0"/>
+          </a:p>
+        </p:txBody>
+      </p:sp>
+      <p:pic>
+        <p:nvPicPr>
+          <p:cNvPr id="6" name="Picture 5" descr="A screenshot of a computer&#10;&#10;Description automatically generated">
+            <a:extLst>
+              <a:ext uri="{FF2B5EF4-FFF2-40B4-BE49-F238E27FC236}">
+                <a16:creationId xmlns:a16="http://schemas.microsoft.com/office/drawing/2014/main" id="{A1FDED27-6EFA-13BB-1C05-07CF6B6D83E1}"/>
+              </a:ext>
+            </a:extLst>
+          </p:cNvPr>
+          <p:cNvPicPr>
+            <a:picLocks noChangeAspect="1"/>
+          </p:cNvPicPr>
+          <p:nvPr/>
+        </p:nvPicPr>
+        <p:blipFill>
+          <a:blip r:embed="rId2"/>
+          <a:stretch>
+            <a:fillRect/>
+          </a:stretch>
+        </p:blipFill>
+        <p:spPr>
+          <a:xfrm>
+            <a:off x="255711" y="1152475"/>
+            <a:ext cx="8632578" cy="3510742"/>
+          </a:xfrm>
+          <a:prstGeom prst="rect">
+            <a:avLst/>
+          </a:prstGeom>
+        </p:spPr>
+      </p:pic>
+    </p:spTree>
+    <p:extLst>
+      <p:ext uri="{BB962C8B-B14F-4D97-AF65-F5344CB8AC3E}">
+        <p14:creationId xmlns:p14="http://schemas.microsoft.com/office/powerpoint/2010/main" val="3465795364"/>
+      </p:ext>
+    </p:extLst>
+  </p:cSld>
+  <p:clrMapOvr>
+    <a:masterClrMapping/>
+  </p:clrMapOvr>
+</p:sld>
+</file>
+
+<file path=ppt/slides/slide6.xml><?xml version="1.0" encoding="utf-8"?>
 <p:sld xmlns:a="http://schemas.openxmlformats.org/drawingml/2006/main" xmlns:r="http://schemas.openxmlformats.org/officeDocument/2006/relationships" xmlns:p="http://schemas.openxmlformats.org/presentationml/2006/main">
   <p:cSld>
     <p:spTree>
@@ -17600,18 +17463,15 @@
                 <a:latin typeface="Courier New" panose="02070309020205020404" pitchFamily="49" charset="0"/>
                 <a:cs typeface="Courier New" panose="02070309020205020404" pitchFamily="49" charset="0"/>
               </a:rPr>
-              <a:t>    Date TEXT NOT NULL, </a:t>
+              <a:t>    Date DATE NOT NULL,</a:t>
             </a:r>
-            <a:r>
-              <a:rPr lang="en-US" dirty="0">
-                <a:solidFill>
-                  <a:schemeClr val="accent5"/>
-                </a:solidFill>
-                <a:latin typeface="Courier New" panose="02070309020205020404" pitchFamily="49" charset="0"/>
-                <a:cs typeface="Courier New" panose="02070309020205020404" pitchFamily="49" charset="0"/>
-              </a:rPr>
-              <a:t>-- sadly, SQLite lacks a true date data type</a:t>
-            </a:r>
+            <a:endParaRPr lang="en-US" dirty="0">
+              <a:solidFill>
+                <a:schemeClr val="accent5"/>
+              </a:solidFill>
+              <a:latin typeface="Courier New" panose="02070309020205020404" pitchFamily="49" charset="0"/>
+              <a:cs typeface="Courier New" panose="02070309020205020404" pitchFamily="49" charset="0"/>
+            </a:endParaRPr>
           </a:p>
           <a:p>
             <a:pPr marL="114300" indent="0">
@@ -18005,7 +17865,7 @@
             </a:pPr>
             <a:fld id="{00000000-1234-1234-1234-123412341234}" type="slidenum">
               <a:rPr lang="en" smtClean="0"/>
-              <a:t>4</a:t>
+              <a:t>6</a:t>
             </a:fld>
             <a:endParaRPr lang="en" dirty="0"/>
           </a:p>
@@ -18024,7 +17884,7 @@
 </p:sld>
 </file>
 
-<file path=ppt/slides/slide5.xml><?xml version="1.0" encoding="utf-8"?>
+<file path=ppt/slides/slide7.xml><?xml version="1.0" encoding="utf-8"?>
 <p:sld xmlns:a="http://schemas.openxmlformats.org/drawingml/2006/main" xmlns:r="http://schemas.openxmlformats.org/officeDocument/2006/relationships" xmlns:p="http://schemas.openxmlformats.org/presentationml/2006/main">
   <p:cSld>
     <p:spTree>
@@ -18129,7 +17989,7 @@
             </a:pPr>
             <a:fld id="{00000000-1234-1234-1234-123412341234}" type="slidenum">
               <a:rPr lang="en" smtClean="0"/>
-              <a:t>5</a:t>
+              <a:t>7</a:t>
             </a:fld>
             <a:endParaRPr lang="en" dirty="0"/>
           </a:p>
@@ -18148,7 +18008,7 @@
 </p:sld>
 </file>
 
-<file path=ppt/slides/slide6.xml><?xml version="1.0" encoding="utf-8"?>
+<file path=ppt/slides/slide8.xml><?xml version="1.0" encoding="utf-8"?>
 <p:sld xmlns:a="http://schemas.openxmlformats.org/drawingml/2006/main" xmlns:r="http://schemas.openxmlformats.org/officeDocument/2006/relationships" xmlns:p="http://schemas.openxmlformats.org/presentationml/2006/main">
   <p:cSld>
     <p:spTree>
@@ -18234,16 +18094,37 @@
               <a:rPr lang="en-US" dirty="0">
                 <a:latin typeface="Avenir Book" panose="02000503020000020003" pitchFamily="2" charset="0"/>
               </a:rPr>
-              <a:t>Extensions: statements, functions, data types</a:t>
+              <a:t>The </a:t>
             </a:r>
-          </a:p>
-          <a:p>
-            <a:pPr lvl="1"/>
+            <a:r>
+              <a:rPr lang="en-US" b="1" i="1" dirty="0">
+                <a:latin typeface="Avenir Book" panose="02000503020000020003" pitchFamily="2" charset="0"/>
+              </a:rPr>
+              <a:t>only</a:t>
+            </a:r>
             <a:r>
               <a:rPr lang="en-US" dirty="0">
                 <a:latin typeface="Avenir Book" panose="02000503020000020003" pitchFamily="2" charset="0"/>
               </a:rPr>
-              <a:t>The only thing that is standardized</a:t>
+              <a:t> thing that is standardized</a:t>
+            </a:r>
+          </a:p>
+          <a:p>
+            <a:pPr lvl="2"/>
+            <a:r>
+              <a:rPr lang="en-US" dirty="0">
+                <a:latin typeface="Avenir Book" panose="02000503020000020003" pitchFamily="2" charset="0"/>
+              </a:rPr>
+              <a:t>Variations in what is supported and how</a:t>
+            </a:r>
+          </a:p>
+          <a:p>
+            <a:pPr lvl="2"/>
+            <a:r>
+              <a:rPr lang="en-US" dirty="0">
+                <a:latin typeface="Avenir Book" panose="02000503020000020003" pitchFamily="2" charset="0"/>
+              </a:rPr>
+              <a:t>Extensions: statements, functions, data types</a:t>
             </a:r>
           </a:p>
           <a:p>
@@ -18313,7 +18194,7 @@
             </a:pPr>
             <a:fld id="{00000000-1234-1234-1234-123412341234}" type="slidenum">
               <a:rPr lang="en" smtClean="0"/>
-              <a:t>6</a:t>
+              <a:t>8</a:t>
             </a:fld>
             <a:endParaRPr lang="en" dirty="0"/>
           </a:p>
@@ -18332,7 +18213,7 @@
 </p:sld>
 </file>
 
-<file path=ppt/slides/slide7.xml><?xml version="1.0" encoding="utf-8"?>
+<file path=ppt/slides/slide9.xml><?xml version="1.0" encoding="utf-8"?>
 <p:sld xmlns:a="http://schemas.openxmlformats.org/drawingml/2006/main" xmlns:r="http://schemas.openxmlformats.org/officeDocument/2006/relationships" xmlns:p="http://schemas.openxmlformats.org/presentationml/2006/main">
   <p:cSld>
     <p:spTree>
@@ -18456,7 +18337,7 @@
             </a:pPr>
             <a:fld id="{00000000-1234-1234-1234-123412341234}" type="slidenum">
               <a:rPr lang="en" smtClean="0"/>
-              <a:t>7</a:t>
+              <a:t>9</a:t>
             </a:fld>
             <a:endParaRPr lang="en" dirty="0"/>
           </a:p>
@@ -19184,587 +19065,6 @@
     <p:extLst>
       <p:ext uri="{BB962C8B-B14F-4D97-AF65-F5344CB8AC3E}">
         <p14:creationId xmlns:p14="http://schemas.microsoft.com/office/powerpoint/2010/main" val="273315678"/>
-      </p:ext>
-    </p:extLst>
-  </p:cSld>
-  <p:clrMapOvr>
-    <a:masterClrMapping/>
-  </p:clrMapOvr>
-</p:sld>
-</file>
-
-<file path=ppt/slides/slide8.xml><?xml version="1.0" encoding="utf-8"?>
-<p:sld xmlns:a="http://schemas.openxmlformats.org/drawingml/2006/main" xmlns:r="http://schemas.openxmlformats.org/officeDocument/2006/relationships" xmlns:p="http://schemas.openxmlformats.org/presentationml/2006/main">
-  <p:cSld>
-    <p:spTree>
-      <p:nvGrpSpPr>
-        <p:cNvPr id="1" name=""/>
-        <p:cNvGrpSpPr/>
-        <p:nvPr/>
-      </p:nvGrpSpPr>
-      <p:grpSpPr>
-        <a:xfrm>
-          <a:off x="0" y="0"/>
-          <a:ext cx="0" cy="0"/>
-          <a:chOff x="0" y="0"/>
-          <a:chExt cx="0" cy="0"/>
-        </a:xfrm>
-      </p:grpSpPr>
-      <p:sp>
-        <p:nvSpPr>
-          <p:cNvPr id="2" name="Title 1">
-            <a:extLst>
-              <a:ext uri="{FF2B5EF4-FFF2-40B4-BE49-F238E27FC236}">
-                <a16:creationId xmlns:a16="http://schemas.microsoft.com/office/drawing/2014/main" id="{3983CC3A-88D2-560B-B5EE-EC61D5A52242}"/>
-              </a:ext>
-            </a:extLst>
-          </p:cNvPr>
-          <p:cNvSpPr>
-            <a:spLocks noGrp="1"/>
-          </p:cNvSpPr>
-          <p:nvPr>
-            <p:ph type="title"/>
-          </p:nvPr>
-        </p:nvSpPr>
-        <p:spPr/>
-        <p:txBody>
-          <a:bodyPr>
-            <a:noAutofit/>
-          </a:bodyPr>
-          <a:lstStyle/>
-          <a:p>
-            <a:r>
-              <a:rPr lang="en-US" sz="3200" dirty="0">
-                <a:solidFill>
-                  <a:srgbClr val="004B83"/>
-                </a:solidFill>
-              </a:rPr>
-              <a:t>SQLite vs client/server databases</a:t>
-            </a:r>
-          </a:p>
-        </p:txBody>
-      </p:sp>
-      <p:sp>
-        <p:nvSpPr>
-          <p:cNvPr id="3" name="Text Placeholder 2">
-            <a:extLst>
-              <a:ext uri="{FF2B5EF4-FFF2-40B4-BE49-F238E27FC236}">
-                <a16:creationId xmlns:a16="http://schemas.microsoft.com/office/drawing/2014/main" id="{F193F1C7-E077-68D2-7E2A-8BAB71A382D9}"/>
-              </a:ext>
-            </a:extLst>
-          </p:cNvPr>
-          <p:cNvSpPr>
-            <a:spLocks noGrp="1"/>
-          </p:cNvSpPr>
-          <p:nvPr>
-            <p:ph type="body" idx="1"/>
-          </p:nvPr>
-        </p:nvSpPr>
-        <p:spPr>
-          <a:xfrm>
-            <a:off x="311700" y="1160224"/>
-            <a:ext cx="3999900" cy="3416400"/>
-          </a:xfrm>
-        </p:spPr>
-        <p:txBody>
-          <a:bodyPr>
-            <a:normAutofit/>
-          </a:bodyPr>
-          <a:lstStyle/>
-          <a:p>
-            <a:pPr marL="139700" indent="0">
-              <a:buNone/>
-            </a:pPr>
-            <a:r>
-              <a:rPr lang="en-US" b="1" u="sng" dirty="0">
-                <a:latin typeface="Avenir Book" panose="02000503020000020003" pitchFamily="2" charset="0"/>
-              </a:rPr>
-              <a:t>SQLite</a:t>
-            </a:r>
-            <a:br>
-              <a:rPr lang="en-US" b="1" u="sng" dirty="0">
-                <a:latin typeface="Avenir Book" panose="02000503020000020003" pitchFamily="2" charset="0"/>
-              </a:rPr>
-            </a:br>
-            <a:endParaRPr lang="en-US" b="1" u="sng" dirty="0">
-              <a:latin typeface="Avenir Book" panose="02000503020000020003" pitchFamily="2" charset="0"/>
-            </a:endParaRPr>
-          </a:p>
-          <a:p>
-            <a:r>
-              <a:rPr lang="en-US" dirty="0">
-                <a:latin typeface="Avenir Book" panose="02000503020000020003" pitchFamily="2" charset="0"/>
-              </a:rPr>
-              <a:t>Access</a:t>
-            </a:r>
-          </a:p>
-          <a:p>
-            <a:pPr lvl="1"/>
-            <a:r>
-              <a:rPr lang="en-US" dirty="0">
-                <a:latin typeface="Avenir Book" panose="02000503020000020003" pitchFamily="2" charset="0"/>
-              </a:rPr>
-              <a:t>Runs in your process via library</a:t>
-            </a:r>
-          </a:p>
-          <a:p>
-            <a:r>
-              <a:rPr lang="en-US" dirty="0">
-                <a:latin typeface="Avenir Book" panose="02000503020000020003" pitchFamily="2" charset="0"/>
-              </a:rPr>
-              <a:t>Support for SQL standard</a:t>
-            </a:r>
-          </a:p>
-          <a:p>
-            <a:pPr lvl="1"/>
-            <a:r>
-              <a:rPr lang="en-US" dirty="0">
-                <a:latin typeface="Avenir Book" panose="02000503020000020003" pitchFamily="2" charset="0"/>
-              </a:rPr>
-              <a:t>Essentials there, but many pieces missing</a:t>
-            </a:r>
-          </a:p>
-          <a:p>
-            <a:r>
-              <a:rPr lang="en-US" dirty="0">
-                <a:latin typeface="Avenir Book" panose="02000503020000020003" pitchFamily="2" charset="0"/>
-              </a:rPr>
-              <a:t>Constraint &amp; type checking</a:t>
-            </a:r>
-          </a:p>
-          <a:p>
-            <a:pPr lvl="1"/>
-            <a:r>
-              <a:rPr lang="en-US" dirty="0">
-                <a:latin typeface="Avenir Book" panose="02000503020000020003" pitchFamily="2" charset="0"/>
-              </a:rPr>
-              <a:t>Weak to nil</a:t>
-            </a:r>
-          </a:p>
-          <a:p>
-            <a:r>
-              <a:rPr lang="en-US" dirty="0">
-                <a:latin typeface="Avenir Book" panose="02000503020000020003" pitchFamily="2" charset="0"/>
-              </a:rPr>
-              <a:t>Data types</a:t>
-            </a:r>
-          </a:p>
-          <a:p>
-            <a:pPr lvl="1"/>
-            <a:r>
-              <a:rPr lang="en-US" dirty="0">
-                <a:latin typeface="Avenir Book" panose="02000503020000020003" pitchFamily="2" charset="0"/>
-              </a:rPr>
-              <a:t>Primitive</a:t>
-            </a:r>
-          </a:p>
-          <a:p>
-            <a:r>
-              <a:rPr lang="en-US" dirty="0">
-                <a:latin typeface="Avenir Book" panose="02000503020000020003" pitchFamily="2" charset="0"/>
-              </a:rPr>
-              <a:t>Installation &amp; management</a:t>
-            </a:r>
-          </a:p>
-          <a:p>
-            <a:pPr lvl="1"/>
-            <a:r>
-              <a:rPr lang="en-US" dirty="0">
-                <a:latin typeface="Avenir Book" panose="02000503020000020003" pitchFamily="2" charset="0"/>
-              </a:rPr>
-              <a:t>Super easy; nil</a:t>
-            </a:r>
-          </a:p>
-          <a:p>
-            <a:r>
-              <a:rPr lang="en-US" dirty="0">
-                <a:latin typeface="Avenir Book" panose="02000503020000020003" pitchFamily="2" charset="0"/>
-              </a:rPr>
-              <a:t>Data portability</a:t>
-            </a:r>
-          </a:p>
-          <a:p>
-            <a:pPr lvl="1"/>
-            <a:r>
-              <a:rPr lang="en-US" dirty="0">
-                <a:latin typeface="Avenir Book" panose="02000503020000020003" pitchFamily="2" charset="0"/>
-              </a:rPr>
-              <a:t>Great</a:t>
-            </a:r>
-          </a:p>
-          <a:p>
-            <a:endParaRPr lang="en-US" dirty="0">
-              <a:latin typeface="Avenir Book" panose="02000503020000020003" pitchFamily="2" charset="0"/>
-            </a:endParaRPr>
-          </a:p>
-        </p:txBody>
-      </p:sp>
-      <p:sp>
-        <p:nvSpPr>
-          <p:cNvPr id="5" name="Text Placeholder 4">
-            <a:extLst>
-              <a:ext uri="{FF2B5EF4-FFF2-40B4-BE49-F238E27FC236}">
-                <a16:creationId xmlns:a16="http://schemas.microsoft.com/office/drawing/2014/main" id="{2C0BF0BB-D4A5-F8CB-F94E-192EFE9AF1EC}"/>
-              </a:ext>
-            </a:extLst>
-          </p:cNvPr>
-          <p:cNvSpPr>
-            <a:spLocks noGrp="1"/>
-          </p:cNvSpPr>
-          <p:nvPr>
-            <p:ph type="body" idx="2"/>
-          </p:nvPr>
-        </p:nvSpPr>
-        <p:spPr/>
-        <p:txBody>
-          <a:bodyPr>
-            <a:normAutofit/>
-          </a:bodyPr>
-          <a:lstStyle/>
-          <a:p>
-            <a:pPr marL="139700" indent="0">
-              <a:buNone/>
-            </a:pPr>
-            <a:r>
-              <a:rPr lang="en-US" b="1" u="sng" dirty="0">
-                <a:latin typeface="Avenir Book" panose="02000503020000020003" pitchFamily="2" charset="0"/>
-              </a:rPr>
-              <a:t>Client/server RDBMS (Oracle, SQL Server, PostgreSQL, MySQL, …)</a:t>
-            </a:r>
-          </a:p>
-          <a:p>
-            <a:r>
-              <a:rPr lang="en-US" dirty="0">
-                <a:latin typeface="Avenir Book" panose="02000503020000020003" pitchFamily="2" charset="0"/>
-              </a:rPr>
-              <a:t>Access</a:t>
-            </a:r>
-          </a:p>
-          <a:p>
-            <a:pPr lvl="1"/>
-            <a:r>
-              <a:rPr lang="en-US" dirty="0">
-                <a:latin typeface="Avenir Book" panose="02000503020000020003" pitchFamily="2" charset="0"/>
-              </a:rPr>
-              <a:t>Over network (even on same machine)</a:t>
-            </a:r>
-          </a:p>
-          <a:p>
-            <a:r>
-              <a:rPr lang="en-US" dirty="0">
-                <a:latin typeface="Avenir Book" panose="02000503020000020003" pitchFamily="2" charset="0"/>
-              </a:rPr>
-              <a:t>Support for SQL standard</a:t>
-            </a:r>
-          </a:p>
-          <a:p>
-            <a:pPr lvl="1"/>
-            <a:r>
-              <a:rPr lang="en-US" dirty="0">
-                <a:latin typeface="Avenir Book" panose="02000503020000020003" pitchFamily="2" charset="0"/>
-              </a:rPr>
-              <a:t>Very good</a:t>
-            </a:r>
-          </a:p>
-          <a:p>
-            <a:r>
-              <a:rPr lang="en-US" dirty="0">
-                <a:latin typeface="Avenir Book" panose="02000503020000020003" pitchFamily="2" charset="0"/>
-              </a:rPr>
-              <a:t>Constraint &amp; type checking</a:t>
-            </a:r>
-          </a:p>
-          <a:p>
-            <a:pPr lvl="1"/>
-            <a:r>
-              <a:rPr lang="en-US" dirty="0">
-                <a:latin typeface="Avenir Book" panose="02000503020000020003" pitchFamily="2" charset="0"/>
-              </a:rPr>
-              <a:t>Rigorous</a:t>
-            </a:r>
-          </a:p>
-          <a:p>
-            <a:r>
-              <a:rPr lang="en-US" dirty="0">
-                <a:latin typeface="Avenir Book" panose="02000503020000020003" pitchFamily="2" charset="0"/>
-              </a:rPr>
-              <a:t>Data types</a:t>
-            </a:r>
-          </a:p>
-          <a:p>
-            <a:pPr lvl="1"/>
-            <a:r>
-              <a:rPr lang="en-US" dirty="0">
-                <a:latin typeface="Avenir Book" panose="02000503020000020003" pitchFamily="2" charset="0"/>
-              </a:rPr>
-              <a:t>Lots</a:t>
-            </a:r>
-          </a:p>
-          <a:p>
-            <a:r>
-              <a:rPr lang="en-US" dirty="0">
-                <a:latin typeface="Avenir Book" panose="02000503020000020003" pitchFamily="2" charset="0"/>
-              </a:rPr>
-              <a:t>Installation &amp; management</a:t>
-            </a:r>
-          </a:p>
-          <a:p>
-            <a:pPr lvl="1"/>
-            <a:r>
-              <a:rPr lang="en-US" dirty="0">
-                <a:latin typeface="Avenir Book" panose="02000503020000020003" pitchFamily="2" charset="0"/>
-              </a:rPr>
-              <a:t>Ouch; obscure</a:t>
-            </a:r>
-          </a:p>
-          <a:p>
-            <a:r>
-              <a:rPr lang="en-US" dirty="0">
-                <a:latin typeface="Avenir Book" panose="02000503020000020003" pitchFamily="2" charset="0"/>
-              </a:rPr>
-              <a:t>Data portability</a:t>
-            </a:r>
-          </a:p>
-          <a:p>
-            <a:pPr lvl="1"/>
-            <a:r>
-              <a:rPr lang="en-US" dirty="0">
-                <a:latin typeface="Avenir Book" panose="02000503020000020003" pitchFamily="2" charset="0"/>
-              </a:rPr>
-              <a:t>Weak to nil</a:t>
-            </a:r>
-          </a:p>
-        </p:txBody>
-      </p:sp>
-      <p:sp>
-        <p:nvSpPr>
-          <p:cNvPr id="4" name="Slide Number Placeholder 3">
-            <a:extLst>
-              <a:ext uri="{FF2B5EF4-FFF2-40B4-BE49-F238E27FC236}">
-                <a16:creationId xmlns:a16="http://schemas.microsoft.com/office/drawing/2014/main" id="{F75D26E5-4B9C-AE7C-4F67-C282F63E900E}"/>
-              </a:ext>
-            </a:extLst>
-          </p:cNvPr>
-          <p:cNvSpPr>
-            <a:spLocks noGrp="1"/>
-          </p:cNvSpPr>
-          <p:nvPr>
-            <p:ph type="sldNum" idx="12"/>
-          </p:nvPr>
-        </p:nvSpPr>
-        <p:spPr/>
-        <p:txBody>
-          <a:bodyPr/>
-          <a:lstStyle/>
-          <a:p>
-            <a:pPr marL="0" lvl="0" indent="0" algn="r" rtl="0">
-              <a:spcBef>
-                <a:spcPts val="0"/>
-              </a:spcBef>
-              <a:spcAft>
-                <a:spcPts val="0"/>
-              </a:spcAft>
-              <a:buNone/>
-            </a:pPr>
-            <a:fld id="{00000000-1234-1234-1234-123412341234}" type="slidenum">
-              <a:rPr lang="en" smtClean="0"/>
-              <a:t>8</a:t>
-            </a:fld>
-            <a:endParaRPr lang="en" dirty="0"/>
-          </a:p>
-        </p:txBody>
-      </p:sp>
-    </p:spTree>
-    <p:extLst>
-      <p:ext uri="{BB962C8B-B14F-4D97-AF65-F5344CB8AC3E}">
-        <p14:creationId xmlns:p14="http://schemas.microsoft.com/office/powerpoint/2010/main" val="425826323"/>
-      </p:ext>
-    </p:extLst>
-  </p:cSld>
-  <p:clrMapOvr>
-    <a:masterClrMapping/>
-  </p:clrMapOvr>
-</p:sld>
-</file>
-
-<file path=ppt/slides/slide9.xml><?xml version="1.0" encoding="utf-8"?>
-<p:sld xmlns:a="http://schemas.openxmlformats.org/drawingml/2006/main" xmlns:r="http://schemas.openxmlformats.org/officeDocument/2006/relationships" xmlns:p="http://schemas.openxmlformats.org/presentationml/2006/main">
-  <p:cSld>
-    <p:spTree>
-      <p:nvGrpSpPr>
-        <p:cNvPr id="1" name=""/>
-        <p:cNvGrpSpPr/>
-        <p:nvPr/>
-      </p:nvGrpSpPr>
-      <p:grpSpPr>
-        <a:xfrm>
-          <a:off x="0" y="0"/>
-          <a:ext cx="0" cy="0"/>
-          <a:chOff x="0" y="0"/>
-          <a:chExt cx="0" cy="0"/>
-        </a:xfrm>
-      </p:grpSpPr>
-      <p:sp>
-        <p:nvSpPr>
-          <p:cNvPr id="2" name="Title 1">
-            <a:extLst>
-              <a:ext uri="{FF2B5EF4-FFF2-40B4-BE49-F238E27FC236}">
-                <a16:creationId xmlns:a16="http://schemas.microsoft.com/office/drawing/2014/main" id="{8AC5CCEB-A687-D6ED-B4AF-5079878958D3}"/>
-              </a:ext>
-            </a:extLst>
-          </p:cNvPr>
-          <p:cNvSpPr>
-            <a:spLocks noGrp="1"/>
-          </p:cNvSpPr>
-          <p:nvPr>
-            <p:ph type="title"/>
-          </p:nvPr>
-        </p:nvSpPr>
-        <p:spPr/>
-        <p:txBody>
-          <a:bodyPr/>
-          <a:lstStyle/>
-          <a:p>
-            <a:r>
-              <a:rPr lang="en-US" dirty="0"/>
-              <a:t>Our running</a:t>
-            </a:r>
-            <a:br>
-              <a:rPr lang="en-US" dirty="0"/>
-            </a:br>
-            <a:r>
-              <a:rPr lang="en-US" dirty="0"/>
-              <a:t>example</a:t>
-            </a:r>
-          </a:p>
-        </p:txBody>
-      </p:sp>
-      <p:sp>
-        <p:nvSpPr>
-          <p:cNvPr id="3" name="Text Placeholder 2">
-            <a:extLst>
-              <a:ext uri="{FF2B5EF4-FFF2-40B4-BE49-F238E27FC236}">
-                <a16:creationId xmlns:a16="http://schemas.microsoft.com/office/drawing/2014/main" id="{8D4858E6-4CF3-6CBA-F078-C3696711D9E1}"/>
-              </a:ext>
-            </a:extLst>
-          </p:cNvPr>
-          <p:cNvSpPr>
-            <a:spLocks noGrp="1"/>
-          </p:cNvSpPr>
-          <p:nvPr>
-            <p:ph type="body" idx="1"/>
-          </p:nvPr>
-        </p:nvSpPr>
-        <p:spPr/>
-        <p:txBody>
-          <a:bodyPr/>
-          <a:lstStyle/>
-          <a:p>
-            <a:endParaRPr lang="en-US" dirty="0"/>
-          </a:p>
-          <a:p>
-            <a:endParaRPr lang="en-US" dirty="0"/>
-          </a:p>
-          <a:p>
-            <a:r>
-              <a:rPr lang="en-US" dirty="0"/>
-              <a:t>Crow’s foot: many side</a:t>
-            </a:r>
-            <a:br>
-              <a:rPr lang="en-US" dirty="0"/>
-            </a:br>
-            <a:r>
-              <a:rPr lang="en-US" dirty="0"/>
-              <a:t>of many-to-one</a:t>
-            </a:r>
-            <a:br>
-              <a:rPr lang="en-US" dirty="0"/>
-            </a:br>
-            <a:r>
-              <a:rPr lang="en-US" dirty="0"/>
-              <a:t>relationship</a:t>
-            </a:r>
-          </a:p>
-          <a:p>
-            <a:r>
-              <a:rPr lang="en-US" dirty="0"/>
-              <a:t>Primary keys in bold</a:t>
-            </a:r>
-          </a:p>
-        </p:txBody>
-      </p:sp>
-      <p:sp>
-        <p:nvSpPr>
-          <p:cNvPr id="4" name="Slide Number Placeholder 3">
-            <a:extLst>
-              <a:ext uri="{FF2B5EF4-FFF2-40B4-BE49-F238E27FC236}">
-                <a16:creationId xmlns:a16="http://schemas.microsoft.com/office/drawing/2014/main" id="{FE817B71-1919-0615-A618-ECA54F9954BE}"/>
-              </a:ext>
-            </a:extLst>
-          </p:cNvPr>
-          <p:cNvSpPr>
-            <a:spLocks noGrp="1"/>
-          </p:cNvSpPr>
-          <p:nvPr>
-            <p:ph type="sldNum" idx="12"/>
-          </p:nvPr>
-        </p:nvSpPr>
-        <p:spPr/>
-        <p:txBody>
-          <a:bodyPr/>
-          <a:lstStyle/>
-          <a:p>
-            <a:pPr marL="0" lvl="0" indent="0" algn="r" rtl="0">
-              <a:spcBef>
-                <a:spcPts val="0"/>
-              </a:spcBef>
-              <a:spcAft>
-                <a:spcPts val="0"/>
-              </a:spcAft>
-              <a:buNone/>
-            </a:pPr>
-            <a:fld id="{00000000-1234-1234-1234-123412341234}" type="slidenum">
-              <a:rPr lang="en" smtClean="0"/>
-              <a:t>9</a:t>
-            </a:fld>
-            <a:endParaRPr lang="en" dirty="0"/>
-          </a:p>
-        </p:txBody>
-      </p:sp>
-      <p:pic>
-        <p:nvPicPr>
-          <p:cNvPr id="6" name="Picture 5">
-            <a:extLst>
-              <a:ext uri="{FF2B5EF4-FFF2-40B4-BE49-F238E27FC236}">
-                <a16:creationId xmlns:a16="http://schemas.microsoft.com/office/drawing/2014/main" id="{22F1DBE0-0A13-753A-6AE0-935AF8A47957}"/>
-              </a:ext>
-            </a:extLst>
-          </p:cNvPr>
-          <p:cNvPicPr>
-            <a:picLocks noChangeAspect="1"/>
-          </p:cNvPicPr>
-          <p:nvPr/>
-        </p:nvPicPr>
-        <p:blipFill>
-          <a:blip r:embed="rId2"/>
-          <a:stretch>
-            <a:fillRect/>
-          </a:stretch>
-        </p:blipFill>
-        <p:spPr>
-          <a:xfrm>
-            <a:off x="3582876" y="4"/>
-            <a:ext cx="5062409" cy="5143500"/>
-          </a:xfrm>
-          <a:prstGeom prst="rect">
-            <a:avLst/>
-          </a:prstGeom>
-        </p:spPr>
-      </p:pic>
-    </p:spTree>
-    <p:extLst>
-      <p:ext uri="{BB962C8B-B14F-4D97-AF65-F5344CB8AC3E}">
-        <p14:creationId xmlns:p14="http://schemas.microsoft.com/office/powerpoint/2010/main" val="2204738551"/>
       </p:ext>
     </p:extLst>
   </p:cSld>

</xml_diff>

<commit_message>
Update week 3 slides
</commit_message>
<xml_diff>
--- a/modules/week03/slides-03.pptx
+++ b/modules/week03/slides-03.pptx
@@ -6,52 +6,50 @@
     <p:sldMasterId id="2147483673" r:id="rId2"/>
   </p:sldMasterIdLst>
   <p:notesMasterIdLst>
-    <p:notesMasterId r:id="rId15"/>
+    <p:notesMasterId r:id="rId13"/>
   </p:notesMasterIdLst>
   <p:sldIdLst>
-    <p:sldId id="305" r:id="rId3"/>
-    <p:sldId id="256" r:id="rId4"/>
-    <p:sldId id="257" r:id="rId5"/>
-    <p:sldId id="262" r:id="rId6"/>
-    <p:sldId id="306" r:id="rId7"/>
-    <p:sldId id="263" r:id="rId8"/>
-    <p:sldId id="302" r:id="rId9"/>
-    <p:sldId id="264" r:id="rId10"/>
-    <p:sldId id="261" r:id="rId11"/>
-    <p:sldId id="299" r:id="rId12"/>
-    <p:sldId id="300" r:id="rId13"/>
-    <p:sldId id="303" r:id="rId14"/>
+    <p:sldId id="304" r:id="rId3"/>
+    <p:sldId id="305" r:id="rId4"/>
+    <p:sldId id="256" r:id="rId5"/>
+    <p:sldId id="257" r:id="rId6"/>
+    <p:sldId id="262" r:id="rId7"/>
+    <p:sldId id="264" r:id="rId8"/>
+    <p:sldId id="261" r:id="rId9"/>
+    <p:sldId id="299" r:id="rId10"/>
+    <p:sldId id="300" r:id="rId11"/>
+    <p:sldId id="303" r:id="rId12"/>
   </p:sldIdLst>
   <p:sldSz cx="9144000" cy="5143500" type="screen16x9"/>
   <p:notesSz cx="6858000" cy="9144000"/>
   <p:embeddedFontLst>
     <p:embeddedFont>
       <p:font typeface="Avenir" panose="02000503020000020003" pitchFamily="2" charset="0"/>
+      <p:regular r:id="rId14"/>
+      <p:italic r:id="rId15"/>
+    </p:embeddedFont>
+    <p:embeddedFont>
+      <p:font typeface="Avenir Book" panose="02000503020000020003" pitchFamily="2" charset="0"/>
       <p:regular r:id="rId16"/>
       <p:italic r:id="rId17"/>
     </p:embeddedFont>
     <p:embeddedFont>
-      <p:font typeface="Avenir Book" panose="02000503020000020003" pitchFamily="2" charset="0"/>
+      <p:font typeface="Century Gothic" panose="020B0502020202020204" pitchFamily="34" charset="0"/>
       <p:regular r:id="rId18"/>
-      <p:italic r:id="rId19"/>
-    </p:embeddedFont>
-    <p:embeddedFont>
-      <p:font typeface="Century Gothic" panose="020B0502020202020204" pitchFamily="34" charset="0"/>
-      <p:regular r:id="rId20"/>
-      <p:bold r:id="rId21"/>
-      <p:italic r:id="rId22"/>
-      <p:boldItalic r:id="rId23"/>
+      <p:bold r:id="rId19"/>
+      <p:italic r:id="rId20"/>
+      <p:boldItalic r:id="rId21"/>
     </p:embeddedFont>
     <p:embeddedFont>
       <p:font typeface="Lobster" pitchFamily="2" charset="77"/>
-      <p:regular r:id="rId24"/>
+      <p:regular r:id="rId22"/>
     </p:embeddedFont>
     <p:embeddedFont>
       <p:font typeface="Nunito Sans" pitchFamily="2" charset="77"/>
-      <p:regular r:id="rId25"/>
-      <p:bold r:id="rId26"/>
-      <p:italic r:id="rId27"/>
-      <p:boldItalic r:id="rId28"/>
+      <p:regular r:id="rId23"/>
+      <p:bold r:id="rId24"/>
+      <p:italic r:id="rId25"/>
+      <p:boldItalic r:id="rId26"/>
     </p:embeddedFont>
   </p:embeddedFontLst>
   <p:defaultTextStyle>
@@ -744,6 +742,174 @@
 </file>
 
 <file path=ppt/notesSlides/notesSlide1.xml><?xml version="1.0" encoding="utf-8"?>
+<p:notes xmlns:a="http://schemas.openxmlformats.org/drawingml/2006/main" xmlns:r="http://schemas.openxmlformats.org/officeDocument/2006/relationships" xmlns:p="http://schemas.openxmlformats.org/presentationml/2006/main">
+  <p:cSld>
+    <p:spTree>
+      <p:nvGrpSpPr>
+        <p:cNvPr id="1" name="">
+          <a:extLst>
+            <a:ext uri="{FF2B5EF4-FFF2-40B4-BE49-F238E27FC236}">
+              <a16:creationId xmlns:a16="http://schemas.microsoft.com/office/drawing/2014/main" id="{7B7CEFF2-DF02-6A78-B1F3-322EA62E2F7D}"/>
+            </a:ext>
+          </a:extLst>
+        </p:cNvPr>
+        <p:cNvGrpSpPr/>
+        <p:nvPr/>
+      </p:nvGrpSpPr>
+      <p:grpSpPr>
+        <a:xfrm>
+          <a:off x="0" y="0"/>
+          <a:ext cx="0" cy="0"/>
+          <a:chOff x="0" y="0"/>
+          <a:chExt cx="0" cy="0"/>
+        </a:xfrm>
+      </p:grpSpPr>
+      <p:sp>
+        <p:nvSpPr>
+          <p:cNvPr id="2" name="Slide Image Placeholder 1">
+            <a:extLst>
+              <a:ext uri="{FF2B5EF4-FFF2-40B4-BE49-F238E27FC236}">
+                <a16:creationId xmlns:a16="http://schemas.microsoft.com/office/drawing/2014/main" id="{E0C66973-BD04-0C65-38CA-68C20D98D0C0}"/>
+              </a:ext>
+            </a:extLst>
+          </p:cNvPr>
+          <p:cNvSpPr>
+            <a:spLocks noGrp="1" noRot="1" noChangeAspect="1"/>
+          </p:cNvSpPr>
+          <p:nvPr>
+            <p:ph type="sldImg"/>
+          </p:nvPr>
+        </p:nvSpPr>
+        <p:spPr>
+          <a:xfrm>
+            <a:off x="381000" y="685800"/>
+            <a:ext cx="6096000" cy="3429000"/>
+          </a:xfrm>
+        </p:spPr>
+      </p:sp>
+      <p:sp>
+        <p:nvSpPr>
+          <p:cNvPr id="3" name="Notes Placeholder 2">
+            <a:extLst>
+              <a:ext uri="{FF2B5EF4-FFF2-40B4-BE49-F238E27FC236}">
+                <a16:creationId xmlns:a16="http://schemas.microsoft.com/office/drawing/2014/main" id="{5220FEEE-1353-0E04-537D-594ACC81CE43}"/>
+              </a:ext>
+            </a:extLst>
+          </p:cNvPr>
+          <p:cNvSpPr>
+            <a:spLocks noGrp="1"/>
+          </p:cNvSpPr>
+          <p:nvPr>
+            <p:ph type="body" idx="1"/>
+          </p:nvPr>
+        </p:nvSpPr>
+        <p:spPr/>
+        <p:txBody>
+          <a:bodyPr/>
+          <a:lstStyle/>
+          <a:p>
+            <a:endParaRPr lang="en-US" dirty="0"/>
+          </a:p>
+        </p:txBody>
+      </p:sp>
+    </p:spTree>
+    <p:extLst>
+      <p:ext uri="{BB962C8B-B14F-4D97-AF65-F5344CB8AC3E}">
+        <p14:creationId xmlns:p14="http://schemas.microsoft.com/office/powerpoint/2010/main" val="1356037975"/>
+      </p:ext>
+    </p:extLst>
+  </p:cSld>
+  <p:clrMapOvr>
+    <a:masterClrMapping/>
+  </p:clrMapOvr>
+</p:notes>
+</file>
+
+<file path=ppt/notesSlides/notesSlide2.xml><?xml version="1.0" encoding="utf-8"?>
+<p:notes xmlns:a="http://schemas.openxmlformats.org/drawingml/2006/main" xmlns:r="http://schemas.openxmlformats.org/officeDocument/2006/relationships" xmlns:p="http://schemas.openxmlformats.org/presentationml/2006/main">
+  <p:cSld>
+    <p:spTree>
+      <p:nvGrpSpPr>
+        <p:cNvPr id="1" name="">
+          <a:extLst>
+            <a:ext uri="{FF2B5EF4-FFF2-40B4-BE49-F238E27FC236}">
+              <a16:creationId xmlns:a16="http://schemas.microsoft.com/office/drawing/2014/main" id="{75AF5EA4-2496-7987-2F20-3B9F20673AA0}"/>
+            </a:ext>
+          </a:extLst>
+        </p:cNvPr>
+        <p:cNvGrpSpPr/>
+        <p:nvPr/>
+      </p:nvGrpSpPr>
+      <p:grpSpPr>
+        <a:xfrm>
+          <a:off x="0" y="0"/>
+          <a:ext cx="0" cy="0"/>
+          <a:chOff x="0" y="0"/>
+          <a:chExt cx="0" cy="0"/>
+        </a:xfrm>
+      </p:grpSpPr>
+      <p:sp>
+        <p:nvSpPr>
+          <p:cNvPr id="2" name="Slide Image Placeholder 1">
+            <a:extLst>
+              <a:ext uri="{FF2B5EF4-FFF2-40B4-BE49-F238E27FC236}">
+                <a16:creationId xmlns:a16="http://schemas.microsoft.com/office/drawing/2014/main" id="{32A08A88-368B-0080-5AD9-E6885896FF7D}"/>
+              </a:ext>
+            </a:extLst>
+          </p:cNvPr>
+          <p:cNvSpPr>
+            <a:spLocks noGrp="1" noRot="1" noChangeAspect="1"/>
+          </p:cNvSpPr>
+          <p:nvPr>
+            <p:ph type="sldImg"/>
+          </p:nvPr>
+        </p:nvSpPr>
+        <p:spPr>
+          <a:xfrm>
+            <a:off x="381000" y="685800"/>
+            <a:ext cx="6096000" cy="3429000"/>
+          </a:xfrm>
+        </p:spPr>
+      </p:sp>
+      <p:sp>
+        <p:nvSpPr>
+          <p:cNvPr id="3" name="Notes Placeholder 2">
+            <a:extLst>
+              <a:ext uri="{FF2B5EF4-FFF2-40B4-BE49-F238E27FC236}">
+                <a16:creationId xmlns:a16="http://schemas.microsoft.com/office/drawing/2014/main" id="{BACE8FDF-8264-01BC-5D27-384F79016B02}"/>
+              </a:ext>
+            </a:extLst>
+          </p:cNvPr>
+          <p:cNvSpPr>
+            <a:spLocks noGrp="1"/>
+          </p:cNvSpPr>
+          <p:nvPr>
+            <p:ph type="body" idx="1"/>
+          </p:nvPr>
+        </p:nvSpPr>
+        <p:spPr/>
+        <p:txBody>
+          <a:bodyPr/>
+          <a:lstStyle/>
+          <a:p>
+            <a:endParaRPr lang="en-US" dirty="0"/>
+          </a:p>
+        </p:txBody>
+      </p:sp>
+    </p:spTree>
+    <p:extLst>
+      <p:ext uri="{BB962C8B-B14F-4D97-AF65-F5344CB8AC3E}">
+        <p14:creationId xmlns:p14="http://schemas.microsoft.com/office/powerpoint/2010/main" val="3679654659"/>
+      </p:ext>
+    </p:extLst>
+  </p:cSld>
+  <p:clrMapOvr>
+    <a:masterClrMapping/>
+  </p:clrMapOvr>
+</p:notes>
+</file>
+
+<file path=ppt/notesSlides/notesSlide3.xml><?xml version="1.0" encoding="utf-8"?>
 <p:notes xmlns:a="http://schemas.openxmlformats.org/drawingml/2006/main" xmlns:r="http://schemas.openxmlformats.org/officeDocument/2006/relationships" xmlns:p="http://schemas.openxmlformats.org/presentationml/2006/main" showMasterSp="0" showMasterPhAnim="0">
   <p:cSld>
     <p:spTree>
@@ -846,7 +1012,7 @@
 </p:notes>
 </file>
 
-<file path=ppt/notesSlides/notesSlide2.xml><?xml version="1.0" encoding="utf-8"?>
+<file path=ppt/notesSlides/notesSlide4.xml><?xml version="1.0" encoding="utf-8"?>
 <p:notes xmlns:a="http://schemas.openxmlformats.org/drawingml/2006/main" xmlns:r="http://schemas.openxmlformats.org/officeDocument/2006/relationships" xmlns:p="http://schemas.openxmlformats.org/presentationml/2006/main" showMasterSp="0" showMasterPhAnim="0">
   <p:cSld>
     <p:spTree>
@@ -949,168 +1115,6 @@
 </p:notes>
 </file>
 
-<file path=ppt/notesSlides/notesSlide3.xml><?xml version="1.0" encoding="utf-8"?>
-<p:notes xmlns:a="http://schemas.openxmlformats.org/drawingml/2006/main" xmlns:r="http://schemas.openxmlformats.org/officeDocument/2006/relationships" xmlns:p="http://schemas.openxmlformats.org/presentationml/2006/main">
-  <p:cSld>
-    <p:spTree>
-      <p:nvGrpSpPr>
-        <p:cNvPr id="1" name=""/>
-        <p:cNvGrpSpPr/>
-        <p:nvPr/>
-      </p:nvGrpSpPr>
-      <p:grpSpPr>
-        <a:xfrm>
-          <a:off x="0" y="0"/>
-          <a:ext cx="0" cy="0"/>
-          <a:chOff x="0" y="0"/>
-          <a:chExt cx="0" cy="0"/>
-        </a:xfrm>
-      </p:grpSpPr>
-      <p:sp>
-        <p:nvSpPr>
-          <p:cNvPr id="2" name="Slide Image Placeholder 1"/>
-          <p:cNvSpPr>
-            <a:spLocks noGrp="1" noRot="1" noChangeAspect="1"/>
-          </p:cNvSpPr>
-          <p:nvPr>
-            <p:ph type="sldImg"/>
-          </p:nvPr>
-        </p:nvSpPr>
-        <p:spPr>
-          <a:xfrm>
-            <a:off x="381000" y="685800"/>
-            <a:ext cx="6096000" cy="3429000"/>
-          </a:xfrm>
-        </p:spPr>
-      </p:sp>
-      <p:sp>
-        <p:nvSpPr>
-          <p:cNvPr id="3" name="Notes Placeholder 2"/>
-          <p:cNvSpPr>
-            <a:spLocks noGrp="1"/>
-          </p:cNvSpPr>
-          <p:nvPr>
-            <p:ph type="body" idx="1"/>
-          </p:nvPr>
-        </p:nvSpPr>
-        <p:spPr/>
-        <p:txBody>
-          <a:bodyPr/>
-          <a:lstStyle/>
-          <a:p>
-            <a:r>
-              <a:rPr lang="en-US" dirty="0"/>
-              <a:t>Recall quote from week 1: “Even though the data modelling phase represents only a relatively small share of the total development effort of data systems, its impact on the final result is probably greater than that of any other phase”</a:t>
-            </a:r>
-          </a:p>
-        </p:txBody>
-      </p:sp>
-    </p:spTree>
-    <p:extLst>
-      <p:ext uri="{BB962C8B-B14F-4D97-AF65-F5344CB8AC3E}">
-        <p14:creationId xmlns:p14="http://schemas.microsoft.com/office/powerpoint/2010/main" val="2857909833"/>
-      </p:ext>
-    </p:extLst>
-  </p:cSld>
-  <p:clrMapOvr>
-    <a:masterClrMapping/>
-  </p:clrMapOvr>
-</p:notes>
-</file>
-
-<file path=ppt/notesSlides/notesSlide4.xml><?xml version="1.0" encoding="utf-8"?>
-<p:notes xmlns:a="http://schemas.openxmlformats.org/drawingml/2006/main" xmlns:r="http://schemas.openxmlformats.org/officeDocument/2006/relationships" xmlns:p="http://schemas.openxmlformats.org/presentationml/2006/main">
-  <p:cSld>
-    <p:spTree>
-      <p:nvGrpSpPr>
-        <p:cNvPr id="1" name=""/>
-        <p:cNvGrpSpPr/>
-        <p:nvPr/>
-      </p:nvGrpSpPr>
-      <p:grpSpPr>
-        <a:xfrm>
-          <a:off x="0" y="0"/>
-          <a:ext cx="0" cy="0"/>
-          <a:chOff x="0" y="0"/>
-          <a:chExt cx="0" cy="0"/>
-        </a:xfrm>
-      </p:grpSpPr>
-      <p:sp>
-        <p:nvSpPr>
-          <p:cNvPr id="2" name="Slide Image Placeholder 1"/>
-          <p:cNvSpPr>
-            <a:spLocks noGrp="1" noRot="1" noChangeAspect="1"/>
-          </p:cNvSpPr>
-          <p:nvPr>
-            <p:ph type="sldImg"/>
-          </p:nvPr>
-        </p:nvSpPr>
-        <p:spPr>
-          <a:xfrm>
-            <a:off x="381000" y="685800"/>
-            <a:ext cx="6096000" cy="3429000"/>
-          </a:xfrm>
-        </p:spPr>
-      </p:sp>
-      <p:sp>
-        <p:nvSpPr>
-          <p:cNvPr id="3" name="Notes Placeholder 2"/>
-          <p:cNvSpPr>
-            <a:spLocks noGrp="1"/>
-          </p:cNvSpPr>
-          <p:nvPr>
-            <p:ph type="body" idx="1"/>
-          </p:nvPr>
-        </p:nvSpPr>
-        <p:spPr/>
-        <p:txBody>
-          <a:bodyPr/>
-          <a:lstStyle/>
-          <a:p>
-            <a:r>
-              <a:rPr lang="en-US" dirty="0"/>
-              <a:t>Purpose of exercise: to do a real-world task.  While learning SQL you will be using a pre-prepared database that has no issues.  In real life, data assessment &amp; cleaning are commonplace.</a:t>
-            </a:r>
-          </a:p>
-          <a:p>
-            <a:r>
-              <a:rPr lang="en-US" dirty="0"/>
-              <a:t>If data has no intrinsic meaning (e.g., it’s a code of some kind), then it is possibly and even likely a foreign key</a:t>
-            </a:r>
-          </a:p>
-          <a:p>
-            <a:r>
-              <a:rPr lang="en-US" dirty="0"/>
-              <a:t>Useful to constrain year even if bounds are arbitrary</a:t>
-            </a:r>
-          </a:p>
-          <a:p>
-            <a:r>
-              <a:rPr lang="en-US" dirty="0"/>
-              <a:t>Primary key unclear, some suggested adding ID column, good idea</a:t>
-            </a:r>
-          </a:p>
-          <a:p>
-            <a:r>
-              <a:rPr lang="en-US" dirty="0"/>
-              <a:t>Still needs to be augmented with metadata, of course</a:t>
-            </a:r>
-          </a:p>
-        </p:txBody>
-      </p:sp>
-    </p:spTree>
-    <p:extLst>
-      <p:ext uri="{BB962C8B-B14F-4D97-AF65-F5344CB8AC3E}">
-        <p14:creationId xmlns:p14="http://schemas.microsoft.com/office/powerpoint/2010/main" val="3409772019"/>
-      </p:ext>
-    </p:extLst>
-  </p:cSld>
-  <p:clrMapOvr>
-    <a:masterClrMapping/>
-  </p:clrMapOvr>
-</p:notes>
-</file>
-
 <file path=ppt/notesSlides/notesSlide5.xml><?xml version="1.0" encoding="utf-8"?>
 <p:notes xmlns:a="http://schemas.openxmlformats.org/drawingml/2006/main" xmlns:r="http://schemas.openxmlformats.org/officeDocument/2006/relationships" xmlns:p="http://schemas.openxmlformats.org/presentationml/2006/main">
   <p:cSld>
@@ -1162,7 +1166,7 @@
           <a:p>
             <a:r>
               <a:rPr lang="en-US" dirty="0"/>
-              <a:t>R joins are very similar to SQL joins, why is R procedural and SQL declarative?  Read on…</a:t>
+              <a:t>Recall quote from week 1: “Even though the data modelling phase represents only a relatively small share of the total development effort of data systems, its impact on the final result is probably greater than that of any other phase”</a:t>
             </a:r>
           </a:p>
         </p:txBody>
@@ -1170,7 +1174,7 @@
     </p:spTree>
     <p:extLst>
       <p:ext uri="{BB962C8B-B14F-4D97-AF65-F5344CB8AC3E}">
-        <p14:creationId xmlns:p14="http://schemas.microsoft.com/office/powerpoint/2010/main" val="2795821018"/>
+        <p14:creationId xmlns:p14="http://schemas.microsoft.com/office/powerpoint/2010/main" val="2857909833"/>
       </p:ext>
     </p:extLst>
   </p:cSld>
@@ -1231,25 +1235,7 @@
           <a:p>
             <a:r>
               <a:rPr lang="en-US" dirty="0"/>
-              <a:t>Server is an engine that is always running, anticipating multiple queries simultaneously</a:t>
-            </a:r>
-          </a:p>
-          <a:p>
-            <a:r>
-              <a:rPr lang="en-US" dirty="0"/>
-              <a:t>Tremendous amount of variability in how queries are processed; asynchronous processing</a:t>
-            </a:r>
-          </a:p>
-          <a:p>
-            <a:r>
-              <a:rPr lang="en-US" dirty="0"/>
-              <a:t>This explains way rows are not just conceptually unordered, but might be returned in different order on every query</a:t>
-            </a:r>
-          </a:p>
-          <a:p>
-            <a:r>
-              <a:rPr lang="en-US" dirty="0"/>
-              <a:t>Explains why SQL is considered declarative: RDBMS decides how to implement</a:t>
+              <a:t>R joins are very similar to SQL joins, why is R procedural and SQL declarative?  Read on…</a:t>
             </a:r>
           </a:p>
         </p:txBody>
@@ -1257,7 +1243,7 @@
     </p:spTree>
     <p:extLst>
       <p:ext uri="{BB962C8B-B14F-4D97-AF65-F5344CB8AC3E}">
-        <p14:creationId xmlns:p14="http://schemas.microsoft.com/office/powerpoint/2010/main" val="391050117"/>
+        <p14:creationId xmlns:p14="http://schemas.microsoft.com/office/powerpoint/2010/main" val="2795821018"/>
       </p:ext>
     </p:extLst>
   </p:cSld>
@@ -1318,6 +1304,93 @@
           <a:p>
             <a:r>
               <a:rPr lang="en-US" dirty="0"/>
+              <a:t>Server is an engine that is always running, anticipating multiple queries simultaneously</a:t>
+            </a:r>
+          </a:p>
+          <a:p>
+            <a:r>
+              <a:rPr lang="en-US" dirty="0"/>
+              <a:t>Tremendous amount of variability in how queries are processed; asynchronous processing</a:t>
+            </a:r>
+          </a:p>
+          <a:p>
+            <a:r>
+              <a:rPr lang="en-US" dirty="0"/>
+              <a:t>This explains way rows are not just conceptually unordered, but might be returned in different order on every query</a:t>
+            </a:r>
+          </a:p>
+          <a:p>
+            <a:r>
+              <a:rPr lang="en-US" dirty="0"/>
+              <a:t>Explains why SQL is considered declarative: RDBMS decides how to implement</a:t>
+            </a:r>
+          </a:p>
+        </p:txBody>
+      </p:sp>
+    </p:spTree>
+    <p:extLst>
+      <p:ext uri="{BB962C8B-B14F-4D97-AF65-F5344CB8AC3E}">
+        <p14:creationId xmlns:p14="http://schemas.microsoft.com/office/powerpoint/2010/main" val="391050117"/>
+      </p:ext>
+    </p:extLst>
+  </p:cSld>
+  <p:clrMapOvr>
+    <a:masterClrMapping/>
+  </p:clrMapOvr>
+</p:notes>
+</file>
+
+<file path=ppt/notesSlides/notesSlide8.xml><?xml version="1.0" encoding="utf-8"?>
+<p:notes xmlns:a="http://schemas.openxmlformats.org/drawingml/2006/main" xmlns:r="http://schemas.openxmlformats.org/officeDocument/2006/relationships" xmlns:p="http://schemas.openxmlformats.org/presentationml/2006/main">
+  <p:cSld>
+    <p:spTree>
+      <p:nvGrpSpPr>
+        <p:cNvPr id="1" name=""/>
+        <p:cNvGrpSpPr/>
+        <p:nvPr/>
+      </p:nvGrpSpPr>
+      <p:grpSpPr>
+        <a:xfrm>
+          <a:off x="0" y="0"/>
+          <a:ext cx="0" cy="0"/>
+          <a:chOff x="0" y="0"/>
+          <a:chExt cx="0" cy="0"/>
+        </a:xfrm>
+      </p:grpSpPr>
+      <p:sp>
+        <p:nvSpPr>
+          <p:cNvPr id="2" name="Slide Image Placeholder 1"/>
+          <p:cNvSpPr>
+            <a:spLocks noGrp="1" noRot="1" noChangeAspect="1"/>
+          </p:cNvSpPr>
+          <p:nvPr>
+            <p:ph type="sldImg"/>
+          </p:nvPr>
+        </p:nvSpPr>
+        <p:spPr>
+          <a:xfrm>
+            <a:off x="381000" y="685800"/>
+            <a:ext cx="6096000" cy="3429000"/>
+          </a:xfrm>
+        </p:spPr>
+      </p:sp>
+      <p:sp>
+        <p:nvSpPr>
+          <p:cNvPr id="3" name="Notes Placeholder 2"/>
+          <p:cNvSpPr>
+            <a:spLocks noGrp="1"/>
+          </p:cNvSpPr>
+          <p:nvPr>
+            <p:ph type="body" idx="1"/>
+          </p:nvPr>
+        </p:nvSpPr>
+        <p:spPr/>
+        <p:txBody>
+          <a:bodyPr/>
+          <a:lstStyle/>
+          <a:p>
+            <a:r>
+              <a:rPr lang="en-US" dirty="0"/>
               <a:t>In real life, you are more likely to collaborate using a client/server database.</a:t>
             </a:r>
           </a:p>
@@ -1732,110 +1805,6 @@
 </file>
 
 <file path=ppt/slideLayouts/slideLayout10.xml><?xml version="1.0" encoding="utf-8"?>
-<p:sldLayout xmlns:a="http://schemas.openxmlformats.org/drawingml/2006/main" xmlns:r="http://schemas.openxmlformats.org/officeDocument/2006/relationships" xmlns:p="http://schemas.openxmlformats.org/presentationml/2006/main" matchingName="Blank" type="blank">
-  <p:cSld name="BLANK">
-    <p:spTree>
-      <p:nvGrpSpPr>
-        <p:cNvPr id="1" name="Shape 48"/>
-        <p:cNvGrpSpPr/>
-        <p:nvPr/>
-      </p:nvGrpSpPr>
-      <p:grpSpPr>
-        <a:xfrm>
-          <a:off x="0" y="0"/>
-          <a:ext cx="0" cy="0"/>
-          <a:chOff x="0" y="0"/>
-          <a:chExt cx="0" cy="0"/>
-        </a:xfrm>
-      </p:grpSpPr>
-      <p:sp>
-        <p:nvSpPr>
-          <p:cNvPr id="49" name="Google Shape;49;p12"/>
-          <p:cNvSpPr txBox="1">
-            <a:spLocks noGrp="1"/>
-          </p:cNvSpPr>
-          <p:nvPr>
-            <p:ph type="sldNum" idx="12"/>
-          </p:nvPr>
-        </p:nvSpPr>
-        <p:spPr>
-          <a:xfrm>
-            <a:off x="8472458" y="4663217"/>
-            <a:ext cx="548700" cy="393600"/>
-          </a:xfrm>
-          <a:prstGeom prst="rect">
-            <a:avLst/>
-          </a:prstGeom>
-        </p:spPr>
-        <p:txBody>
-          <a:bodyPr spcFirstLastPara="1" wrap="square" lIns="91425" tIns="91425" rIns="91425" bIns="91425" anchor="ctr" anchorCtr="0">
-            <a:normAutofit/>
-          </a:bodyPr>
-          <a:lstStyle>
-            <a:lvl1pPr lvl="0">
-              <a:buNone/>
-              <a:defRPr/>
-            </a:lvl1pPr>
-            <a:lvl2pPr lvl="1">
-              <a:buNone/>
-              <a:defRPr/>
-            </a:lvl2pPr>
-            <a:lvl3pPr lvl="2">
-              <a:buNone/>
-              <a:defRPr/>
-            </a:lvl3pPr>
-            <a:lvl4pPr lvl="3">
-              <a:buNone/>
-              <a:defRPr/>
-            </a:lvl4pPr>
-            <a:lvl5pPr lvl="4">
-              <a:buNone/>
-              <a:defRPr/>
-            </a:lvl5pPr>
-            <a:lvl6pPr lvl="5">
-              <a:buNone/>
-              <a:defRPr/>
-            </a:lvl6pPr>
-            <a:lvl7pPr lvl="6">
-              <a:buNone/>
-              <a:defRPr/>
-            </a:lvl7pPr>
-            <a:lvl8pPr lvl="7">
-              <a:buNone/>
-              <a:defRPr/>
-            </a:lvl8pPr>
-            <a:lvl9pPr lvl="8">
-              <a:buNone/>
-              <a:defRPr/>
-            </a:lvl9pPr>
-          </a:lstStyle>
-          <a:p>
-            <a:pPr marL="0" lvl="0" indent="0" algn="r" rtl="0">
-              <a:spcBef>
-                <a:spcPts val="0"/>
-              </a:spcBef>
-              <a:spcAft>
-                <a:spcPts val="0"/>
-              </a:spcAft>
-              <a:buNone/>
-            </a:pPr>
-            <a:fld id="{00000000-1234-1234-1234-123412341234}" type="slidenum">
-              <a:rPr lang="en"/>
-              <a:t>‹#›</a:t>
-            </a:fld>
-            <a:endParaRPr/>
-          </a:p>
-        </p:txBody>
-      </p:sp>
-    </p:spTree>
-  </p:cSld>
-  <p:clrMapOvr>
-    <a:masterClrMapping/>
-  </p:clrMapOvr>
-</p:sldLayout>
-</file>
-
-<file path=ppt/slideLayouts/slideLayout11.xml><?xml version="1.0" encoding="utf-8"?>
 <p:sldLayout xmlns:a="http://schemas.openxmlformats.org/drawingml/2006/main" xmlns:r="http://schemas.openxmlformats.org/officeDocument/2006/relationships" xmlns:p="http://schemas.openxmlformats.org/presentationml/2006/main" matchingName="Title and two columns" type="twoColTx">
   <p:cSld name="Title and two columns">
     <p:spTree>
@@ -2331,7 +2300,7 @@
 </p:sldLayout>
 </file>
 
-<file path=ppt/slideLayouts/slideLayout12.xml><?xml version="1.0" encoding="utf-8"?>
+<file path=ppt/slideLayouts/slideLayout11.xml><?xml version="1.0" encoding="utf-8"?>
 <p:sldLayout xmlns:a="http://schemas.openxmlformats.org/drawingml/2006/main" xmlns:r="http://schemas.openxmlformats.org/officeDocument/2006/relationships" xmlns:p="http://schemas.openxmlformats.org/presentationml/2006/main" matchingName="Title Slide">
   <p:cSld name="Title Slide">
     <p:bg>
@@ -2871,7 +2840,7 @@
 </p:sldLayout>
 </file>
 
-<file path=ppt/slideLayouts/slideLayout13.xml><?xml version="1.0" encoding="utf-8"?>
+<file path=ppt/slideLayouts/slideLayout12.xml><?xml version="1.0" encoding="utf-8"?>
 <p:sldLayout xmlns:a="http://schemas.openxmlformats.org/drawingml/2006/main" xmlns:r="http://schemas.openxmlformats.org/officeDocument/2006/relationships" xmlns:p="http://schemas.openxmlformats.org/presentationml/2006/main" matchingName="1 list" type="obj">
   <p:cSld name="OBJECT">
     <p:spTree>
@@ -3329,7 +3298,7 @@
 </p:sldLayout>
 </file>
 
-<file path=ppt/slideLayouts/slideLayout14.xml><?xml version="1.0" encoding="utf-8"?>
+<file path=ppt/slideLayouts/slideLayout13.xml><?xml version="1.0" encoding="utf-8"?>
 <p:sldLayout xmlns:a="http://schemas.openxmlformats.org/drawingml/2006/main" xmlns:r="http://schemas.openxmlformats.org/officeDocument/2006/relationships" xmlns:p="http://schemas.openxmlformats.org/presentationml/2006/main" matchingName="Two Column" type="twoObj">
   <p:cSld name="TWO_OBJECTS">
     <p:spTree>
@@ -4050,7 +4019,7 @@
 </p:sldLayout>
 </file>
 
-<file path=ppt/slideLayouts/slideLayout15.xml><?xml version="1.0" encoding="utf-8"?>
+<file path=ppt/slideLayouts/slideLayout14.xml><?xml version="1.0" encoding="utf-8"?>
 <p:sldLayout xmlns:a="http://schemas.openxmlformats.org/drawingml/2006/main" xmlns:r="http://schemas.openxmlformats.org/officeDocument/2006/relationships" xmlns:p="http://schemas.openxmlformats.org/presentationml/2006/main" matchingName="Content + horizontal image">
   <p:cSld name="Two Content Blocks + Picture">
     <p:spTree>
@@ -4699,7 +4668,7 @@
 </p:sldLayout>
 </file>
 
-<file path=ppt/slideLayouts/slideLayout16.xml><?xml version="1.0" encoding="utf-8"?>
+<file path=ppt/slideLayouts/slideLayout15.xml><?xml version="1.0" encoding="utf-8"?>
 <p:sldLayout xmlns:a="http://schemas.openxmlformats.org/drawingml/2006/main" xmlns:r="http://schemas.openxmlformats.org/officeDocument/2006/relationships" xmlns:p="http://schemas.openxmlformats.org/presentationml/2006/main" matchingName="Two Row list + image">
   <p:cSld name="Two Content Blocks + Picture_2">
     <p:spTree>
@@ -5305,7 +5274,7 @@
 </p:sldLayout>
 </file>
 
-<file path=ppt/slideLayouts/slideLayout17.xml><?xml version="1.0" encoding="utf-8"?>
+<file path=ppt/slideLayouts/slideLayout16.xml><?xml version="1.0" encoding="utf-8"?>
 <p:sldLayout xmlns:a="http://schemas.openxmlformats.org/drawingml/2006/main" xmlns:r="http://schemas.openxmlformats.org/officeDocument/2006/relationships" xmlns:p="http://schemas.openxmlformats.org/presentationml/2006/main" matchingName="4 list">
   <p:cSld name="Two Content Blocks + Picture_2_1">
     <p:spTree>
@@ -7126,7 +7095,7 @@
 </p:sldLayout>
 </file>
 
-<file path=ppt/slideLayouts/slideLayout18.xml><?xml version="1.0" encoding="utf-8"?>
+<file path=ppt/slideLayouts/slideLayout17.xml><?xml version="1.0" encoding="utf-8"?>
 <p:sldLayout xmlns:a="http://schemas.openxmlformats.org/drawingml/2006/main" xmlns:r="http://schemas.openxmlformats.org/officeDocument/2006/relationships" xmlns:p="http://schemas.openxmlformats.org/presentationml/2006/main" matchingName="2 list">
   <p:cSld name="Two Content Blocks + Picture_2_1_1">
     <p:spTree>
@@ -8175,7 +8144,7 @@
 </p:sldLayout>
 </file>
 
-<file path=ppt/slideLayouts/slideLayout19.xml><?xml version="1.0" encoding="utf-8"?>
+<file path=ppt/slideLayouts/slideLayout18.xml><?xml version="1.0" encoding="utf-8"?>
 <p:sldLayout xmlns:a="http://schemas.openxmlformats.org/drawingml/2006/main" xmlns:r="http://schemas.openxmlformats.org/officeDocument/2006/relationships" xmlns:p="http://schemas.openxmlformats.org/presentationml/2006/main" matchingName="Section Header Navy" type="secHead">
   <p:cSld name="SECTION_HEADER">
     <p:bg>
@@ -8607,240 +8576,7 @@
 </p:sldLayout>
 </file>
 
-<file path=ppt/slideLayouts/slideLayout2.xml><?xml version="1.0" encoding="utf-8"?>
-<p:sldLayout xmlns:a="http://schemas.openxmlformats.org/drawingml/2006/main" xmlns:r="http://schemas.openxmlformats.org/officeDocument/2006/relationships" xmlns:p="http://schemas.openxmlformats.org/presentationml/2006/main" matchingName="Section header" type="secHead">
-  <p:cSld name="SECTION_HEADER">
-    <p:spTree>
-      <p:nvGrpSpPr>
-        <p:cNvPr id="1" name="Shape 13"/>
-        <p:cNvGrpSpPr/>
-        <p:nvPr/>
-      </p:nvGrpSpPr>
-      <p:grpSpPr>
-        <a:xfrm>
-          <a:off x="0" y="0"/>
-          <a:ext cx="0" cy="0"/>
-          <a:chOff x="0" y="0"/>
-          <a:chExt cx="0" cy="0"/>
-        </a:xfrm>
-      </p:grpSpPr>
-      <p:sp>
-        <p:nvSpPr>
-          <p:cNvPr id="14" name="Google Shape;14;p3"/>
-          <p:cNvSpPr txBox="1">
-            <a:spLocks noGrp="1"/>
-          </p:cNvSpPr>
-          <p:nvPr>
-            <p:ph type="title"/>
-          </p:nvPr>
-        </p:nvSpPr>
-        <p:spPr>
-          <a:xfrm>
-            <a:off x="311700" y="2150850"/>
-            <a:ext cx="8520600" cy="841800"/>
-          </a:xfrm>
-          <a:prstGeom prst="rect">
-            <a:avLst/>
-          </a:prstGeom>
-        </p:spPr>
-        <p:txBody>
-          <a:bodyPr spcFirstLastPara="1" wrap="square" lIns="91425" tIns="91425" rIns="91425" bIns="91425" anchor="ctr" anchorCtr="0">
-            <a:normAutofit/>
-          </a:bodyPr>
-          <a:lstStyle>
-            <a:lvl1pPr lvl="0" algn="ctr">
-              <a:spcBef>
-                <a:spcPts val="0"/>
-              </a:spcBef>
-              <a:spcAft>
-                <a:spcPts val="0"/>
-              </a:spcAft>
-              <a:buSzPts val="3600"/>
-              <a:buNone/>
-              <a:defRPr sz="3600"/>
-            </a:lvl1pPr>
-            <a:lvl2pPr lvl="1" algn="ctr">
-              <a:spcBef>
-                <a:spcPts val="0"/>
-              </a:spcBef>
-              <a:spcAft>
-                <a:spcPts val="0"/>
-              </a:spcAft>
-              <a:buSzPts val="3600"/>
-              <a:buNone/>
-              <a:defRPr sz="3600"/>
-            </a:lvl2pPr>
-            <a:lvl3pPr lvl="2" algn="ctr">
-              <a:spcBef>
-                <a:spcPts val="0"/>
-              </a:spcBef>
-              <a:spcAft>
-                <a:spcPts val="0"/>
-              </a:spcAft>
-              <a:buSzPts val="3600"/>
-              <a:buNone/>
-              <a:defRPr sz="3600"/>
-            </a:lvl3pPr>
-            <a:lvl4pPr lvl="3" algn="ctr">
-              <a:spcBef>
-                <a:spcPts val="0"/>
-              </a:spcBef>
-              <a:spcAft>
-                <a:spcPts val="0"/>
-              </a:spcAft>
-              <a:buSzPts val="3600"/>
-              <a:buNone/>
-              <a:defRPr sz="3600"/>
-            </a:lvl4pPr>
-            <a:lvl5pPr lvl="4" algn="ctr">
-              <a:spcBef>
-                <a:spcPts val="0"/>
-              </a:spcBef>
-              <a:spcAft>
-                <a:spcPts val="0"/>
-              </a:spcAft>
-              <a:buSzPts val="3600"/>
-              <a:buNone/>
-              <a:defRPr sz="3600"/>
-            </a:lvl5pPr>
-            <a:lvl6pPr lvl="5" algn="ctr">
-              <a:spcBef>
-                <a:spcPts val="0"/>
-              </a:spcBef>
-              <a:spcAft>
-                <a:spcPts val="0"/>
-              </a:spcAft>
-              <a:buSzPts val="3600"/>
-              <a:buNone/>
-              <a:defRPr sz="3600"/>
-            </a:lvl6pPr>
-            <a:lvl7pPr lvl="6" algn="ctr">
-              <a:spcBef>
-                <a:spcPts val="0"/>
-              </a:spcBef>
-              <a:spcAft>
-                <a:spcPts val="0"/>
-              </a:spcAft>
-              <a:buSzPts val="3600"/>
-              <a:buNone/>
-              <a:defRPr sz="3600"/>
-            </a:lvl7pPr>
-            <a:lvl8pPr lvl="7" algn="ctr">
-              <a:spcBef>
-                <a:spcPts val="0"/>
-              </a:spcBef>
-              <a:spcAft>
-                <a:spcPts val="0"/>
-              </a:spcAft>
-              <a:buSzPts val="3600"/>
-              <a:buNone/>
-              <a:defRPr sz="3600"/>
-            </a:lvl8pPr>
-            <a:lvl9pPr lvl="8" algn="ctr">
-              <a:spcBef>
-                <a:spcPts val="0"/>
-              </a:spcBef>
-              <a:spcAft>
-                <a:spcPts val="0"/>
-              </a:spcAft>
-              <a:buSzPts val="3600"/>
-              <a:buNone/>
-              <a:defRPr sz="3600"/>
-            </a:lvl9pPr>
-          </a:lstStyle>
-          <a:p>
-            <a:endParaRPr/>
-          </a:p>
-        </p:txBody>
-      </p:sp>
-      <p:sp>
-        <p:nvSpPr>
-          <p:cNvPr id="15" name="Google Shape;15;p3"/>
-          <p:cNvSpPr txBox="1">
-            <a:spLocks noGrp="1"/>
-          </p:cNvSpPr>
-          <p:nvPr>
-            <p:ph type="sldNum" idx="12"/>
-          </p:nvPr>
-        </p:nvSpPr>
-        <p:spPr>
-          <a:xfrm>
-            <a:off x="8472458" y="4663217"/>
-            <a:ext cx="548700" cy="393600"/>
-          </a:xfrm>
-          <a:prstGeom prst="rect">
-            <a:avLst/>
-          </a:prstGeom>
-        </p:spPr>
-        <p:txBody>
-          <a:bodyPr spcFirstLastPara="1" wrap="square" lIns="91425" tIns="91425" rIns="91425" bIns="91425" anchor="ctr" anchorCtr="0">
-            <a:normAutofit/>
-          </a:bodyPr>
-          <a:lstStyle>
-            <a:lvl1pPr lvl="0">
-              <a:buNone/>
-              <a:defRPr/>
-            </a:lvl1pPr>
-            <a:lvl2pPr lvl="1">
-              <a:buNone/>
-              <a:defRPr/>
-            </a:lvl2pPr>
-            <a:lvl3pPr lvl="2">
-              <a:buNone/>
-              <a:defRPr/>
-            </a:lvl3pPr>
-            <a:lvl4pPr lvl="3">
-              <a:buNone/>
-              <a:defRPr/>
-            </a:lvl4pPr>
-            <a:lvl5pPr lvl="4">
-              <a:buNone/>
-              <a:defRPr/>
-            </a:lvl5pPr>
-            <a:lvl6pPr lvl="5">
-              <a:buNone/>
-              <a:defRPr/>
-            </a:lvl6pPr>
-            <a:lvl7pPr lvl="6">
-              <a:buNone/>
-              <a:defRPr/>
-            </a:lvl7pPr>
-            <a:lvl8pPr lvl="7">
-              <a:buNone/>
-              <a:defRPr/>
-            </a:lvl8pPr>
-            <a:lvl9pPr lvl="8">
-              <a:buNone/>
-              <a:defRPr/>
-            </a:lvl9pPr>
-          </a:lstStyle>
-          <a:p>
-            <a:pPr marL="0" lvl="0" indent="0" algn="r" rtl="0">
-              <a:spcBef>
-                <a:spcPts val="0"/>
-              </a:spcBef>
-              <a:spcAft>
-                <a:spcPts val="0"/>
-              </a:spcAft>
-              <a:buNone/>
-            </a:pPr>
-            <a:fld id="{00000000-1234-1234-1234-123412341234}" type="slidenum">
-              <a:rPr lang="en"/>
-              <a:t>‹#›</a:t>
-            </a:fld>
-            <a:endParaRPr/>
-          </a:p>
-        </p:txBody>
-      </p:sp>
-    </p:spTree>
-  </p:cSld>
-  <p:clrMapOvr>
-    <a:masterClrMapping/>
-  </p:clrMapOvr>
-</p:sldLayout>
-</file>
-
-<file path=ppt/slideLayouts/slideLayout20.xml><?xml version="1.0" encoding="utf-8"?>
+<file path=ppt/slideLayouts/slideLayout19.xml><?xml version="1.0" encoding="utf-8"?>
 <p:sldLayout xmlns:a="http://schemas.openxmlformats.org/drawingml/2006/main" xmlns:r="http://schemas.openxmlformats.org/officeDocument/2006/relationships" xmlns:p="http://schemas.openxmlformats.org/presentationml/2006/main" matchingName="Section Header Moss">
   <p:cSld name="Section Header Moss">
     <p:bg>
@@ -9256,7 +8992,240 @@
 </p:sldLayout>
 </file>
 
-<file path=ppt/slideLayouts/slideLayout21.xml><?xml version="1.0" encoding="utf-8"?>
+<file path=ppt/slideLayouts/slideLayout2.xml><?xml version="1.0" encoding="utf-8"?>
+<p:sldLayout xmlns:a="http://schemas.openxmlformats.org/drawingml/2006/main" xmlns:r="http://schemas.openxmlformats.org/officeDocument/2006/relationships" xmlns:p="http://schemas.openxmlformats.org/presentationml/2006/main" matchingName="Section header" type="secHead">
+  <p:cSld name="SECTION_HEADER">
+    <p:spTree>
+      <p:nvGrpSpPr>
+        <p:cNvPr id="1" name="Shape 13"/>
+        <p:cNvGrpSpPr/>
+        <p:nvPr/>
+      </p:nvGrpSpPr>
+      <p:grpSpPr>
+        <a:xfrm>
+          <a:off x="0" y="0"/>
+          <a:ext cx="0" cy="0"/>
+          <a:chOff x="0" y="0"/>
+          <a:chExt cx="0" cy="0"/>
+        </a:xfrm>
+      </p:grpSpPr>
+      <p:sp>
+        <p:nvSpPr>
+          <p:cNvPr id="14" name="Google Shape;14;p3"/>
+          <p:cNvSpPr txBox="1">
+            <a:spLocks noGrp="1"/>
+          </p:cNvSpPr>
+          <p:nvPr>
+            <p:ph type="title"/>
+          </p:nvPr>
+        </p:nvSpPr>
+        <p:spPr>
+          <a:xfrm>
+            <a:off x="311700" y="2150850"/>
+            <a:ext cx="8520600" cy="841800"/>
+          </a:xfrm>
+          <a:prstGeom prst="rect">
+            <a:avLst/>
+          </a:prstGeom>
+        </p:spPr>
+        <p:txBody>
+          <a:bodyPr spcFirstLastPara="1" wrap="square" lIns="91425" tIns="91425" rIns="91425" bIns="91425" anchor="ctr" anchorCtr="0">
+            <a:normAutofit/>
+          </a:bodyPr>
+          <a:lstStyle>
+            <a:lvl1pPr lvl="0" algn="ctr">
+              <a:spcBef>
+                <a:spcPts val="0"/>
+              </a:spcBef>
+              <a:spcAft>
+                <a:spcPts val="0"/>
+              </a:spcAft>
+              <a:buSzPts val="3600"/>
+              <a:buNone/>
+              <a:defRPr sz="3600"/>
+            </a:lvl1pPr>
+            <a:lvl2pPr lvl="1" algn="ctr">
+              <a:spcBef>
+                <a:spcPts val="0"/>
+              </a:spcBef>
+              <a:spcAft>
+                <a:spcPts val="0"/>
+              </a:spcAft>
+              <a:buSzPts val="3600"/>
+              <a:buNone/>
+              <a:defRPr sz="3600"/>
+            </a:lvl2pPr>
+            <a:lvl3pPr lvl="2" algn="ctr">
+              <a:spcBef>
+                <a:spcPts val="0"/>
+              </a:spcBef>
+              <a:spcAft>
+                <a:spcPts val="0"/>
+              </a:spcAft>
+              <a:buSzPts val="3600"/>
+              <a:buNone/>
+              <a:defRPr sz="3600"/>
+            </a:lvl3pPr>
+            <a:lvl4pPr lvl="3" algn="ctr">
+              <a:spcBef>
+                <a:spcPts val="0"/>
+              </a:spcBef>
+              <a:spcAft>
+                <a:spcPts val="0"/>
+              </a:spcAft>
+              <a:buSzPts val="3600"/>
+              <a:buNone/>
+              <a:defRPr sz="3600"/>
+            </a:lvl4pPr>
+            <a:lvl5pPr lvl="4" algn="ctr">
+              <a:spcBef>
+                <a:spcPts val="0"/>
+              </a:spcBef>
+              <a:spcAft>
+                <a:spcPts val="0"/>
+              </a:spcAft>
+              <a:buSzPts val="3600"/>
+              <a:buNone/>
+              <a:defRPr sz="3600"/>
+            </a:lvl5pPr>
+            <a:lvl6pPr lvl="5" algn="ctr">
+              <a:spcBef>
+                <a:spcPts val="0"/>
+              </a:spcBef>
+              <a:spcAft>
+                <a:spcPts val="0"/>
+              </a:spcAft>
+              <a:buSzPts val="3600"/>
+              <a:buNone/>
+              <a:defRPr sz="3600"/>
+            </a:lvl6pPr>
+            <a:lvl7pPr lvl="6" algn="ctr">
+              <a:spcBef>
+                <a:spcPts val="0"/>
+              </a:spcBef>
+              <a:spcAft>
+                <a:spcPts val="0"/>
+              </a:spcAft>
+              <a:buSzPts val="3600"/>
+              <a:buNone/>
+              <a:defRPr sz="3600"/>
+            </a:lvl7pPr>
+            <a:lvl8pPr lvl="7" algn="ctr">
+              <a:spcBef>
+                <a:spcPts val="0"/>
+              </a:spcBef>
+              <a:spcAft>
+                <a:spcPts val="0"/>
+              </a:spcAft>
+              <a:buSzPts val="3600"/>
+              <a:buNone/>
+              <a:defRPr sz="3600"/>
+            </a:lvl8pPr>
+            <a:lvl9pPr lvl="8" algn="ctr">
+              <a:spcBef>
+                <a:spcPts val="0"/>
+              </a:spcBef>
+              <a:spcAft>
+                <a:spcPts val="0"/>
+              </a:spcAft>
+              <a:buSzPts val="3600"/>
+              <a:buNone/>
+              <a:defRPr sz="3600"/>
+            </a:lvl9pPr>
+          </a:lstStyle>
+          <a:p>
+            <a:endParaRPr/>
+          </a:p>
+        </p:txBody>
+      </p:sp>
+      <p:sp>
+        <p:nvSpPr>
+          <p:cNvPr id="15" name="Google Shape;15;p3"/>
+          <p:cNvSpPr txBox="1">
+            <a:spLocks noGrp="1"/>
+          </p:cNvSpPr>
+          <p:nvPr>
+            <p:ph type="sldNum" idx="12"/>
+          </p:nvPr>
+        </p:nvSpPr>
+        <p:spPr>
+          <a:xfrm>
+            <a:off x="8472458" y="4663217"/>
+            <a:ext cx="548700" cy="393600"/>
+          </a:xfrm>
+          <a:prstGeom prst="rect">
+            <a:avLst/>
+          </a:prstGeom>
+        </p:spPr>
+        <p:txBody>
+          <a:bodyPr spcFirstLastPara="1" wrap="square" lIns="91425" tIns="91425" rIns="91425" bIns="91425" anchor="ctr" anchorCtr="0">
+            <a:normAutofit/>
+          </a:bodyPr>
+          <a:lstStyle>
+            <a:lvl1pPr lvl="0">
+              <a:buNone/>
+              <a:defRPr/>
+            </a:lvl1pPr>
+            <a:lvl2pPr lvl="1">
+              <a:buNone/>
+              <a:defRPr/>
+            </a:lvl2pPr>
+            <a:lvl3pPr lvl="2">
+              <a:buNone/>
+              <a:defRPr/>
+            </a:lvl3pPr>
+            <a:lvl4pPr lvl="3">
+              <a:buNone/>
+              <a:defRPr/>
+            </a:lvl4pPr>
+            <a:lvl5pPr lvl="4">
+              <a:buNone/>
+              <a:defRPr/>
+            </a:lvl5pPr>
+            <a:lvl6pPr lvl="5">
+              <a:buNone/>
+              <a:defRPr/>
+            </a:lvl6pPr>
+            <a:lvl7pPr lvl="6">
+              <a:buNone/>
+              <a:defRPr/>
+            </a:lvl7pPr>
+            <a:lvl8pPr lvl="7">
+              <a:buNone/>
+              <a:defRPr/>
+            </a:lvl8pPr>
+            <a:lvl9pPr lvl="8">
+              <a:buNone/>
+              <a:defRPr/>
+            </a:lvl9pPr>
+          </a:lstStyle>
+          <a:p>
+            <a:pPr marL="0" lvl="0" indent="0" algn="r" rtl="0">
+              <a:spcBef>
+                <a:spcPts val="0"/>
+              </a:spcBef>
+              <a:spcAft>
+                <a:spcPts val="0"/>
+              </a:spcAft>
+              <a:buNone/>
+            </a:pPr>
+            <a:fld id="{00000000-1234-1234-1234-123412341234}" type="slidenum">
+              <a:rPr lang="en"/>
+              <a:t>‹#›</a:t>
+            </a:fld>
+            <a:endParaRPr/>
+          </a:p>
+        </p:txBody>
+      </p:sp>
+    </p:spTree>
+  </p:cSld>
+  <p:clrMapOvr>
+    <a:masterClrMapping/>
+  </p:clrMapOvr>
+</p:sldLayout>
+</file>
+
+<file path=ppt/slideLayouts/slideLayout20.xml><?xml version="1.0" encoding="utf-8"?>
 <p:sldLayout xmlns:a="http://schemas.openxmlformats.org/drawingml/2006/main" xmlns:r="http://schemas.openxmlformats.org/officeDocument/2006/relationships" xmlns:p="http://schemas.openxmlformats.org/presentationml/2006/main" matchingName="Section Header Sea Green">
   <p:cSld name="Section Header Sea Green">
     <p:bg>
@@ -9672,7 +9641,7 @@
 </p:sldLayout>
 </file>
 
-<file path=ppt/slideLayouts/slideLayout22.xml><?xml version="1.0" encoding="utf-8"?>
+<file path=ppt/slideLayouts/slideLayout21.xml><?xml version="1.0" encoding="utf-8"?>
 <p:sldLayout xmlns:a="http://schemas.openxmlformats.org/drawingml/2006/main" xmlns:r="http://schemas.openxmlformats.org/officeDocument/2006/relationships" xmlns:p="http://schemas.openxmlformats.org/presentationml/2006/main" matchingName="Section Header Coral">
   <p:cSld name="Section Header Coral">
     <p:bg>
@@ -10088,7 +10057,7 @@
 </p:sldLayout>
 </file>
 
-<file path=ppt/slideLayouts/slideLayout23.xml><?xml version="1.0" encoding="utf-8"?>
+<file path=ppt/slideLayouts/slideLayout22.xml><?xml version="1.0" encoding="utf-8"?>
 <p:sldLayout xmlns:a="http://schemas.openxmlformats.org/drawingml/2006/main" xmlns:r="http://schemas.openxmlformats.org/officeDocument/2006/relationships" xmlns:p="http://schemas.openxmlformats.org/presentationml/2006/main" matchingName="Section Header Gold">
   <p:cSld name="Section Header Gold">
     <p:bg>
@@ -10586,7 +10555,7 @@
 </p:sldLayout>
 </file>
 
-<file path=ppt/slideLayouts/slideLayout24.xml><?xml version="1.0" encoding="utf-8"?>
+<file path=ppt/slideLayouts/slideLayout23.xml><?xml version="1.0" encoding="utf-8"?>
 <p:sldLayout xmlns:a="http://schemas.openxmlformats.org/drawingml/2006/main" xmlns:r="http://schemas.openxmlformats.org/officeDocument/2006/relationships" xmlns:p="http://schemas.openxmlformats.org/presentationml/2006/main" matchingName="Section Header Aqua 1">
   <p:cSld name="Section Header Aqua_1">
     <p:bg>
@@ -13845,8 +13814,7 @@
     <p:sldLayoutId id="2147483655" r:id="rId7"/>
     <p:sldLayoutId id="2147483656" r:id="rId8"/>
     <p:sldLayoutId id="2147483657" r:id="rId9"/>
-    <p:sldLayoutId id="2147483658" r:id="rId10"/>
-    <p:sldLayoutId id="2147483674" r:id="rId11"/>
+    <p:sldLayoutId id="2147483674" r:id="rId10"/>
   </p:sldLayoutIdLst>
   <p:hf hdr="0" ftr="0" dt="0"/>
   <p:txStyles>
@@ -15458,67 +15426,13 @@
   <p:cSld>
     <p:spTree>
       <p:nvGrpSpPr>
-        <p:cNvPr id="1" name=""/>
-        <p:cNvGrpSpPr/>
-        <p:nvPr/>
-      </p:nvGrpSpPr>
-      <p:grpSpPr>
-        <a:xfrm>
-          <a:off x="0" y="0"/>
-          <a:ext cx="0" cy="0"/>
-          <a:chOff x="0" y="0"/>
-          <a:chExt cx="0" cy="0"/>
-        </a:xfrm>
-      </p:grpSpPr>
-      <p:pic>
-        <p:nvPicPr>
-          <p:cNvPr id="5" name="Picture 4" descr="A graph with lines on it&#10;&#10;Description automatically generated">
-            <a:extLst>
-              <a:ext uri="{FF2B5EF4-FFF2-40B4-BE49-F238E27FC236}">
-                <a16:creationId xmlns:a16="http://schemas.microsoft.com/office/drawing/2014/main" id="{85DE8DA2-008B-B696-2906-590548B9AD72}"/>
-              </a:ext>
-            </a:extLst>
-          </p:cNvPr>
-          <p:cNvPicPr>
-            <a:picLocks noChangeAspect="1"/>
-          </p:cNvPicPr>
-          <p:nvPr/>
-        </p:nvPicPr>
-        <p:blipFill>
-          <a:blip r:embed="rId2"/>
-          <a:stretch>
-            <a:fillRect/>
-          </a:stretch>
-        </p:blipFill>
-        <p:spPr>
-          <a:xfrm>
-            <a:off x="1560457" y="598890"/>
-            <a:ext cx="6023085" cy="4270290"/>
-          </a:xfrm>
-          <a:prstGeom prst="rect">
-            <a:avLst/>
-          </a:prstGeom>
-        </p:spPr>
-      </p:pic>
-    </p:spTree>
-    <p:extLst>
-      <p:ext uri="{BB962C8B-B14F-4D97-AF65-F5344CB8AC3E}">
-        <p14:creationId xmlns:p14="http://schemas.microsoft.com/office/powerpoint/2010/main" val="1706905883"/>
-      </p:ext>
-    </p:extLst>
-  </p:cSld>
-  <p:clrMapOvr>
-    <a:masterClrMapping/>
-  </p:clrMapOvr>
-</p:sld>
-</file>
-
-<file path=ppt/slides/slide10.xml><?xml version="1.0" encoding="utf-8"?>
-<p:sld xmlns:a="http://schemas.openxmlformats.org/drawingml/2006/main" xmlns:r="http://schemas.openxmlformats.org/officeDocument/2006/relationships" xmlns:p="http://schemas.openxmlformats.org/presentationml/2006/main">
-  <p:cSld>
-    <p:spTree>
-      <p:nvGrpSpPr>
-        <p:cNvPr id="1" name=""/>
+        <p:cNvPr id="1" name="">
+          <a:extLst>
+            <a:ext uri="{FF2B5EF4-FFF2-40B4-BE49-F238E27FC236}">
+              <a16:creationId xmlns:a16="http://schemas.microsoft.com/office/drawing/2014/main" id="{AC5509D1-F4F3-3EE5-BEDB-D88422B14743}"/>
+            </a:ext>
+          </a:extLst>
+        </p:cNvPr>
         <p:cNvGrpSpPr/>
         <p:nvPr/>
       </p:nvGrpSpPr>
@@ -15535,7 +15449,7 @@
           <p:cNvPr id="2" name="Title 1">
             <a:extLst>
               <a:ext uri="{FF2B5EF4-FFF2-40B4-BE49-F238E27FC236}">
-                <a16:creationId xmlns:a16="http://schemas.microsoft.com/office/drawing/2014/main" id="{3983CC3A-88D2-560B-B5EE-EC61D5A52242}"/>
+                <a16:creationId xmlns:a16="http://schemas.microsoft.com/office/drawing/2014/main" id="{083FC874-D072-F6CC-D993-D8CCE9388350}"/>
               </a:ext>
             </a:extLst>
           </p:cNvPr>
@@ -15548,18 +15462,12 @@
         </p:nvSpPr>
         <p:spPr/>
         <p:txBody>
-          <a:bodyPr>
-            <a:noAutofit/>
-          </a:bodyPr>
+          <a:bodyPr/>
           <a:lstStyle/>
           <a:p>
             <a:r>
-              <a:rPr lang="en-US" sz="3200" dirty="0">
-                <a:solidFill>
-                  <a:srgbClr val="004B83"/>
-                </a:solidFill>
-              </a:rPr>
-              <a:t>Local vs client/server databases</a:t>
+              <a:rPr lang="en-US" dirty="0"/>
+              <a:t>What is the primary key?</a:t>
             </a:r>
           </a:p>
         </p:txBody>
@@ -15569,7 +15477,7 @@
           <p:cNvPr id="3" name="Text Placeholder 2">
             <a:extLst>
               <a:ext uri="{FF2B5EF4-FFF2-40B4-BE49-F238E27FC236}">
-                <a16:creationId xmlns:a16="http://schemas.microsoft.com/office/drawing/2014/main" id="{F193F1C7-E077-68D2-7E2A-8BAB71A382D9}"/>
+                <a16:creationId xmlns:a16="http://schemas.microsoft.com/office/drawing/2014/main" id="{CAA99298-63BF-1B96-E1ED-10FDE7E35B82}"/>
               </a:ext>
             </a:extLst>
           </p:cNvPr>
@@ -15580,275 +15488,98 @@
             <p:ph type="body" idx="1"/>
           </p:nvPr>
         </p:nvSpPr>
-        <p:spPr>
-          <a:xfrm>
-            <a:off x="311700" y="1160224"/>
-            <a:ext cx="3999900" cy="3416400"/>
-          </a:xfrm>
-        </p:spPr>
+        <p:spPr/>
         <p:txBody>
-          <a:bodyPr>
-            <a:normAutofit/>
-          </a:bodyPr>
+          <a:bodyPr/>
           <a:lstStyle/>
           <a:p>
-            <a:pPr marL="139700" indent="0">
-              <a:buNone/>
-            </a:pPr>
             <a:r>
-              <a:rPr lang="en-US" b="1" u="sng" dirty="0">
-                <a:latin typeface="Avenir Book" panose="02000503020000020003" pitchFamily="2" charset="0"/>
-              </a:rPr>
-              <a:t>Local (</a:t>
+              <a:rPr lang="en-US" dirty="0"/>
+              <a:t>(</a:t>
             </a:r>
             <a:r>
-              <a:rPr lang="en-US" b="1" u="sng" dirty="0" err="1">
-                <a:latin typeface="Avenir Book" panose="02000503020000020003" pitchFamily="2" charset="0"/>
-              </a:rPr>
-              <a:t>DuckDB</a:t>
+              <a:rPr lang="en-US" dirty="0" err="1"/>
+              <a:t>student_id</a:t>
             </a:r>
             <a:r>
-              <a:rPr lang="en-US" b="1" u="sng" dirty="0">
-                <a:latin typeface="Avenir Book" panose="02000503020000020003" pitchFamily="2" charset="0"/>
-              </a:rPr>
-              <a:t>, SQLite)</a:t>
+              <a:rPr lang="en-US" dirty="0"/>
+              <a:t>, </a:t>
             </a:r>
-            <a:br>
-              <a:rPr lang="en-US" b="1" u="sng" dirty="0">
-                <a:latin typeface="Avenir Book" panose="02000503020000020003" pitchFamily="2" charset="0"/>
-              </a:rPr>
-            </a:br>
-            <a:endParaRPr lang="en-US" b="1" u="sng" dirty="0">
-              <a:latin typeface="Avenir Book" panose="02000503020000020003" pitchFamily="2" charset="0"/>
-            </a:endParaRPr>
+            <a:r>
+              <a:rPr lang="en-US" dirty="0" err="1"/>
+              <a:t>wand_id</a:t>
+            </a:r>
+            <a:r>
+              <a:rPr lang="en-US" dirty="0"/>
+              <a:t>)</a:t>
+            </a:r>
           </a:p>
           <a:p>
             <a:r>
               <a:rPr lang="en-US" dirty="0">
                 <a:latin typeface="Avenir Book" panose="02000503020000020003" pitchFamily="2" charset="0"/>
               </a:rPr>
-              <a:t>Storage</a:t>
+              <a:t>(</a:t>
             </a:r>
-          </a:p>
-          <a:p>
-            <a:pPr lvl="1"/>
+            <a:r>
+              <a:rPr lang="en-US" dirty="0" err="1">
+                <a:latin typeface="Avenir Book" panose="02000503020000020003" pitchFamily="2" charset="0"/>
+              </a:rPr>
+              <a:t>st</a:t>
+            </a:r>
+            <a:r>
+              <a:rPr lang="en-US" dirty="0" err="1"/>
+              <a:t>udent_id</a:t>
+            </a:r>
+            <a:r>
+              <a:rPr lang="en-US" dirty="0"/>
+              <a:t>, </a:t>
+            </a:r>
+            <a:r>
+              <a:rPr lang="en-US" dirty="0" err="1"/>
+              <a:t>wand_id</a:t>
+            </a:r>
+            <a:r>
+              <a:rPr lang="en-US" dirty="0"/>
+              <a:t>, </a:t>
+            </a:r>
+            <a:r>
+              <a:rPr lang="en-US" dirty="0" err="1"/>
+              <a:t>begin_date</a:t>
+            </a:r>
+            <a:r>
+              <a:rPr lang="en-US" dirty="0"/>
+              <a:t>, </a:t>
+            </a:r>
+            <a:r>
+              <a:rPr lang="en-US" dirty="0" err="1"/>
+              <a:t>end_date</a:t>
+            </a:r>
+            <a:r>
+              <a:rPr lang="en-US" dirty="0"/>
+              <a:t>)</a:t>
+            </a:r>
+          </a:p>
+          <a:p>
             <a:r>
               <a:rPr lang="en-US" dirty="0">
                 <a:latin typeface="Avenir Book" panose="02000503020000020003" pitchFamily="2" charset="0"/>
               </a:rPr>
-              <a:t>(Single) local file</a:t>
+              <a:t>There isn’t on</a:t>
             </a:r>
-          </a:p>
-          <a:p>
             <a:r>
-              <a:rPr lang="en-US" dirty="0">
-                <a:latin typeface="Avenir Book" panose="02000503020000020003" pitchFamily="2" charset="0"/>
-              </a:rPr>
-              <a:t>Access</a:t>
+              <a:rPr lang="en-US" dirty="0"/>
+              <a:t>e</a:t>
             </a:r>
-          </a:p>
-          <a:p>
-            <a:pPr lvl="1"/>
-            <a:r>
-              <a:rPr lang="en-US" dirty="0">
-                <a:latin typeface="Avenir Book" panose="02000503020000020003" pitchFamily="2" charset="0"/>
-              </a:rPr>
-              <a:t>Command line tool or library open that file</a:t>
-            </a:r>
-          </a:p>
-          <a:p>
-            <a:pPr lvl="1"/>
-            <a:r>
-              <a:rPr lang="en-US" dirty="0">
-                <a:latin typeface="Avenir Book" panose="02000503020000020003" pitchFamily="2" charset="0"/>
-              </a:rPr>
-              <a:t>No authentication, etc.</a:t>
-            </a:r>
-          </a:p>
-          <a:p>
-            <a:r>
-              <a:rPr lang="en-US" dirty="0">
-                <a:latin typeface="Avenir Book" panose="02000503020000020003" pitchFamily="2" charset="0"/>
-              </a:rPr>
-              <a:t>Support for SQL standard</a:t>
-            </a:r>
-          </a:p>
-          <a:p>
-            <a:pPr lvl="1"/>
-            <a:r>
-              <a:rPr lang="en-US" dirty="0">
-                <a:latin typeface="Avenir Book" panose="02000503020000020003" pitchFamily="2" charset="0"/>
-              </a:rPr>
-              <a:t>Essentials there, but many pieces missing</a:t>
-            </a:r>
-          </a:p>
-          <a:p>
-            <a:r>
-              <a:rPr lang="en-US" dirty="0">
-                <a:latin typeface="Avenir Book" panose="02000503020000020003" pitchFamily="2" charset="0"/>
-              </a:rPr>
-              <a:t>Installation; management</a:t>
-            </a:r>
-          </a:p>
-          <a:p>
-            <a:pPr lvl="1"/>
-            <a:r>
-              <a:rPr lang="en-US" dirty="0">
-                <a:latin typeface="Avenir Book" panose="02000503020000020003" pitchFamily="2" charset="0"/>
-              </a:rPr>
-              <a:t>Super easy; nil</a:t>
-            </a:r>
-          </a:p>
-          <a:p>
-            <a:r>
-              <a:rPr lang="en-US" dirty="0">
-                <a:latin typeface="Avenir Book" panose="02000503020000020003" pitchFamily="2" charset="0"/>
-              </a:rPr>
-              <a:t>Data portability</a:t>
-            </a:r>
-          </a:p>
-          <a:p>
-            <a:pPr lvl="1"/>
-            <a:r>
-              <a:rPr lang="en-US" dirty="0">
-                <a:latin typeface="Avenir Book" panose="02000503020000020003" pitchFamily="2" charset="0"/>
-              </a:rPr>
-              <a:t>Great</a:t>
-            </a:r>
-          </a:p>
-          <a:p>
             <a:endParaRPr lang="en-US" dirty="0">
               <a:latin typeface="Avenir Book" panose="02000503020000020003" pitchFamily="2" charset="0"/>
             </a:endParaRPr>
           </a:p>
-        </p:txBody>
-      </p:sp>
-      <p:sp>
-        <p:nvSpPr>
-          <p:cNvPr id="5" name="Text Placeholder 4">
-            <a:extLst>
-              <a:ext uri="{FF2B5EF4-FFF2-40B4-BE49-F238E27FC236}">
-                <a16:creationId xmlns:a16="http://schemas.microsoft.com/office/drawing/2014/main" id="{2C0BF0BB-D4A5-F8CB-F94E-192EFE9AF1EC}"/>
-              </a:ext>
-            </a:extLst>
-          </p:cNvPr>
-          <p:cNvSpPr>
-            <a:spLocks noGrp="1"/>
-          </p:cNvSpPr>
-          <p:nvPr>
-            <p:ph type="body" idx="2"/>
-          </p:nvPr>
-        </p:nvSpPr>
-        <p:spPr/>
-        <p:txBody>
-          <a:bodyPr>
-            <a:normAutofit/>
-          </a:bodyPr>
-          <a:lstStyle/>
-          <a:p>
-            <a:pPr marL="139700" indent="0">
-              <a:buNone/>
-            </a:pPr>
-            <a:r>
-              <a:rPr lang="en-US" b="1" u="sng" dirty="0">
-                <a:latin typeface="Avenir Book" panose="02000503020000020003" pitchFamily="2" charset="0"/>
-              </a:rPr>
-              <a:t>Client/server RDBMS (Oracle, SQL Server, PostgreSQL, MySQL, …)</a:t>
-            </a:r>
-          </a:p>
-          <a:p>
-            <a:r>
-              <a:rPr lang="en-US" dirty="0">
-                <a:latin typeface="Avenir Book" panose="02000503020000020003" pitchFamily="2" charset="0"/>
-              </a:rPr>
-              <a:t>Storage</a:t>
-            </a:r>
-          </a:p>
           <a:p>
             <a:pPr lvl="1"/>
-            <a:r>
-              <a:rPr lang="en-US" dirty="0">
-                <a:latin typeface="Avenir Book" panose="02000503020000020003" pitchFamily="2" charset="0"/>
-              </a:rPr>
-              <a:t>A mystery</a:t>
-            </a:r>
-          </a:p>
-          <a:p>
-            <a:r>
-              <a:rPr lang="en-US" dirty="0">
-                <a:latin typeface="Avenir Book" panose="02000503020000020003" pitchFamily="2" charset="0"/>
-              </a:rPr>
-              <a:t>Access</a:t>
-            </a:r>
-          </a:p>
-          <a:p>
-            <a:pPr lvl="1"/>
-            <a:r>
-              <a:rPr lang="en-US" dirty="0">
-                <a:latin typeface="Avenir Book" panose="02000503020000020003" pitchFamily="2" charset="0"/>
-              </a:rPr>
-              <a:t>Command line tool or library talk over network (even on same machine)</a:t>
-            </a:r>
-          </a:p>
-          <a:p>
-            <a:pPr lvl="1"/>
-            <a:r>
-              <a:rPr lang="en-US" dirty="0">
-                <a:latin typeface="Avenir Book" panose="02000503020000020003" pitchFamily="2" charset="0"/>
-              </a:rPr>
-              <a:t>User accounts, authentication, permissions</a:t>
-            </a:r>
-          </a:p>
-          <a:p>
-            <a:r>
-              <a:rPr lang="en-US" dirty="0">
-                <a:latin typeface="Avenir Book" panose="02000503020000020003" pitchFamily="2" charset="0"/>
-              </a:rPr>
-              <a:t>Support for SQL standard</a:t>
-            </a:r>
-          </a:p>
-          <a:p>
-            <a:pPr lvl="1"/>
-            <a:r>
-              <a:rPr lang="en-US" dirty="0">
-                <a:latin typeface="Avenir Book" panose="02000503020000020003" pitchFamily="2" charset="0"/>
-              </a:rPr>
-              <a:t>Very good</a:t>
-            </a:r>
-          </a:p>
-          <a:p>
-            <a:r>
-              <a:rPr lang="en-US" dirty="0">
-                <a:latin typeface="Avenir Book" panose="02000503020000020003" pitchFamily="2" charset="0"/>
-              </a:rPr>
-              <a:t>Installation; management</a:t>
-            </a:r>
-          </a:p>
-          <a:p>
-            <a:pPr lvl="1"/>
-            <a:r>
-              <a:rPr lang="en-US" dirty="0">
-                <a:latin typeface="Avenir Book" panose="02000503020000020003" pitchFamily="2" charset="0"/>
-              </a:rPr>
-              <a:t>Easy; obscure</a:t>
-            </a:r>
-          </a:p>
-          <a:p>
-            <a:r>
-              <a:rPr lang="en-US" dirty="0">
-                <a:latin typeface="Avenir Book" panose="02000503020000020003" pitchFamily="2" charset="0"/>
-              </a:rPr>
-              <a:t>Data portability</a:t>
-            </a:r>
-          </a:p>
-          <a:p>
-            <a:pPr lvl="1"/>
-            <a:r>
-              <a:rPr lang="en-US" dirty="0">
-                <a:latin typeface="Avenir Book" panose="02000503020000020003" pitchFamily="2" charset="0"/>
-              </a:rPr>
-              <a:t>Weak to nil</a:t>
-            </a:r>
+            <a:endParaRPr lang="en-US" dirty="0">
+              <a:latin typeface="Avenir Book" panose="02000503020000020003" pitchFamily="2" charset="0"/>
+            </a:endParaRPr>
           </a:p>
         </p:txBody>
       </p:sp>
@@ -15857,7 +15588,7 @@
           <p:cNvPr id="4" name="Slide Number Placeholder 3">
             <a:extLst>
               <a:ext uri="{FF2B5EF4-FFF2-40B4-BE49-F238E27FC236}">
-                <a16:creationId xmlns:a16="http://schemas.microsoft.com/office/drawing/2014/main" id="{F75D26E5-4B9C-AE7C-4F67-C282F63E900E}"/>
+                <a16:creationId xmlns:a16="http://schemas.microsoft.com/office/drawing/2014/main" id="{7F00B7B2-96CD-5903-CE85-7DF4C2807B0F}"/>
               </a:ext>
             </a:extLst>
           </p:cNvPr>
@@ -15884,16 +15615,234 @@
             </a:pPr>
             <a:fld id="{00000000-1234-1234-1234-123412341234}" type="slidenum">
               <a:rPr lang="en" smtClean="0"/>
-              <a:t>10</a:t>
+              <a:t>1</a:t>
             </a:fld>
             <a:endParaRPr lang="en" dirty="0"/>
           </a:p>
         </p:txBody>
       </p:sp>
+      <p:graphicFrame>
+        <p:nvGraphicFramePr>
+          <p:cNvPr id="6" name="Table 5">
+            <a:extLst>
+              <a:ext uri="{FF2B5EF4-FFF2-40B4-BE49-F238E27FC236}">
+                <a16:creationId xmlns:a16="http://schemas.microsoft.com/office/drawing/2014/main" id="{434EDD36-0865-52BF-3C7C-6C41235EB9FB}"/>
+              </a:ext>
+            </a:extLst>
+          </p:cNvPr>
+          <p:cNvGraphicFramePr>
+            <a:graphicFrameLocks noGrp="1"/>
+          </p:cNvGraphicFramePr>
+          <p:nvPr>
+            <p:extLst>
+              <p:ext uri="{D42A27DB-BD31-4B8C-83A1-F6EECF244321}">
+                <p14:modId xmlns:p14="http://schemas.microsoft.com/office/powerpoint/2010/main" val="3135815801"/>
+              </p:ext>
+            </p:extLst>
+          </p:nvPr>
+        </p:nvGraphicFramePr>
+        <p:xfrm>
+          <a:off x="4748170" y="2237354"/>
+          <a:ext cx="2894202" cy="2192035"/>
+        </p:xfrm>
+        <a:graphic>
+          <a:graphicData uri="http://schemas.openxmlformats.org/drawingml/2006/table">
+            <a:tbl>
+              <a:tblPr firstRow="1" bandRow="1">
+                <a:tableStyleId>{5C22544A-7EE6-4342-B048-85BDC9FD1C3A}</a:tableStyleId>
+              </a:tblPr>
+              <a:tblGrid>
+                <a:gridCol w="1447101">
+                  <a:extLst>
+                    <a:ext uri="{9D8B030D-6E8A-4147-A177-3AD203B41FA5}">
+                      <a16:colId xmlns:a16="http://schemas.microsoft.com/office/drawing/2014/main" val="3496730573"/>
+                    </a:ext>
+                  </a:extLst>
+                </a:gridCol>
+                <a:gridCol w="1447101">
+                  <a:extLst>
+                    <a:ext uri="{9D8B030D-6E8A-4147-A177-3AD203B41FA5}">
+                      <a16:colId xmlns:a16="http://schemas.microsoft.com/office/drawing/2014/main" val="3590654764"/>
+                    </a:ext>
+                  </a:extLst>
+                </a:gridCol>
+              </a:tblGrid>
+              <a:tr h="438407">
+                <a:tc gridSpan="2">
+                  <a:txBody>
+                    <a:bodyPr/>
+                    <a:lstStyle/>
+                    <a:p>
+                      <a:pPr algn="ctr"/>
+                      <a:r>
+                        <a:rPr lang="en-US" dirty="0" err="1"/>
+                        <a:t>wand_ownership</a:t>
+                      </a:r>
+                      <a:endParaRPr lang="en-US" dirty="0"/>
+                    </a:p>
+                  </a:txBody>
+                  <a:tcPr/>
+                </a:tc>
+                <a:tc hMerge="1">
+                  <a:txBody>
+                    <a:bodyPr/>
+                    <a:lstStyle/>
+                    <a:p>
+                      <a:endParaRPr lang="en-US" dirty="0"/>
+                    </a:p>
+                  </a:txBody>
+                  <a:tcPr/>
+                </a:tc>
+                <a:extLst>
+                  <a:ext uri="{0D108BD9-81ED-4DB2-BD59-A6C34878D82A}">
+                    <a16:rowId xmlns:a16="http://schemas.microsoft.com/office/drawing/2014/main" val="693708830"/>
+                  </a:ext>
+                </a:extLst>
+              </a:tr>
+              <a:tr h="438407">
+                <a:tc>
+                  <a:txBody>
+                    <a:bodyPr/>
+                    <a:lstStyle/>
+                    <a:p>
+                      <a:r>
+                        <a:rPr lang="en-US" dirty="0" err="1"/>
+                        <a:t>student_id</a:t>
+                      </a:r>
+                      <a:endParaRPr lang="en-US" dirty="0"/>
+                    </a:p>
+                  </a:txBody>
+                  <a:tcPr/>
+                </a:tc>
+                <a:tc>
+                  <a:txBody>
+                    <a:bodyPr/>
+                    <a:lstStyle/>
+                    <a:p>
+                      <a:r>
+                        <a:rPr lang="en-US" dirty="0"/>
+                        <a:t>integer FK</a:t>
+                      </a:r>
+                    </a:p>
+                  </a:txBody>
+                  <a:tcPr/>
+                </a:tc>
+                <a:extLst>
+                  <a:ext uri="{0D108BD9-81ED-4DB2-BD59-A6C34878D82A}">
+                    <a16:rowId xmlns:a16="http://schemas.microsoft.com/office/drawing/2014/main" val="3985099677"/>
+                  </a:ext>
+                </a:extLst>
+              </a:tr>
+              <a:tr h="438407">
+                <a:tc>
+                  <a:txBody>
+                    <a:bodyPr/>
+                    <a:lstStyle/>
+                    <a:p>
+                      <a:r>
+                        <a:rPr lang="en-US" dirty="0" err="1"/>
+                        <a:t>wand_id</a:t>
+                      </a:r>
+                      <a:endParaRPr lang="en-US" dirty="0"/>
+                    </a:p>
+                  </a:txBody>
+                  <a:tcPr/>
+                </a:tc>
+                <a:tc>
+                  <a:txBody>
+                    <a:bodyPr/>
+                    <a:lstStyle/>
+                    <a:p>
+                      <a:r>
+                        <a:rPr lang="en-US" dirty="0"/>
+                        <a:t>integer FK</a:t>
+                      </a:r>
+                    </a:p>
+                  </a:txBody>
+                  <a:tcPr/>
+                </a:tc>
+                <a:extLst>
+                  <a:ext uri="{0D108BD9-81ED-4DB2-BD59-A6C34878D82A}">
+                    <a16:rowId xmlns:a16="http://schemas.microsoft.com/office/drawing/2014/main" val="1504382681"/>
+                  </a:ext>
+                </a:extLst>
+              </a:tr>
+              <a:tr h="438407">
+                <a:tc>
+                  <a:txBody>
+                    <a:bodyPr/>
+                    <a:lstStyle/>
+                    <a:p>
+                      <a:r>
+                        <a:rPr lang="en-US" dirty="0" err="1"/>
+                        <a:t>begin_date</a:t>
+                      </a:r>
+                      <a:endParaRPr lang="en-US" dirty="0"/>
+                    </a:p>
+                  </a:txBody>
+                  <a:tcPr/>
+                </a:tc>
+                <a:tc>
+                  <a:txBody>
+                    <a:bodyPr/>
+                    <a:lstStyle/>
+                    <a:p>
+                      <a:r>
+                        <a:rPr lang="en-US" dirty="0"/>
+                        <a:t>date</a:t>
+                      </a:r>
+                    </a:p>
+                  </a:txBody>
+                  <a:tcPr/>
+                </a:tc>
+                <a:extLst>
+                  <a:ext uri="{0D108BD9-81ED-4DB2-BD59-A6C34878D82A}">
+                    <a16:rowId xmlns:a16="http://schemas.microsoft.com/office/drawing/2014/main" val="2810616037"/>
+                  </a:ext>
+                </a:extLst>
+              </a:tr>
+              <a:tr h="438407">
+                <a:tc>
+                  <a:txBody>
+                    <a:bodyPr/>
+                    <a:lstStyle/>
+                    <a:p>
+                      <a:r>
+                        <a:rPr lang="en-US" dirty="0" err="1"/>
+                        <a:t>end_date</a:t>
+                      </a:r>
+                      <a:endParaRPr lang="en-US" dirty="0"/>
+                    </a:p>
+                  </a:txBody>
+                  <a:tcPr/>
+                </a:tc>
+                <a:tc>
+                  <a:txBody>
+                    <a:bodyPr/>
+                    <a:lstStyle/>
+                    <a:p>
+                      <a:r>
+                        <a:rPr lang="en-US" dirty="0"/>
+                        <a:t>date</a:t>
+                      </a:r>
+                    </a:p>
+                  </a:txBody>
+                  <a:tcPr/>
+                </a:tc>
+                <a:extLst>
+                  <a:ext uri="{0D108BD9-81ED-4DB2-BD59-A6C34878D82A}">
+                    <a16:rowId xmlns:a16="http://schemas.microsoft.com/office/drawing/2014/main" val="2227801376"/>
+                  </a:ext>
+                </a:extLst>
+              </a:tr>
+            </a:tbl>
+          </a:graphicData>
+        </a:graphic>
+      </p:graphicFrame>
     </p:spTree>
     <p:extLst>
       <p:ext uri="{BB962C8B-B14F-4D97-AF65-F5344CB8AC3E}">
-        <p14:creationId xmlns:p14="http://schemas.microsoft.com/office/powerpoint/2010/main" val="425826323"/>
+        <p14:creationId xmlns:p14="http://schemas.microsoft.com/office/powerpoint/2010/main" val="2719159997"/>
       </p:ext>
     </p:extLst>
   </p:cSld>
@@ -15903,194 +15852,7 @@
 </p:sld>
 </file>
 
-<file path=ppt/slides/slide11.xml><?xml version="1.0" encoding="utf-8"?>
-<p:sld xmlns:a="http://schemas.openxmlformats.org/drawingml/2006/main" xmlns:r="http://schemas.openxmlformats.org/officeDocument/2006/relationships" xmlns:p="http://schemas.openxmlformats.org/presentationml/2006/main">
-  <p:cSld>
-    <p:spTree>
-      <p:nvGrpSpPr>
-        <p:cNvPr id="1" name=""/>
-        <p:cNvGrpSpPr/>
-        <p:nvPr/>
-      </p:nvGrpSpPr>
-      <p:grpSpPr>
-        <a:xfrm>
-          <a:off x="0" y="0"/>
-          <a:ext cx="0" cy="0"/>
-          <a:chOff x="0" y="0"/>
-          <a:chExt cx="0" cy="0"/>
-        </a:xfrm>
-      </p:grpSpPr>
-      <p:sp>
-        <p:nvSpPr>
-          <p:cNvPr id="2" name="Title 1">
-            <a:extLst>
-              <a:ext uri="{FF2B5EF4-FFF2-40B4-BE49-F238E27FC236}">
-                <a16:creationId xmlns:a16="http://schemas.microsoft.com/office/drawing/2014/main" id="{8AC5CCEB-A687-D6ED-B4AF-5079878958D3}"/>
-              </a:ext>
-            </a:extLst>
-          </p:cNvPr>
-          <p:cNvSpPr>
-            <a:spLocks noGrp="1"/>
-          </p:cNvSpPr>
-          <p:nvPr>
-            <p:ph type="title"/>
-          </p:nvPr>
-        </p:nvSpPr>
-        <p:spPr/>
-        <p:txBody>
-          <a:bodyPr/>
-          <a:lstStyle/>
-          <a:p>
-            <a:r>
-              <a:rPr lang="en-US" dirty="0"/>
-              <a:t>Our running</a:t>
-            </a:r>
-            <a:br>
-              <a:rPr lang="en-US" dirty="0"/>
-            </a:br>
-            <a:r>
-              <a:rPr lang="en-US" dirty="0"/>
-              <a:t>example</a:t>
-            </a:r>
-          </a:p>
-        </p:txBody>
-      </p:sp>
-      <p:sp>
-        <p:nvSpPr>
-          <p:cNvPr id="3" name="Text Placeholder 2">
-            <a:extLst>
-              <a:ext uri="{FF2B5EF4-FFF2-40B4-BE49-F238E27FC236}">
-                <a16:creationId xmlns:a16="http://schemas.microsoft.com/office/drawing/2014/main" id="{8D4858E6-4CF3-6CBA-F078-C3696711D9E1}"/>
-              </a:ext>
-            </a:extLst>
-          </p:cNvPr>
-          <p:cNvSpPr>
-            <a:spLocks noGrp="1"/>
-          </p:cNvSpPr>
-          <p:nvPr>
-            <p:ph type="body" idx="1"/>
-          </p:nvPr>
-        </p:nvSpPr>
-        <p:spPr/>
-        <p:txBody>
-          <a:bodyPr/>
-          <a:lstStyle/>
-          <a:p>
-            <a:endParaRPr lang="en-US" dirty="0"/>
-          </a:p>
-          <a:p>
-            <a:endParaRPr lang="en-US" dirty="0"/>
-          </a:p>
-          <a:p>
-            <a:r>
-              <a:rPr lang="en-US" dirty="0"/>
-              <a:t>Crow’s foot: many side</a:t>
-            </a:r>
-            <a:br>
-              <a:rPr lang="en-US" dirty="0"/>
-            </a:br>
-            <a:r>
-              <a:rPr lang="en-US" dirty="0"/>
-              <a:t>of many-to-one</a:t>
-            </a:r>
-            <a:br>
-              <a:rPr lang="en-US" dirty="0"/>
-            </a:br>
-            <a:r>
-              <a:rPr lang="en-US" dirty="0"/>
-              <a:t>relationship</a:t>
-            </a:r>
-          </a:p>
-          <a:p>
-            <a:r>
-              <a:rPr lang="en-US" dirty="0"/>
-              <a:t>Primary keys in bold</a:t>
-            </a:r>
-          </a:p>
-        </p:txBody>
-      </p:sp>
-      <p:sp>
-        <p:nvSpPr>
-          <p:cNvPr id="4" name="Slide Number Placeholder 3">
-            <a:extLst>
-              <a:ext uri="{FF2B5EF4-FFF2-40B4-BE49-F238E27FC236}">
-                <a16:creationId xmlns:a16="http://schemas.microsoft.com/office/drawing/2014/main" id="{FE817B71-1919-0615-A618-ECA54F9954BE}"/>
-              </a:ext>
-            </a:extLst>
-          </p:cNvPr>
-          <p:cNvSpPr>
-            <a:spLocks noGrp="1"/>
-          </p:cNvSpPr>
-          <p:nvPr>
-            <p:ph type="sldNum" idx="12"/>
-          </p:nvPr>
-        </p:nvSpPr>
-        <p:spPr/>
-        <p:txBody>
-          <a:bodyPr/>
-          <a:lstStyle/>
-          <a:p>
-            <a:pPr marL="0" lvl="0" indent="0" algn="r" rtl="0">
-              <a:spcBef>
-                <a:spcPts val="0"/>
-              </a:spcBef>
-              <a:spcAft>
-                <a:spcPts val="0"/>
-              </a:spcAft>
-              <a:buNone/>
-            </a:pPr>
-            <a:fld id="{00000000-1234-1234-1234-123412341234}" type="slidenum">
-              <a:rPr lang="en" smtClean="0"/>
-              <a:t>11</a:t>
-            </a:fld>
-            <a:endParaRPr lang="en" dirty="0"/>
-          </a:p>
-        </p:txBody>
-      </p:sp>
-      <p:pic>
-        <p:nvPicPr>
-          <p:cNvPr id="6" name="Picture 5">
-            <a:extLst>
-              <a:ext uri="{FF2B5EF4-FFF2-40B4-BE49-F238E27FC236}">
-                <a16:creationId xmlns:a16="http://schemas.microsoft.com/office/drawing/2014/main" id="{22F1DBE0-0A13-753A-6AE0-935AF8A47957}"/>
-              </a:ext>
-            </a:extLst>
-          </p:cNvPr>
-          <p:cNvPicPr>
-            <a:picLocks noChangeAspect="1"/>
-          </p:cNvPicPr>
-          <p:nvPr/>
-        </p:nvPicPr>
-        <p:blipFill>
-          <a:blip r:embed="rId2"/>
-          <a:stretch>
-            <a:fillRect/>
-          </a:stretch>
-        </p:blipFill>
-        <p:spPr>
-          <a:xfrm>
-            <a:off x="3582876" y="4"/>
-            <a:ext cx="5062409" cy="5143500"/>
-          </a:xfrm>
-          <a:prstGeom prst="rect">
-            <a:avLst/>
-          </a:prstGeom>
-        </p:spPr>
-      </p:pic>
-    </p:spTree>
-    <p:extLst>
-      <p:ext uri="{BB962C8B-B14F-4D97-AF65-F5344CB8AC3E}">
-        <p14:creationId xmlns:p14="http://schemas.microsoft.com/office/powerpoint/2010/main" val="2204738551"/>
-      </p:ext>
-    </p:extLst>
-  </p:cSld>
-  <p:clrMapOvr>
-    <a:masterClrMapping/>
-  </p:clrMapOvr>
-</p:sld>
-</file>
-
-<file path=ppt/slides/slide12.xml><?xml version="1.0" encoding="utf-8"?>
+<file path=ppt/slides/slide10.xml><?xml version="1.0" encoding="utf-8"?>
 <p:sld xmlns:a="http://schemas.openxmlformats.org/drawingml/2006/main" xmlns:r="http://schemas.openxmlformats.org/officeDocument/2006/relationships" xmlns:p="http://schemas.openxmlformats.org/presentationml/2006/main">
   <p:cSld>
     <p:spTree>
@@ -16227,6 +15989,20 @@
           </a:p>
           <a:p>
             <a:pPr lvl="1"/>
+            <a:endParaRPr lang="en-US" dirty="0">
+              <a:latin typeface="Avenir Book" panose="02000503020000020003" pitchFamily="2" charset="0"/>
+            </a:endParaRPr>
+          </a:p>
+          <a:p>
+            <a:r>
+              <a:rPr lang="en-US" dirty="0">
+                <a:latin typeface="Avenir Book" panose="02000503020000020003" pitchFamily="2" charset="0"/>
+              </a:rPr>
+              <a:t>Thursday</a:t>
+            </a:r>
+          </a:p>
+          <a:p>
+            <a:pPr lvl="1"/>
             <a:r>
               <a:rPr lang="en-US" dirty="0">
                 <a:latin typeface="Avenir Book" panose="02000503020000020003" pitchFamily="2" charset="0"/>
@@ -16250,20 +16026,6 @@
                 <a:latin typeface="Avenir Book" panose="02000503020000020003" pitchFamily="2" charset="0"/>
               </a:rPr>
               <a:t>NULL processing</a:t>
-            </a:r>
-          </a:p>
-          <a:p>
-            <a:pPr lvl="1"/>
-            <a:endParaRPr lang="en-US" dirty="0">
-              <a:latin typeface="Avenir Book" panose="02000503020000020003" pitchFamily="2" charset="0"/>
-            </a:endParaRPr>
-          </a:p>
-          <a:p>
-            <a:r>
-              <a:rPr lang="en-US" dirty="0">
-                <a:latin typeface="Avenir Book" panose="02000503020000020003" pitchFamily="2" charset="0"/>
-              </a:rPr>
-              <a:t>Wednesday</a:t>
             </a:r>
           </a:p>
           <a:p>
@@ -16457,7 +16219,7 @@
             </a:pPr>
             <a:fld id="{00000000-1234-1234-1234-123412341234}" type="slidenum">
               <a:rPr lang="en" smtClean="0"/>
-              <a:t>12</a:t>
+              <a:t>10</a:t>
             </a:fld>
             <a:endParaRPr lang="en" dirty="0"/>
           </a:p>
@@ -16477,6 +16239,375 @@
 </file>
 
 <file path=ppt/slides/slide2.xml><?xml version="1.0" encoding="utf-8"?>
+<p:sld xmlns:a="http://schemas.openxmlformats.org/drawingml/2006/main" xmlns:r="http://schemas.openxmlformats.org/officeDocument/2006/relationships" xmlns:p="http://schemas.openxmlformats.org/presentationml/2006/main">
+  <p:cSld>
+    <p:spTree>
+      <p:nvGrpSpPr>
+        <p:cNvPr id="1" name="">
+          <a:extLst>
+            <a:ext uri="{FF2B5EF4-FFF2-40B4-BE49-F238E27FC236}">
+              <a16:creationId xmlns:a16="http://schemas.microsoft.com/office/drawing/2014/main" id="{7865C796-DEEA-6AA6-8BCA-2CA021740EB2}"/>
+            </a:ext>
+          </a:extLst>
+        </p:cNvPr>
+        <p:cNvGrpSpPr/>
+        <p:nvPr/>
+      </p:nvGrpSpPr>
+      <p:grpSpPr>
+        <a:xfrm>
+          <a:off x="0" y="0"/>
+          <a:ext cx="0" cy="0"/>
+          <a:chOff x="0" y="0"/>
+          <a:chExt cx="0" cy="0"/>
+        </a:xfrm>
+      </p:grpSpPr>
+      <p:sp>
+        <p:nvSpPr>
+          <p:cNvPr id="2" name="Title 1">
+            <a:extLst>
+              <a:ext uri="{FF2B5EF4-FFF2-40B4-BE49-F238E27FC236}">
+                <a16:creationId xmlns:a16="http://schemas.microsoft.com/office/drawing/2014/main" id="{55E15880-FA24-58C4-AF9D-CF96C5612B29}"/>
+              </a:ext>
+            </a:extLst>
+          </p:cNvPr>
+          <p:cNvSpPr>
+            <a:spLocks noGrp="1"/>
+          </p:cNvSpPr>
+          <p:nvPr>
+            <p:ph type="title"/>
+          </p:nvPr>
+        </p:nvSpPr>
+        <p:spPr/>
+        <p:txBody>
+          <a:bodyPr/>
+          <a:lstStyle/>
+          <a:p>
+            <a:r>
+              <a:rPr lang="en-US" dirty="0"/>
+              <a:t>Good idea or not?</a:t>
+            </a:r>
+          </a:p>
+        </p:txBody>
+      </p:sp>
+      <p:sp>
+        <p:nvSpPr>
+          <p:cNvPr id="4" name="Slide Number Placeholder 3">
+            <a:extLst>
+              <a:ext uri="{FF2B5EF4-FFF2-40B4-BE49-F238E27FC236}">
+                <a16:creationId xmlns:a16="http://schemas.microsoft.com/office/drawing/2014/main" id="{50D84AFA-A2D5-9DF1-1CC7-4043A598639C}"/>
+              </a:ext>
+            </a:extLst>
+          </p:cNvPr>
+          <p:cNvSpPr>
+            <a:spLocks noGrp="1"/>
+          </p:cNvSpPr>
+          <p:nvPr>
+            <p:ph type="sldNum" idx="12"/>
+          </p:nvPr>
+        </p:nvSpPr>
+        <p:spPr/>
+        <p:txBody>
+          <a:bodyPr/>
+          <a:lstStyle/>
+          <a:p>
+            <a:pPr marL="0" lvl="0" indent="0" algn="r" rtl="0">
+              <a:spcBef>
+                <a:spcPts val="0"/>
+              </a:spcBef>
+              <a:spcAft>
+                <a:spcPts val="0"/>
+              </a:spcAft>
+              <a:buNone/>
+            </a:pPr>
+            <a:fld id="{00000000-1234-1234-1234-123412341234}" type="slidenum">
+              <a:rPr lang="en" smtClean="0"/>
+              <a:t>2</a:t>
+            </a:fld>
+            <a:endParaRPr lang="en" dirty="0"/>
+          </a:p>
+        </p:txBody>
+      </p:sp>
+      <p:graphicFrame>
+        <p:nvGraphicFramePr>
+          <p:cNvPr id="6" name="Table 5">
+            <a:extLst>
+              <a:ext uri="{FF2B5EF4-FFF2-40B4-BE49-F238E27FC236}">
+                <a16:creationId xmlns:a16="http://schemas.microsoft.com/office/drawing/2014/main" id="{6A46DF75-C4BD-91F6-6F64-175BF807C7AF}"/>
+              </a:ext>
+            </a:extLst>
+          </p:cNvPr>
+          <p:cNvGraphicFramePr>
+            <a:graphicFrameLocks noGrp="1"/>
+          </p:cNvGraphicFramePr>
+          <p:nvPr>
+            <p:extLst>
+              <p:ext uri="{D42A27DB-BD31-4B8C-83A1-F6EECF244321}">
+                <p14:modId xmlns:p14="http://schemas.microsoft.com/office/powerpoint/2010/main" val="3364154654"/>
+              </p:ext>
+            </p:extLst>
+          </p:nvPr>
+        </p:nvGraphicFramePr>
+        <p:xfrm>
+          <a:off x="3028427" y="1624957"/>
+          <a:ext cx="2894202" cy="2192035"/>
+        </p:xfrm>
+        <a:graphic>
+          <a:graphicData uri="http://schemas.openxmlformats.org/drawingml/2006/table">
+            <a:tbl>
+              <a:tblPr firstRow="1" bandRow="1">
+                <a:tableStyleId>{5C22544A-7EE6-4342-B048-85BDC9FD1C3A}</a:tableStyleId>
+              </a:tblPr>
+              <a:tblGrid>
+                <a:gridCol w="1447101">
+                  <a:extLst>
+                    <a:ext uri="{9D8B030D-6E8A-4147-A177-3AD203B41FA5}">
+                      <a16:colId xmlns:a16="http://schemas.microsoft.com/office/drawing/2014/main" val="3496730573"/>
+                    </a:ext>
+                  </a:extLst>
+                </a:gridCol>
+                <a:gridCol w="1447101">
+                  <a:extLst>
+                    <a:ext uri="{9D8B030D-6E8A-4147-A177-3AD203B41FA5}">
+                      <a16:colId xmlns:a16="http://schemas.microsoft.com/office/drawing/2014/main" val="3590654764"/>
+                    </a:ext>
+                  </a:extLst>
+                </a:gridCol>
+              </a:tblGrid>
+              <a:tr h="438407">
+                <a:tc gridSpan="2">
+                  <a:txBody>
+                    <a:bodyPr/>
+                    <a:lstStyle/>
+                    <a:p>
+                      <a:pPr algn="ctr"/>
+                      <a:r>
+                        <a:rPr lang="en-US" dirty="0"/>
+                        <a:t>house</a:t>
+                      </a:r>
+                    </a:p>
+                  </a:txBody>
+                  <a:tcPr/>
+                </a:tc>
+                <a:tc hMerge="1">
+                  <a:txBody>
+                    <a:bodyPr/>
+                    <a:lstStyle/>
+                    <a:p>
+                      <a:endParaRPr lang="en-US" dirty="0"/>
+                    </a:p>
+                  </a:txBody>
+                  <a:tcPr/>
+                </a:tc>
+                <a:extLst>
+                  <a:ext uri="{0D108BD9-81ED-4DB2-BD59-A6C34878D82A}">
+                    <a16:rowId xmlns:a16="http://schemas.microsoft.com/office/drawing/2014/main" val="693708830"/>
+                  </a:ext>
+                </a:extLst>
+              </a:tr>
+              <a:tr h="438407">
+                <a:tc>
+                  <a:txBody>
+                    <a:bodyPr/>
+                    <a:lstStyle/>
+                    <a:p>
+                      <a:r>
+                        <a:rPr lang="en-US" dirty="0" err="1"/>
+                        <a:t>house_id</a:t>
+                      </a:r>
+                      <a:endParaRPr lang="en-US" dirty="0"/>
+                    </a:p>
+                  </a:txBody>
+                  <a:tcPr/>
+                </a:tc>
+                <a:tc>
+                  <a:txBody>
+                    <a:bodyPr/>
+                    <a:lstStyle/>
+                    <a:p>
+                      <a:r>
+                        <a:rPr lang="en-US" dirty="0"/>
+                        <a:t>integer PK</a:t>
+                      </a:r>
+                    </a:p>
+                  </a:txBody>
+                  <a:tcPr/>
+                </a:tc>
+                <a:extLst>
+                  <a:ext uri="{0D108BD9-81ED-4DB2-BD59-A6C34878D82A}">
+                    <a16:rowId xmlns:a16="http://schemas.microsoft.com/office/drawing/2014/main" val="3985099677"/>
+                  </a:ext>
+                </a:extLst>
+              </a:tr>
+              <a:tr h="438407">
+                <a:tc>
+                  <a:txBody>
+                    <a:bodyPr/>
+                    <a:lstStyle/>
+                    <a:p>
+                      <a:r>
+                        <a:rPr lang="en-US" dirty="0"/>
+                        <a:t>name</a:t>
+                      </a:r>
+                    </a:p>
+                  </a:txBody>
+                  <a:tcPr/>
+                </a:tc>
+                <a:tc>
+                  <a:txBody>
+                    <a:bodyPr/>
+                    <a:lstStyle/>
+                    <a:p>
+                      <a:r>
+                        <a:rPr lang="en-US" dirty="0"/>
+                        <a:t>text</a:t>
+                      </a:r>
+                    </a:p>
+                  </a:txBody>
+                  <a:tcPr/>
+                </a:tc>
+                <a:extLst>
+                  <a:ext uri="{0D108BD9-81ED-4DB2-BD59-A6C34878D82A}">
+                    <a16:rowId xmlns:a16="http://schemas.microsoft.com/office/drawing/2014/main" val="1504382681"/>
+                  </a:ext>
+                </a:extLst>
+              </a:tr>
+              <a:tr h="438407">
+                <a:tc>
+                  <a:txBody>
+                    <a:bodyPr/>
+                    <a:lstStyle/>
+                    <a:p>
+                      <a:r>
+                        <a:rPr lang="en-US" dirty="0"/>
+                        <a:t>housemaster</a:t>
+                      </a:r>
+                    </a:p>
+                  </a:txBody>
+                  <a:tcPr/>
+                </a:tc>
+                <a:tc>
+                  <a:txBody>
+                    <a:bodyPr/>
+                    <a:lstStyle/>
+                    <a:p>
+                      <a:r>
+                        <a:rPr lang="en-US" dirty="0"/>
+                        <a:t>text</a:t>
+                      </a:r>
+                    </a:p>
+                  </a:txBody>
+                  <a:tcPr/>
+                </a:tc>
+                <a:extLst>
+                  <a:ext uri="{0D108BD9-81ED-4DB2-BD59-A6C34878D82A}">
+                    <a16:rowId xmlns:a16="http://schemas.microsoft.com/office/drawing/2014/main" val="2810616037"/>
+                  </a:ext>
+                </a:extLst>
+              </a:tr>
+              <a:tr h="438407">
+                <a:tc>
+                  <a:txBody>
+                    <a:bodyPr/>
+                    <a:lstStyle/>
+                    <a:p>
+                      <a:r>
+                        <a:rPr lang="en-US" dirty="0" err="1"/>
+                        <a:t>num_students</a:t>
+                      </a:r>
+                      <a:endParaRPr lang="en-US" dirty="0"/>
+                    </a:p>
+                  </a:txBody>
+                  <a:tcPr/>
+                </a:tc>
+                <a:tc>
+                  <a:txBody>
+                    <a:bodyPr/>
+                    <a:lstStyle/>
+                    <a:p>
+                      <a:r>
+                        <a:rPr lang="en-US" dirty="0"/>
+                        <a:t>integer</a:t>
+                      </a:r>
+                    </a:p>
+                  </a:txBody>
+                  <a:tcPr/>
+                </a:tc>
+                <a:extLst>
+                  <a:ext uri="{0D108BD9-81ED-4DB2-BD59-A6C34878D82A}">
+                    <a16:rowId xmlns:a16="http://schemas.microsoft.com/office/drawing/2014/main" val="2227801376"/>
+                  </a:ext>
+                </a:extLst>
+              </a:tr>
+            </a:tbl>
+          </a:graphicData>
+        </a:graphic>
+      </p:graphicFrame>
+      <p:sp>
+        <p:nvSpPr>
+          <p:cNvPr id="11" name="Right Arrow 10">
+            <a:extLst>
+              <a:ext uri="{FF2B5EF4-FFF2-40B4-BE49-F238E27FC236}">
+                <a16:creationId xmlns:a16="http://schemas.microsoft.com/office/drawing/2014/main" id="{16A2A594-B48E-2BE6-5824-5910FE93FC0A}"/>
+              </a:ext>
+            </a:extLst>
+          </p:cNvPr>
+          <p:cNvSpPr/>
+          <p:nvPr/>
+        </p:nvSpPr>
+        <p:spPr>
+          <a:xfrm>
+            <a:off x="2206304" y="3473042"/>
+            <a:ext cx="545284" cy="184558"/>
+          </a:xfrm>
+          <a:prstGeom prst="rightArrow">
+            <a:avLst/>
+          </a:prstGeom>
+          <a:solidFill>
+            <a:srgbClr val="C00000"/>
+          </a:solidFill>
+          <a:ln>
+            <a:noFill/>
+          </a:ln>
+        </p:spPr>
+        <p:style>
+          <a:lnRef idx="2">
+            <a:schemeClr val="accent1">
+              <a:shade val="15000"/>
+            </a:schemeClr>
+          </a:lnRef>
+          <a:fillRef idx="1">
+            <a:schemeClr val="accent1"/>
+          </a:fillRef>
+          <a:effectRef idx="0">
+            <a:schemeClr val="accent1"/>
+          </a:effectRef>
+          <a:fontRef idx="minor">
+            <a:schemeClr val="lt1"/>
+          </a:fontRef>
+        </p:style>
+        <p:txBody>
+          <a:bodyPr rtlCol="0" anchor="ctr"/>
+          <a:lstStyle/>
+          <a:p>
+            <a:pPr algn="ctr"/>
+            <a:endParaRPr lang="en-US"/>
+          </a:p>
+        </p:txBody>
+      </p:sp>
+    </p:spTree>
+    <p:extLst>
+      <p:ext uri="{BB962C8B-B14F-4D97-AF65-F5344CB8AC3E}">
+        <p14:creationId xmlns:p14="http://schemas.microsoft.com/office/powerpoint/2010/main" val="2365527945"/>
+      </p:ext>
+    </p:extLst>
+  </p:cSld>
+  <p:clrMapOvr>
+    <a:masterClrMapping/>
+  </p:clrMapOvr>
+</p:sld>
+</file>
+
+<file path=ppt/slides/slide3.xml><?xml version="1.0" encoding="utf-8"?>
 <p:sld xmlns:a="http://schemas.openxmlformats.org/drawingml/2006/main" xmlns:r="http://schemas.openxmlformats.org/officeDocument/2006/relationships" xmlns:p="http://schemas.openxmlformats.org/presentationml/2006/main">
   <p:cSld>
     <p:spTree>
@@ -16892,7 +17023,7 @@
 </p:sld>
 </file>
 
-<file path=ppt/slides/slide3.xml><?xml version="1.0" encoding="utf-8"?>
+<file path=ppt/slides/slide4.xml><?xml version="1.0" encoding="utf-8"?>
 <p:sld xmlns:a="http://schemas.openxmlformats.org/drawingml/2006/main" xmlns:r="http://schemas.openxmlformats.org/officeDocument/2006/relationships" xmlns:p="http://schemas.openxmlformats.org/presentationml/2006/main">
   <p:cSld>
     <p:spTree>
@@ -17015,7 +17146,7 @@
             </a:pPr>
             <a:fld id="{00000000-1234-1234-1234-123412341234}" type="slidenum">
               <a:rPr lang="en" smtClean="0"/>
-              <a:t>3</a:t>
+              <a:t>4</a:t>
             </a:fld>
             <a:endParaRPr lang="en" dirty="0"/>
           </a:p>
@@ -17029,7 +17160,7 @@
 </p:sld>
 </file>
 
-<file path=ppt/slides/slide4.xml><?xml version="1.0" encoding="utf-8"?>
+<file path=ppt/slides/slide5.xml><?xml version="1.0" encoding="utf-8"?>
 <p:sld xmlns:a="http://schemas.openxmlformats.org/drawingml/2006/main" xmlns:r="http://schemas.openxmlformats.org/officeDocument/2006/relationships" xmlns:p="http://schemas.openxmlformats.org/presentationml/2006/main">
   <p:cSld>
     <p:spTree>
@@ -17167,7 +17298,7 @@
             </a:pPr>
             <a:fld id="{00000000-1234-1234-1234-123412341234}" type="slidenum">
               <a:rPr lang="en" smtClean="0"/>
-              <a:t>4</a:t>
+              <a:t>5</a:t>
             </a:fld>
             <a:endParaRPr lang="en" dirty="0"/>
           </a:p>
@@ -17186,829 +17317,7 @@
 </p:sld>
 </file>
 
-<file path=ppt/slides/slide5.xml><?xml version="1.0" encoding="utf-8"?>
-<p:sld xmlns:a="http://schemas.openxmlformats.org/drawingml/2006/main" xmlns:r="http://schemas.openxmlformats.org/officeDocument/2006/relationships" xmlns:p="http://schemas.openxmlformats.org/presentationml/2006/main">
-  <p:cSld>
-    <p:spTree>
-      <p:nvGrpSpPr>
-        <p:cNvPr id="1" name=""/>
-        <p:cNvGrpSpPr/>
-        <p:nvPr/>
-      </p:nvGrpSpPr>
-      <p:grpSpPr>
-        <a:xfrm>
-          <a:off x="0" y="0"/>
-          <a:ext cx="0" cy="0"/>
-          <a:chOff x="0" y="0"/>
-          <a:chExt cx="0" cy="0"/>
-        </a:xfrm>
-      </p:grpSpPr>
-      <p:sp>
-        <p:nvSpPr>
-          <p:cNvPr id="2" name="Title 1">
-            <a:extLst>
-              <a:ext uri="{FF2B5EF4-FFF2-40B4-BE49-F238E27FC236}">
-                <a16:creationId xmlns:a16="http://schemas.microsoft.com/office/drawing/2014/main" id="{9DB64351-6E83-9234-4859-236F6C357363}"/>
-              </a:ext>
-            </a:extLst>
-          </p:cNvPr>
-          <p:cNvSpPr>
-            <a:spLocks noGrp="1"/>
-          </p:cNvSpPr>
-          <p:nvPr>
-            <p:ph type="title"/>
-          </p:nvPr>
-        </p:nvSpPr>
-        <p:spPr/>
-        <p:txBody>
-          <a:bodyPr/>
-          <a:lstStyle/>
-          <a:p>
-            <a:r>
-              <a:rPr lang="en-US" dirty="0"/>
-              <a:t>Homework answer</a:t>
-            </a:r>
-          </a:p>
-        </p:txBody>
-      </p:sp>
-      <p:sp>
-        <p:nvSpPr>
-          <p:cNvPr id="3" name="Text Placeholder 2">
-            <a:extLst>
-              <a:ext uri="{FF2B5EF4-FFF2-40B4-BE49-F238E27FC236}">
-                <a16:creationId xmlns:a16="http://schemas.microsoft.com/office/drawing/2014/main" id="{5410EFCE-8B20-519F-B33B-5DC35F362F82}"/>
-              </a:ext>
-            </a:extLst>
-          </p:cNvPr>
-          <p:cNvSpPr>
-            <a:spLocks noGrp="1"/>
-          </p:cNvSpPr>
-          <p:nvPr>
-            <p:ph type="body" idx="1"/>
-          </p:nvPr>
-        </p:nvSpPr>
-        <p:spPr/>
-        <p:txBody>
-          <a:bodyPr/>
-          <a:lstStyle/>
-          <a:p>
-            <a:endParaRPr lang="en-US"/>
-          </a:p>
-        </p:txBody>
-      </p:sp>
-      <p:sp>
-        <p:nvSpPr>
-          <p:cNvPr id="4" name="Slide Number Placeholder 3">
-            <a:extLst>
-              <a:ext uri="{FF2B5EF4-FFF2-40B4-BE49-F238E27FC236}">
-                <a16:creationId xmlns:a16="http://schemas.microsoft.com/office/drawing/2014/main" id="{F50187C7-4764-37F3-A9AC-DCFA68ACA6D6}"/>
-              </a:ext>
-            </a:extLst>
-          </p:cNvPr>
-          <p:cNvSpPr>
-            <a:spLocks noGrp="1"/>
-          </p:cNvSpPr>
-          <p:nvPr>
-            <p:ph type="sldNum" idx="12"/>
-          </p:nvPr>
-        </p:nvSpPr>
-        <p:spPr/>
-        <p:txBody>
-          <a:bodyPr/>
-          <a:lstStyle/>
-          <a:p>
-            <a:pPr marL="0" lvl="0" indent="0" algn="r" rtl="0">
-              <a:spcBef>
-                <a:spcPts val="0"/>
-              </a:spcBef>
-              <a:spcAft>
-                <a:spcPts val="0"/>
-              </a:spcAft>
-              <a:buNone/>
-            </a:pPr>
-            <a:fld id="{00000000-1234-1234-1234-123412341234}" type="slidenum">
-              <a:rPr lang="en" smtClean="0"/>
-              <a:t>5</a:t>
-            </a:fld>
-            <a:endParaRPr lang="en" dirty="0"/>
-          </a:p>
-        </p:txBody>
-      </p:sp>
-      <p:pic>
-        <p:nvPicPr>
-          <p:cNvPr id="6" name="Picture 5" descr="A screenshot of a computer&#10;&#10;Description automatically generated">
-            <a:extLst>
-              <a:ext uri="{FF2B5EF4-FFF2-40B4-BE49-F238E27FC236}">
-                <a16:creationId xmlns:a16="http://schemas.microsoft.com/office/drawing/2014/main" id="{A1FDED27-6EFA-13BB-1C05-07CF6B6D83E1}"/>
-              </a:ext>
-            </a:extLst>
-          </p:cNvPr>
-          <p:cNvPicPr>
-            <a:picLocks noChangeAspect="1"/>
-          </p:cNvPicPr>
-          <p:nvPr/>
-        </p:nvPicPr>
-        <p:blipFill>
-          <a:blip r:embed="rId2"/>
-          <a:stretch>
-            <a:fillRect/>
-          </a:stretch>
-        </p:blipFill>
-        <p:spPr>
-          <a:xfrm>
-            <a:off x="255711" y="1152475"/>
-            <a:ext cx="8632578" cy="3510742"/>
-          </a:xfrm>
-          <a:prstGeom prst="rect">
-            <a:avLst/>
-          </a:prstGeom>
-        </p:spPr>
-      </p:pic>
-    </p:spTree>
-    <p:extLst>
-      <p:ext uri="{BB962C8B-B14F-4D97-AF65-F5344CB8AC3E}">
-        <p14:creationId xmlns:p14="http://schemas.microsoft.com/office/powerpoint/2010/main" val="3465795364"/>
-      </p:ext>
-    </p:extLst>
-  </p:cSld>
-  <p:clrMapOvr>
-    <a:masterClrMapping/>
-  </p:clrMapOvr>
-</p:sld>
-</file>
-
 <file path=ppt/slides/slide6.xml><?xml version="1.0" encoding="utf-8"?>
-<p:sld xmlns:a="http://schemas.openxmlformats.org/drawingml/2006/main" xmlns:r="http://schemas.openxmlformats.org/officeDocument/2006/relationships" xmlns:p="http://schemas.openxmlformats.org/presentationml/2006/main">
-  <p:cSld>
-    <p:spTree>
-      <p:nvGrpSpPr>
-        <p:cNvPr id="1" name=""/>
-        <p:cNvGrpSpPr/>
-        <p:nvPr/>
-      </p:nvGrpSpPr>
-      <p:grpSpPr>
-        <a:xfrm>
-          <a:off x="0" y="0"/>
-          <a:ext cx="0" cy="0"/>
-          <a:chOff x="0" y="0"/>
-          <a:chExt cx="0" cy="0"/>
-        </a:xfrm>
-      </p:grpSpPr>
-      <p:sp>
-        <p:nvSpPr>
-          <p:cNvPr id="2" name="Title 1">
-            <a:extLst>
-              <a:ext uri="{FF2B5EF4-FFF2-40B4-BE49-F238E27FC236}">
-                <a16:creationId xmlns:a16="http://schemas.microsoft.com/office/drawing/2014/main" id="{DE722454-F369-ABA6-897C-787CA432D87B}"/>
-              </a:ext>
-            </a:extLst>
-          </p:cNvPr>
-          <p:cNvSpPr>
-            <a:spLocks noGrp="1"/>
-          </p:cNvSpPr>
-          <p:nvPr>
-            <p:ph type="title"/>
-          </p:nvPr>
-        </p:nvSpPr>
-        <p:spPr/>
-        <p:txBody>
-          <a:bodyPr/>
-          <a:lstStyle/>
-          <a:p>
-            <a:r>
-              <a:rPr lang="en-US" dirty="0"/>
-              <a:t>Homework answer</a:t>
-            </a:r>
-          </a:p>
-        </p:txBody>
-      </p:sp>
-      <p:sp>
-        <p:nvSpPr>
-          <p:cNvPr id="3" name="Text Placeholder 2">
-            <a:extLst>
-              <a:ext uri="{FF2B5EF4-FFF2-40B4-BE49-F238E27FC236}">
-                <a16:creationId xmlns:a16="http://schemas.microsoft.com/office/drawing/2014/main" id="{C44EBC40-0B72-3118-1E35-C2404E7C4A8D}"/>
-              </a:ext>
-            </a:extLst>
-          </p:cNvPr>
-          <p:cNvSpPr>
-            <a:spLocks noGrp="1"/>
-          </p:cNvSpPr>
-          <p:nvPr>
-            <p:ph type="body" idx="1"/>
-          </p:nvPr>
-        </p:nvSpPr>
-        <p:spPr/>
-        <p:txBody>
-          <a:bodyPr>
-            <a:normAutofit fontScale="62500" lnSpcReduction="20000"/>
-          </a:bodyPr>
-          <a:lstStyle/>
-          <a:p>
-            <a:pPr marL="114300" indent="0">
-              <a:buNone/>
-            </a:pPr>
-            <a:r>
-              <a:rPr lang="en-US" dirty="0">
-                <a:latin typeface="Courier New" panose="02070309020205020404" pitchFamily="49" charset="0"/>
-                <a:cs typeface="Courier New" panose="02070309020205020404" pitchFamily="49" charset="0"/>
-              </a:rPr>
-              <a:t>CREATE TABLE </a:t>
-            </a:r>
-            <a:r>
-              <a:rPr lang="en-US" dirty="0" err="1">
-                <a:latin typeface="Courier New" panose="02070309020205020404" pitchFamily="49" charset="0"/>
-                <a:cs typeface="Courier New" panose="02070309020205020404" pitchFamily="49" charset="0"/>
-              </a:rPr>
-              <a:t>Snow_survey</a:t>
-            </a:r>
-            <a:r>
-              <a:rPr lang="en-US" dirty="0">
-                <a:latin typeface="Courier New" panose="02070309020205020404" pitchFamily="49" charset="0"/>
-                <a:cs typeface="Courier New" panose="02070309020205020404" pitchFamily="49" charset="0"/>
-              </a:rPr>
-              <a:t> (</a:t>
-            </a:r>
-          </a:p>
-          <a:p>
-            <a:pPr marL="114300" indent="0">
-              <a:buNone/>
-            </a:pPr>
-            <a:r>
-              <a:rPr lang="en-US" dirty="0">
-                <a:latin typeface="Courier New" panose="02070309020205020404" pitchFamily="49" charset="0"/>
-                <a:cs typeface="Courier New" panose="02070309020205020404" pitchFamily="49" charset="0"/>
-              </a:rPr>
-              <a:t>    Site TEXT NOT NULL,</a:t>
-            </a:r>
-          </a:p>
-          <a:p>
-            <a:pPr marL="114300" indent="0">
-              <a:buNone/>
-            </a:pPr>
-            <a:r>
-              <a:rPr lang="en-US" dirty="0">
-                <a:latin typeface="Courier New" panose="02070309020205020404" pitchFamily="49" charset="0"/>
-                <a:cs typeface="Courier New" panose="02070309020205020404" pitchFamily="49" charset="0"/>
-              </a:rPr>
-              <a:t>    Year INTEGER NOT NULL CHECK (Year BETWEEN 2000 AND 2014),</a:t>
-            </a:r>
-          </a:p>
-          <a:p>
-            <a:pPr marL="114300" indent="0">
-              <a:buNone/>
-            </a:pPr>
-            <a:r>
-              <a:rPr lang="en-US" dirty="0">
-                <a:latin typeface="Courier New" panose="02070309020205020404" pitchFamily="49" charset="0"/>
-                <a:cs typeface="Courier New" panose="02070309020205020404" pitchFamily="49" charset="0"/>
-              </a:rPr>
-              <a:t>    Date DATE NOT NULL,</a:t>
-            </a:r>
-            <a:endParaRPr lang="en-US" dirty="0">
-              <a:solidFill>
-                <a:schemeClr val="accent5"/>
-              </a:solidFill>
-              <a:latin typeface="Courier New" panose="02070309020205020404" pitchFamily="49" charset="0"/>
-              <a:cs typeface="Courier New" panose="02070309020205020404" pitchFamily="49" charset="0"/>
-            </a:endParaRPr>
-          </a:p>
-          <a:p>
-            <a:pPr marL="114300" indent="0">
-              <a:buNone/>
-            </a:pPr>
-            <a:r>
-              <a:rPr lang="en-US" dirty="0">
-                <a:latin typeface="Courier New" panose="02070309020205020404" pitchFamily="49" charset="0"/>
-                <a:cs typeface="Courier New" panose="02070309020205020404" pitchFamily="49" charset="0"/>
-              </a:rPr>
-              <a:t>    Plot TEXT, </a:t>
-            </a:r>
-            <a:r>
-              <a:rPr lang="en-US" dirty="0">
-                <a:solidFill>
-                  <a:schemeClr val="accent5"/>
-                </a:solidFill>
-                <a:latin typeface="Courier New" panose="02070309020205020404" pitchFamily="49" charset="0"/>
-                <a:cs typeface="Courier New" panose="02070309020205020404" pitchFamily="49" charset="0"/>
-              </a:rPr>
-              <a:t>-- foreign key?</a:t>
-            </a:r>
-          </a:p>
-          <a:p>
-            <a:pPr marL="114300" indent="0">
-              <a:buNone/>
-            </a:pPr>
-            <a:r>
-              <a:rPr lang="en-US" dirty="0">
-                <a:latin typeface="Courier New" panose="02070309020205020404" pitchFamily="49" charset="0"/>
-                <a:cs typeface="Courier New" panose="02070309020205020404" pitchFamily="49" charset="0"/>
-              </a:rPr>
-              <a:t>    Location TEXT,</a:t>
-            </a:r>
-          </a:p>
-          <a:p>
-            <a:pPr marL="114300" indent="0">
-              <a:buNone/>
-            </a:pPr>
-            <a:r>
-              <a:rPr lang="en-US" dirty="0">
-                <a:latin typeface="Courier New" panose="02070309020205020404" pitchFamily="49" charset="0"/>
-                <a:cs typeface="Courier New" panose="02070309020205020404" pitchFamily="49" charset="0"/>
-              </a:rPr>
-              <a:t>    </a:t>
-            </a:r>
-            <a:r>
-              <a:rPr lang="en-US" dirty="0" err="1">
-                <a:latin typeface="Courier New" panose="02070309020205020404" pitchFamily="49" charset="0"/>
-                <a:cs typeface="Courier New" panose="02070309020205020404" pitchFamily="49" charset="0"/>
-              </a:rPr>
-              <a:t>Snow_cover</a:t>
-            </a:r>
-            <a:r>
-              <a:rPr lang="en-US" dirty="0">
-                <a:latin typeface="Courier New" panose="02070309020205020404" pitchFamily="49" charset="0"/>
-                <a:cs typeface="Courier New" panose="02070309020205020404" pitchFamily="49" charset="0"/>
-              </a:rPr>
-              <a:t> REAL NOT NULL CHECK (</a:t>
-            </a:r>
-            <a:r>
-              <a:rPr lang="en-US" dirty="0" err="1">
-                <a:latin typeface="Courier New" panose="02070309020205020404" pitchFamily="49" charset="0"/>
-                <a:cs typeface="Courier New" panose="02070309020205020404" pitchFamily="49" charset="0"/>
-              </a:rPr>
-              <a:t>Snow_cover</a:t>
-            </a:r>
-            <a:r>
-              <a:rPr lang="en-US" dirty="0">
-                <a:latin typeface="Courier New" panose="02070309020205020404" pitchFamily="49" charset="0"/>
-                <a:cs typeface="Courier New" panose="02070309020205020404" pitchFamily="49" charset="0"/>
-              </a:rPr>
-              <a:t> BETWEEN 0 and 100),</a:t>
-            </a:r>
-          </a:p>
-          <a:p>
-            <a:pPr marL="114300" indent="0">
-              <a:buNone/>
-            </a:pPr>
-            <a:r>
-              <a:rPr lang="en-US" dirty="0">
-                <a:latin typeface="Courier New" panose="02070309020205020404" pitchFamily="49" charset="0"/>
-                <a:cs typeface="Courier New" panose="02070309020205020404" pitchFamily="49" charset="0"/>
-              </a:rPr>
-              <a:t>    </a:t>
-            </a:r>
-            <a:r>
-              <a:rPr lang="en-US" dirty="0" err="1">
-                <a:latin typeface="Courier New" panose="02070309020205020404" pitchFamily="49" charset="0"/>
-                <a:cs typeface="Courier New" panose="02070309020205020404" pitchFamily="49" charset="0"/>
-              </a:rPr>
-              <a:t>Water_cover</a:t>
-            </a:r>
-            <a:r>
-              <a:rPr lang="en-US" dirty="0">
-                <a:latin typeface="Courier New" panose="02070309020205020404" pitchFamily="49" charset="0"/>
-                <a:cs typeface="Courier New" panose="02070309020205020404" pitchFamily="49" charset="0"/>
-              </a:rPr>
-              <a:t> REAL NOT NULL CHECK (</a:t>
-            </a:r>
-            <a:r>
-              <a:rPr lang="en-US" dirty="0" err="1">
-                <a:latin typeface="Courier New" panose="02070309020205020404" pitchFamily="49" charset="0"/>
-                <a:cs typeface="Courier New" panose="02070309020205020404" pitchFamily="49" charset="0"/>
-              </a:rPr>
-              <a:t>Water_cover</a:t>
-            </a:r>
-            <a:r>
-              <a:rPr lang="en-US" dirty="0">
-                <a:latin typeface="Courier New" panose="02070309020205020404" pitchFamily="49" charset="0"/>
-                <a:cs typeface="Courier New" panose="02070309020205020404" pitchFamily="49" charset="0"/>
-              </a:rPr>
-              <a:t> BETWEEN 0 and 100),</a:t>
-            </a:r>
-          </a:p>
-          <a:p>
-            <a:pPr marL="114300" indent="0">
-              <a:buNone/>
-            </a:pPr>
-            <a:r>
-              <a:rPr lang="en-US" dirty="0">
-                <a:latin typeface="Courier New" panose="02070309020205020404" pitchFamily="49" charset="0"/>
-                <a:cs typeface="Courier New" panose="02070309020205020404" pitchFamily="49" charset="0"/>
-              </a:rPr>
-              <a:t>    </a:t>
-            </a:r>
-            <a:r>
-              <a:rPr lang="en-US" dirty="0" err="1">
-                <a:latin typeface="Courier New" panose="02070309020205020404" pitchFamily="49" charset="0"/>
-                <a:cs typeface="Courier New" panose="02070309020205020404" pitchFamily="49" charset="0"/>
-              </a:rPr>
-              <a:t>Land_cover</a:t>
-            </a:r>
-            <a:r>
-              <a:rPr lang="en-US" dirty="0">
-                <a:latin typeface="Courier New" panose="02070309020205020404" pitchFamily="49" charset="0"/>
-                <a:cs typeface="Courier New" panose="02070309020205020404" pitchFamily="49" charset="0"/>
-              </a:rPr>
-              <a:t> REAL NOT NULL CHECK (</a:t>
-            </a:r>
-            <a:r>
-              <a:rPr lang="en-US" dirty="0" err="1">
-                <a:latin typeface="Courier New" panose="02070309020205020404" pitchFamily="49" charset="0"/>
-                <a:cs typeface="Courier New" panose="02070309020205020404" pitchFamily="49" charset="0"/>
-              </a:rPr>
-              <a:t>Land_cover</a:t>
-            </a:r>
-            <a:r>
-              <a:rPr lang="en-US" dirty="0">
-                <a:latin typeface="Courier New" panose="02070309020205020404" pitchFamily="49" charset="0"/>
-                <a:cs typeface="Courier New" panose="02070309020205020404" pitchFamily="49" charset="0"/>
-              </a:rPr>
-              <a:t> BETWEEN 0 and 100),</a:t>
-            </a:r>
-          </a:p>
-          <a:p>
-            <a:pPr marL="114300" indent="0">
-              <a:buNone/>
-            </a:pPr>
-            <a:r>
-              <a:rPr lang="en-US" dirty="0">
-                <a:latin typeface="Courier New" panose="02070309020205020404" pitchFamily="49" charset="0"/>
-                <a:cs typeface="Courier New" panose="02070309020205020404" pitchFamily="49" charset="0"/>
-              </a:rPr>
-              <a:t>    </a:t>
-            </a:r>
-            <a:r>
-              <a:rPr lang="en-US" dirty="0" err="1">
-                <a:latin typeface="Courier New" panose="02070309020205020404" pitchFamily="49" charset="0"/>
-                <a:cs typeface="Courier New" panose="02070309020205020404" pitchFamily="49" charset="0"/>
-              </a:rPr>
-              <a:t>Total_cover</a:t>
-            </a:r>
-            <a:r>
-              <a:rPr lang="en-US" dirty="0">
-                <a:latin typeface="Courier New" panose="02070309020205020404" pitchFamily="49" charset="0"/>
-                <a:cs typeface="Courier New" panose="02070309020205020404" pitchFamily="49" charset="0"/>
-              </a:rPr>
-              <a:t> REAL NOT NULL CHECK (</a:t>
-            </a:r>
-            <a:r>
-              <a:rPr lang="en-US" dirty="0" err="1">
-                <a:latin typeface="Courier New" panose="02070309020205020404" pitchFamily="49" charset="0"/>
-                <a:cs typeface="Courier New" panose="02070309020205020404" pitchFamily="49" charset="0"/>
-              </a:rPr>
-              <a:t>Total_cover</a:t>
-            </a:r>
-            <a:r>
-              <a:rPr lang="en-US" dirty="0">
-                <a:latin typeface="Courier New" panose="02070309020205020404" pitchFamily="49" charset="0"/>
-                <a:cs typeface="Courier New" panose="02070309020205020404" pitchFamily="49" charset="0"/>
-              </a:rPr>
-              <a:t> = 100),</a:t>
-            </a:r>
-          </a:p>
-          <a:p>
-            <a:pPr marL="114300" indent="0">
-              <a:buNone/>
-            </a:pPr>
-            <a:r>
-              <a:rPr lang="en-US" dirty="0">
-                <a:latin typeface="Courier New" panose="02070309020205020404" pitchFamily="49" charset="0"/>
-                <a:cs typeface="Courier New" panose="02070309020205020404" pitchFamily="49" charset="0"/>
-              </a:rPr>
-              <a:t>    Observer TEXT NOT NULL,</a:t>
-            </a:r>
-          </a:p>
-          <a:p>
-            <a:pPr marL="114300" indent="0">
-              <a:buNone/>
-            </a:pPr>
-            <a:r>
-              <a:rPr lang="en-US" dirty="0">
-                <a:latin typeface="Courier New" panose="02070309020205020404" pitchFamily="49" charset="0"/>
-                <a:cs typeface="Courier New" panose="02070309020205020404" pitchFamily="49" charset="0"/>
-              </a:rPr>
-              <a:t>    Notes TEXT,</a:t>
-            </a:r>
-          </a:p>
-          <a:p>
-            <a:pPr marL="114300" indent="0">
-              <a:buNone/>
-            </a:pPr>
-            <a:r>
-              <a:rPr lang="en-US" dirty="0">
-                <a:latin typeface="Courier New" panose="02070309020205020404" pitchFamily="49" charset="0"/>
-                <a:cs typeface="Courier New" panose="02070309020205020404" pitchFamily="49" charset="0"/>
-              </a:rPr>
-              <a:t>    FOREIGN KEY (Site) REFERENCES Site (Code),</a:t>
-            </a:r>
-          </a:p>
-          <a:p>
-            <a:pPr marL="114300" indent="0">
-              <a:buNone/>
-            </a:pPr>
-            <a:r>
-              <a:rPr lang="en-US" dirty="0">
-                <a:latin typeface="Courier New" panose="02070309020205020404" pitchFamily="49" charset="0"/>
-                <a:cs typeface="Courier New" panose="02070309020205020404" pitchFamily="49" charset="0"/>
-              </a:rPr>
-              <a:t>    FOREIGN KEY (Observer) REFERENCES Personnel (Abbreviation),</a:t>
-            </a:r>
-          </a:p>
-          <a:p>
-            <a:pPr marL="114300" indent="0">
-              <a:buNone/>
-            </a:pPr>
-            <a:r>
-              <a:rPr lang="en-US" dirty="0">
-                <a:latin typeface="Courier New" panose="02070309020205020404" pitchFamily="49" charset="0"/>
-                <a:cs typeface="Courier New" panose="02070309020205020404" pitchFamily="49" charset="0"/>
-              </a:rPr>
-              <a:t>    CHECK (Date BETWEEN Year||'-01-01' AND Year||'-12-31'),</a:t>
-            </a:r>
-          </a:p>
-          <a:p>
-            <a:pPr marL="114300" indent="0">
-              <a:buNone/>
-            </a:pPr>
-            <a:r>
-              <a:rPr lang="en-US" dirty="0">
-                <a:latin typeface="Courier New" panose="02070309020205020404" pitchFamily="49" charset="0"/>
-                <a:cs typeface="Courier New" panose="02070309020205020404" pitchFamily="49" charset="0"/>
-              </a:rPr>
-              <a:t>    CHECK (</a:t>
-            </a:r>
-            <a:r>
-              <a:rPr lang="en-US" dirty="0" err="1">
-                <a:latin typeface="Courier New" panose="02070309020205020404" pitchFamily="49" charset="0"/>
-                <a:cs typeface="Courier New" panose="02070309020205020404" pitchFamily="49" charset="0"/>
-              </a:rPr>
-              <a:t>Total_cover</a:t>
-            </a:r>
-            <a:r>
-              <a:rPr lang="en-US" dirty="0">
-                <a:latin typeface="Courier New" panose="02070309020205020404" pitchFamily="49" charset="0"/>
-                <a:cs typeface="Courier New" panose="02070309020205020404" pitchFamily="49" charset="0"/>
-              </a:rPr>
-              <a:t> = </a:t>
-            </a:r>
-            <a:r>
-              <a:rPr lang="en-US" dirty="0" err="1">
-                <a:latin typeface="Courier New" panose="02070309020205020404" pitchFamily="49" charset="0"/>
-                <a:cs typeface="Courier New" panose="02070309020205020404" pitchFamily="49" charset="0"/>
-              </a:rPr>
-              <a:t>Snow_cover</a:t>
-            </a:r>
-            <a:r>
-              <a:rPr lang="en-US" dirty="0">
-                <a:latin typeface="Courier New" panose="02070309020205020404" pitchFamily="49" charset="0"/>
-                <a:cs typeface="Courier New" panose="02070309020205020404" pitchFamily="49" charset="0"/>
-              </a:rPr>
-              <a:t> + </a:t>
-            </a:r>
-            <a:r>
-              <a:rPr lang="en-US" dirty="0" err="1">
-                <a:latin typeface="Courier New" panose="02070309020205020404" pitchFamily="49" charset="0"/>
-                <a:cs typeface="Courier New" panose="02070309020205020404" pitchFamily="49" charset="0"/>
-              </a:rPr>
-              <a:t>Water_cover</a:t>
-            </a:r>
-            <a:r>
-              <a:rPr lang="en-US" dirty="0">
-                <a:latin typeface="Courier New" panose="02070309020205020404" pitchFamily="49" charset="0"/>
-                <a:cs typeface="Courier New" panose="02070309020205020404" pitchFamily="49" charset="0"/>
-              </a:rPr>
-              <a:t> + </a:t>
-            </a:r>
-            <a:r>
-              <a:rPr lang="en-US" dirty="0" err="1">
-                <a:latin typeface="Courier New" panose="02070309020205020404" pitchFamily="49" charset="0"/>
-                <a:cs typeface="Courier New" panose="02070309020205020404" pitchFamily="49" charset="0"/>
-              </a:rPr>
-              <a:t>Land_cover</a:t>
-            </a:r>
-            <a:r>
-              <a:rPr lang="en-US" dirty="0">
-                <a:latin typeface="Courier New" panose="02070309020205020404" pitchFamily="49" charset="0"/>
-                <a:cs typeface="Courier New" panose="02070309020205020404" pitchFamily="49" charset="0"/>
-              </a:rPr>
-              <a:t>)</a:t>
-            </a:r>
-          </a:p>
-          <a:p>
-            <a:pPr marL="114300" indent="0">
-              <a:buNone/>
-            </a:pPr>
-            <a:r>
-              <a:rPr lang="en-US" dirty="0">
-                <a:latin typeface="Courier New" panose="02070309020205020404" pitchFamily="49" charset="0"/>
-                <a:cs typeface="Courier New" panose="02070309020205020404" pitchFamily="49" charset="0"/>
-              </a:rPr>
-              <a:t>);</a:t>
-            </a:r>
-          </a:p>
-          <a:p>
-            <a:pPr marL="114300" indent="0">
-              <a:buNone/>
-            </a:pPr>
-            <a:endParaRPr lang="en-US" dirty="0">
-              <a:latin typeface="Courier New" panose="02070309020205020404" pitchFamily="49" charset="0"/>
-              <a:cs typeface="Courier New" panose="02070309020205020404" pitchFamily="49" charset="0"/>
-            </a:endParaRPr>
-          </a:p>
-          <a:p>
-            <a:pPr marL="114300" indent="0">
-              <a:buNone/>
-            </a:pPr>
-            <a:r>
-              <a:rPr lang="en-US" dirty="0">
-                <a:solidFill>
-                  <a:schemeClr val="accent5"/>
-                </a:solidFill>
-                <a:latin typeface="Courier New" panose="02070309020205020404" pitchFamily="49" charset="0"/>
-                <a:cs typeface="Courier New" panose="02070309020205020404" pitchFamily="49" charset="0"/>
-              </a:rPr>
-              <a:t>-- Possible primary key: (Site, Date, Plot, Location)?</a:t>
-            </a:r>
-          </a:p>
-        </p:txBody>
-      </p:sp>
-      <p:sp>
-        <p:nvSpPr>
-          <p:cNvPr id="4" name="Slide Number Placeholder 3">
-            <a:extLst>
-              <a:ext uri="{FF2B5EF4-FFF2-40B4-BE49-F238E27FC236}">
-                <a16:creationId xmlns:a16="http://schemas.microsoft.com/office/drawing/2014/main" id="{C2B1FAF7-CFE2-55A4-8648-E2EAF503150F}"/>
-              </a:ext>
-            </a:extLst>
-          </p:cNvPr>
-          <p:cNvSpPr>
-            <a:spLocks noGrp="1"/>
-          </p:cNvSpPr>
-          <p:nvPr>
-            <p:ph type="sldNum" idx="12"/>
-          </p:nvPr>
-        </p:nvSpPr>
-        <p:spPr/>
-        <p:txBody>
-          <a:bodyPr/>
-          <a:lstStyle/>
-          <a:p>
-            <a:pPr marL="0" lvl="0" indent="0" algn="r" rtl="0">
-              <a:spcBef>
-                <a:spcPts val="0"/>
-              </a:spcBef>
-              <a:spcAft>
-                <a:spcPts val="0"/>
-              </a:spcAft>
-              <a:buNone/>
-            </a:pPr>
-            <a:fld id="{00000000-1234-1234-1234-123412341234}" type="slidenum">
-              <a:rPr lang="en" smtClean="0"/>
-              <a:t>6</a:t>
-            </a:fld>
-            <a:endParaRPr lang="en" dirty="0"/>
-          </a:p>
-        </p:txBody>
-      </p:sp>
-    </p:spTree>
-    <p:extLst>
-      <p:ext uri="{BB962C8B-B14F-4D97-AF65-F5344CB8AC3E}">
-        <p14:creationId xmlns:p14="http://schemas.microsoft.com/office/powerpoint/2010/main" val="51989154"/>
-      </p:ext>
-    </p:extLst>
-  </p:cSld>
-  <p:clrMapOvr>
-    <a:masterClrMapping/>
-  </p:clrMapOvr>
-</p:sld>
-</file>
-
-<file path=ppt/slides/slide7.xml><?xml version="1.0" encoding="utf-8"?>
-<p:sld xmlns:a="http://schemas.openxmlformats.org/drawingml/2006/main" xmlns:r="http://schemas.openxmlformats.org/officeDocument/2006/relationships" xmlns:p="http://schemas.openxmlformats.org/presentationml/2006/main">
-  <p:cSld>
-    <p:spTree>
-      <p:nvGrpSpPr>
-        <p:cNvPr id="1" name=""/>
-        <p:cNvGrpSpPr/>
-        <p:nvPr/>
-      </p:nvGrpSpPr>
-      <p:grpSpPr>
-        <a:xfrm>
-          <a:off x="0" y="0"/>
-          <a:ext cx="0" cy="0"/>
-          <a:chOff x="0" y="0"/>
-          <a:chExt cx="0" cy="0"/>
-        </a:xfrm>
-      </p:grpSpPr>
-      <p:sp>
-        <p:nvSpPr>
-          <p:cNvPr id="2" name="Title 1">
-            <a:extLst>
-              <a:ext uri="{FF2B5EF4-FFF2-40B4-BE49-F238E27FC236}">
-                <a16:creationId xmlns:a16="http://schemas.microsoft.com/office/drawing/2014/main" id="{ED63C9A3-C4AA-D903-BDEF-73B719C8E8B4}"/>
-              </a:ext>
-            </a:extLst>
-          </p:cNvPr>
-          <p:cNvSpPr>
-            <a:spLocks noGrp="1"/>
-          </p:cNvSpPr>
-          <p:nvPr>
-            <p:ph type="title"/>
-          </p:nvPr>
-        </p:nvSpPr>
-        <p:spPr/>
-        <p:txBody>
-          <a:bodyPr/>
-          <a:lstStyle/>
-          <a:p>
-            <a:r>
-              <a:rPr lang="en-US" dirty="0"/>
-              <a:t>Compare to CSV</a:t>
-            </a:r>
-          </a:p>
-        </p:txBody>
-      </p:sp>
-      <p:sp>
-        <p:nvSpPr>
-          <p:cNvPr id="3" name="Text Placeholder 2">
-            <a:extLst>
-              <a:ext uri="{FF2B5EF4-FFF2-40B4-BE49-F238E27FC236}">
-                <a16:creationId xmlns:a16="http://schemas.microsoft.com/office/drawing/2014/main" id="{7264EFC0-A7FA-5BD1-AB8A-C8F6D0BB5724}"/>
-              </a:ext>
-            </a:extLst>
-          </p:cNvPr>
-          <p:cNvSpPr>
-            <a:spLocks noGrp="1"/>
-          </p:cNvSpPr>
-          <p:nvPr>
-            <p:ph type="body" idx="1"/>
-          </p:nvPr>
-        </p:nvSpPr>
-        <p:spPr/>
-        <p:txBody>
-          <a:bodyPr/>
-          <a:lstStyle/>
-          <a:p>
-            <a:r>
-              <a:rPr lang="en-US" dirty="0"/>
-              <a:t>Site,Year,Date,Plot,Location,Snow_cover,Water_cover,Land_cover,Total_cover,Observer,Notes</a:t>
-            </a:r>
-          </a:p>
-        </p:txBody>
-      </p:sp>
-      <p:sp>
-        <p:nvSpPr>
-          <p:cNvPr id="4" name="Slide Number Placeholder 3">
-            <a:extLst>
-              <a:ext uri="{FF2B5EF4-FFF2-40B4-BE49-F238E27FC236}">
-                <a16:creationId xmlns:a16="http://schemas.microsoft.com/office/drawing/2014/main" id="{C64F3EA3-0128-5A16-5AA8-77D2123D7F96}"/>
-              </a:ext>
-            </a:extLst>
-          </p:cNvPr>
-          <p:cNvSpPr>
-            <a:spLocks noGrp="1"/>
-          </p:cNvSpPr>
-          <p:nvPr>
-            <p:ph type="sldNum" idx="12"/>
-          </p:nvPr>
-        </p:nvSpPr>
-        <p:spPr/>
-        <p:txBody>
-          <a:bodyPr/>
-          <a:lstStyle/>
-          <a:p>
-            <a:pPr marL="0" lvl="0" indent="0" algn="r" rtl="0">
-              <a:spcBef>
-                <a:spcPts val="0"/>
-              </a:spcBef>
-              <a:spcAft>
-                <a:spcPts val="0"/>
-              </a:spcAft>
-              <a:buNone/>
-            </a:pPr>
-            <a:fld id="{00000000-1234-1234-1234-123412341234}" type="slidenum">
-              <a:rPr lang="en" smtClean="0"/>
-              <a:t>7</a:t>
-            </a:fld>
-            <a:endParaRPr lang="en" dirty="0"/>
-          </a:p>
-        </p:txBody>
-      </p:sp>
-    </p:spTree>
-    <p:extLst>
-      <p:ext uri="{BB962C8B-B14F-4D97-AF65-F5344CB8AC3E}">
-        <p14:creationId xmlns:p14="http://schemas.microsoft.com/office/powerpoint/2010/main" val="285936850"/>
-      </p:ext>
-    </p:extLst>
-  </p:cSld>
-  <p:clrMapOvr>
-    <a:masterClrMapping/>
-  </p:clrMapOvr>
-</p:sld>
-</file>
-
-<file path=ppt/slides/slide8.xml><?xml version="1.0" encoding="utf-8"?>
 <p:sld xmlns:a="http://schemas.openxmlformats.org/drawingml/2006/main" xmlns:r="http://schemas.openxmlformats.org/officeDocument/2006/relationships" xmlns:p="http://schemas.openxmlformats.org/presentationml/2006/main">
   <p:cSld>
     <p:spTree>
@@ -18194,7 +17503,7 @@
             </a:pPr>
             <a:fld id="{00000000-1234-1234-1234-123412341234}" type="slidenum">
               <a:rPr lang="en" smtClean="0"/>
-              <a:t>8</a:t>
+              <a:t>6</a:t>
             </a:fld>
             <a:endParaRPr lang="en" dirty="0"/>
           </a:p>
@@ -18213,7 +17522,7 @@
 </p:sld>
 </file>
 
-<file path=ppt/slides/slide9.xml><?xml version="1.0" encoding="utf-8"?>
+<file path=ppt/slides/slide7.xml><?xml version="1.0" encoding="utf-8"?>
 <p:sld xmlns:a="http://schemas.openxmlformats.org/drawingml/2006/main" xmlns:r="http://schemas.openxmlformats.org/officeDocument/2006/relationships" xmlns:p="http://schemas.openxmlformats.org/presentationml/2006/main">
   <p:cSld>
     <p:spTree>
@@ -18337,7 +17646,7 @@
             </a:pPr>
             <a:fld id="{00000000-1234-1234-1234-123412341234}" type="slidenum">
               <a:rPr lang="en" smtClean="0"/>
-              <a:t>9</a:t>
+              <a:t>7</a:t>
             </a:fld>
             <a:endParaRPr lang="en" dirty="0"/>
           </a:p>
@@ -19065,6 +18374,583 @@
     <p:extLst>
       <p:ext uri="{BB962C8B-B14F-4D97-AF65-F5344CB8AC3E}">
         <p14:creationId xmlns:p14="http://schemas.microsoft.com/office/powerpoint/2010/main" val="273315678"/>
+      </p:ext>
+    </p:extLst>
+  </p:cSld>
+  <p:clrMapOvr>
+    <a:masterClrMapping/>
+  </p:clrMapOvr>
+</p:sld>
+</file>
+
+<file path=ppt/slides/slide8.xml><?xml version="1.0" encoding="utf-8"?>
+<p:sld xmlns:a="http://schemas.openxmlformats.org/drawingml/2006/main" xmlns:r="http://schemas.openxmlformats.org/officeDocument/2006/relationships" xmlns:p="http://schemas.openxmlformats.org/presentationml/2006/main">
+  <p:cSld>
+    <p:spTree>
+      <p:nvGrpSpPr>
+        <p:cNvPr id="1" name=""/>
+        <p:cNvGrpSpPr/>
+        <p:nvPr/>
+      </p:nvGrpSpPr>
+      <p:grpSpPr>
+        <a:xfrm>
+          <a:off x="0" y="0"/>
+          <a:ext cx="0" cy="0"/>
+          <a:chOff x="0" y="0"/>
+          <a:chExt cx="0" cy="0"/>
+        </a:xfrm>
+      </p:grpSpPr>
+      <p:sp>
+        <p:nvSpPr>
+          <p:cNvPr id="2" name="Title 1">
+            <a:extLst>
+              <a:ext uri="{FF2B5EF4-FFF2-40B4-BE49-F238E27FC236}">
+                <a16:creationId xmlns:a16="http://schemas.microsoft.com/office/drawing/2014/main" id="{3983CC3A-88D2-560B-B5EE-EC61D5A52242}"/>
+              </a:ext>
+            </a:extLst>
+          </p:cNvPr>
+          <p:cNvSpPr>
+            <a:spLocks noGrp="1"/>
+          </p:cNvSpPr>
+          <p:nvPr>
+            <p:ph type="title"/>
+          </p:nvPr>
+        </p:nvSpPr>
+        <p:spPr/>
+        <p:txBody>
+          <a:bodyPr>
+            <a:noAutofit/>
+          </a:bodyPr>
+          <a:lstStyle/>
+          <a:p>
+            <a:r>
+              <a:rPr lang="en-US" sz="3200" dirty="0">
+                <a:solidFill>
+                  <a:srgbClr val="004B83"/>
+                </a:solidFill>
+              </a:rPr>
+              <a:t>Local vs client/server databases</a:t>
+            </a:r>
+          </a:p>
+        </p:txBody>
+      </p:sp>
+      <p:sp>
+        <p:nvSpPr>
+          <p:cNvPr id="3" name="Text Placeholder 2">
+            <a:extLst>
+              <a:ext uri="{FF2B5EF4-FFF2-40B4-BE49-F238E27FC236}">
+                <a16:creationId xmlns:a16="http://schemas.microsoft.com/office/drawing/2014/main" id="{F193F1C7-E077-68D2-7E2A-8BAB71A382D9}"/>
+              </a:ext>
+            </a:extLst>
+          </p:cNvPr>
+          <p:cNvSpPr>
+            <a:spLocks noGrp="1"/>
+          </p:cNvSpPr>
+          <p:nvPr>
+            <p:ph type="body" idx="1"/>
+          </p:nvPr>
+        </p:nvSpPr>
+        <p:spPr>
+          <a:xfrm>
+            <a:off x="311700" y="1160224"/>
+            <a:ext cx="3999900" cy="3416400"/>
+          </a:xfrm>
+        </p:spPr>
+        <p:txBody>
+          <a:bodyPr>
+            <a:normAutofit/>
+          </a:bodyPr>
+          <a:lstStyle/>
+          <a:p>
+            <a:pPr marL="139700" indent="0">
+              <a:buNone/>
+            </a:pPr>
+            <a:r>
+              <a:rPr lang="en-US" b="1" u="sng" dirty="0">
+                <a:latin typeface="Avenir Book" panose="02000503020000020003" pitchFamily="2" charset="0"/>
+              </a:rPr>
+              <a:t>Local (</a:t>
+            </a:r>
+            <a:r>
+              <a:rPr lang="en-US" b="1" u="sng" dirty="0" err="1">
+                <a:latin typeface="Avenir Book" panose="02000503020000020003" pitchFamily="2" charset="0"/>
+              </a:rPr>
+              <a:t>DuckDB</a:t>
+            </a:r>
+            <a:r>
+              <a:rPr lang="en-US" b="1" u="sng" dirty="0">
+                <a:latin typeface="Avenir Book" panose="02000503020000020003" pitchFamily="2" charset="0"/>
+              </a:rPr>
+              <a:t>, SQLite)</a:t>
+            </a:r>
+            <a:br>
+              <a:rPr lang="en-US" b="1" u="sng" dirty="0">
+                <a:latin typeface="Avenir Book" panose="02000503020000020003" pitchFamily="2" charset="0"/>
+              </a:rPr>
+            </a:br>
+            <a:endParaRPr lang="en-US" b="1" u="sng" dirty="0">
+              <a:latin typeface="Avenir Book" panose="02000503020000020003" pitchFamily="2" charset="0"/>
+            </a:endParaRPr>
+          </a:p>
+          <a:p>
+            <a:r>
+              <a:rPr lang="en-US" dirty="0">
+                <a:latin typeface="Avenir Book" panose="02000503020000020003" pitchFamily="2" charset="0"/>
+              </a:rPr>
+              <a:t>Storage</a:t>
+            </a:r>
+          </a:p>
+          <a:p>
+            <a:pPr lvl="1"/>
+            <a:r>
+              <a:rPr lang="en-US" dirty="0">
+                <a:latin typeface="Avenir Book" panose="02000503020000020003" pitchFamily="2" charset="0"/>
+              </a:rPr>
+              <a:t>(Single) local file</a:t>
+            </a:r>
+          </a:p>
+          <a:p>
+            <a:r>
+              <a:rPr lang="en-US" dirty="0">
+                <a:latin typeface="Avenir Book" panose="02000503020000020003" pitchFamily="2" charset="0"/>
+              </a:rPr>
+              <a:t>Access</a:t>
+            </a:r>
+          </a:p>
+          <a:p>
+            <a:pPr lvl="1"/>
+            <a:r>
+              <a:rPr lang="en-US" dirty="0">
+                <a:latin typeface="Avenir Book" panose="02000503020000020003" pitchFamily="2" charset="0"/>
+              </a:rPr>
+              <a:t>Command line tool or library open that file</a:t>
+            </a:r>
+          </a:p>
+          <a:p>
+            <a:pPr lvl="1"/>
+            <a:r>
+              <a:rPr lang="en-US" dirty="0">
+                <a:latin typeface="Avenir Book" panose="02000503020000020003" pitchFamily="2" charset="0"/>
+              </a:rPr>
+              <a:t>No authentication, etc.</a:t>
+            </a:r>
+          </a:p>
+          <a:p>
+            <a:r>
+              <a:rPr lang="en-US" dirty="0">
+                <a:latin typeface="Avenir Book" panose="02000503020000020003" pitchFamily="2" charset="0"/>
+              </a:rPr>
+              <a:t>Support for SQL standard</a:t>
+            </a:r>
+          </a:p>
+          <a:p>
+            <a:pPr lvl="1"/>
+            <a:r>
+              <a:rPr lang="en-US" dirty="0">
+                <a:latin typeface="Avenir Book" panose="02000503020000020003" pitchFamily="2" charset="0"/>
+              </a:rPr>
+              <a:t>Essentials there, but many pieces missing</a:t>
+            </a:r>
+          </a:p>
+          <a:p>
+            <a:r>
+              <a:rPr lang="en-US" dirty="0">
+                <a:latin typeface="Avenir Book" panose="02000503020000020003" pitchFamily="2" charset="0"/>
+              </a:rPr>
+              <a:t>Installation; management</a:t>
+            </a:r>
+          </a:p>
+          <a:p>
+            <a:pPr lvl="1"/>
+            <a:r>
+              <a:rPr lang="en-US" dirty="0">
+                <a:latin typeface="Avenir Book" panose="02000503020000020003" pitchFamily="2" charset="0"/>
+              </a:rPr>
+              <a:t>Super easy; nil</a:t>
+            </a:r>
+          </a:p>
+          <a:p>
+            <a:r>
+              <a:rPr lang="en-US" dirty="0">
+                <a:latin typeface="Avenir Book" panose="02000503020000020003" pitchFamily="2" charset="0"/>
+              </a:rPr>
+              <a:t>Data portability</a:t>
+            </a:r>
+          </a:p>
+          <a:p>
+            <a:pPr lvl="1"/>
+            <a:r>
+              <a:rPr lang="en-US" dirty="0">
+                <a:latin typeface="Avenir Book" panose="02000503020000020003" pitchFamily="2" charset="0"/>
+              </a:rPr>
+              <a:t>Great</a:t>
+            </a:r>
+          </a:p>
+          <a:p>
+            <a:endParaRPr lang="en-US" dirty="0">
+              <a:latin typeface="Avenir Book" panose="02000503020000020003" pitchFamily="2" charset="0"/>
+            </a:endParaRPr>
+          </a:p>
+        </p:txBody>
+      </p:sp>
+      <p:sp>
+        <p:nvSpPr>
+          <p:cNvPr id="5" name="Text Placeholder 4">
+            <a:extLst>
+              <a:ext uri="{FF2B5EF4-FFF2-40B4-BE49-F238E27FC236}">
+                <a16:creationId xmlns:a16="http://schemas.microsoft.com/office/drawing/2014/main" id="{2C0BF0BB-D4A5-F8CB-F94E-192EFE9AF1EC}"/>
+              </a:ext>
+            </a:extLst>
+          </p:cNvPr>
+          <p:cNvSpPr>
+            <a:spLocks noGrp="1"/>
+          </p:cNvSpPr>
+          <p:nvPr>
+            <p:ph type="body" idx="2"/>
+          </p:nvPr>
+        </p:nvSpPr>
+        <p:spPr/>
+        <p:txBody>
+          <a:bodyPr>
+            <a:normAutofit/>
+          </a:bodyPr>
+          <a:lstStyle/>
+          <a:p>
+            <a:pPr marL="139700" indent="0">
+              <a:buNone/>
+            </a:pPr>
+            <a:r>
+              <a:rPr lang="en-US" b="1" u="sng" dirty="0">
+                <a:latin typeface="Avenir Book" panose="02000503020000020003" pitchFamily="2" charset="0"/>
+              </a:rPr>
+              <a:t>Client/server RDBMS (Oracle, SQL Server, PostgreSQL, MySQL, …)</a:t>
+            </a:r>
+          </a:p>
+          <a:p>
+            <a:r>
+              <a:rPr lang="en-US" dirty="0">
+                <a:latin typeface="Avenir Book" panose="02000503020000020003" pitchFamily="2" charset="0"/>
+              </a:rPr>
+              <a:t>Storage</a:t>
+            </a:r>
+          </a:p>
+          <a:p>
+            <a:pPr lvl="1"/>
+            <a:r>
+              <a:rPr lang="en-US" dirty="0">
+                <a:latin typeface="Avenir Book" panose="02000503020000020003" pitchFamily="2" charset="0"/>
+              </a:rPr>
+              <a:t>A mystery</a:t>
+            </a:r>
+          </a:p>
+          <a:p>
+            <a:r>
+              <a:rPr lang="en-US" dirty="0">
+                <a:latin typeface="Avenir Book" panose="02000503020000020003" pitchFamily="2" charset="0"/>
+              </a:rPr>
+              <a:t>Access</a:t>
+            </a:r>
+          </a:p>
+          <a:p>
+            <a:pPr lvl="1"/>
+            <a:r>
+              <a:rPr lang="en-US" dirty="0">
+                <a:latin typeface="Avenir Book" panose="02000503020000020003" pitchFamily="2" charset="0"/>
+              </a:rPr>
+              <a:t>Command line tool or library talk over network (even on same machine)</a:t>
+            </a:r>
+          </a:p>
+          <a:p>
+            <a:pPr lvl="1"/>
+            <a:r>
+              <a:rPr lang="en-US" dirty="0">
+                <a:latin typeface="Avenir Book" panose="02000503020000020003" pitchFamily="2" charset="0"/>
+              </a:rPr>
+              <a:t>User accounts, authentication, permissions</a:t>
+            </a:r>
+          </a:p>
+          <a:p>
+            <a:r>
+              <a:rPr lang="en-US" dirty="0">
+                <a:latin typeface="Avenir Book" panose="02000503020000020003" pitchFamily="2" charset="0"/>
+              </a:rPr>
+              <a:t>Support for SQL standard</a:t>
+            </a:r>
+          </a:p>
+          <a:p>
+            <a:pPr lvl="1"/>
+            <a:r>
+              <a:rPr lang="en-US" dirty="0">
+                <a:latin typeface="Avenir Book" panose="02000503020000020003" pitchFamily="2" charset="0"/>
+              </a:rPr>
+              <a:t>Very good</a:t>
+            </a:r>
+          </a:p>
+          <a:p>
+            <a:r>
+              <a:rPr lang="en-US" dirty="0">
+                <a:latin typeface="Avenir Book" panose="02000503020000020003" pitchFamily="2" charset="0"/>
+              </a:rPr>
+              <a:t>Installation; management</a:t>
+            </a:r>
+          </a:p>
+          <a:p>
+            <a:pPr lvl="1"/>
+            <a:r>
+              <a:rPr lang="en-US" dirty="0">
+                <a:latin typeface="Avenir Book" panose="02000503020000020003" pitchFamily="2" charset="0"/>
+              </a:rPr>
+              <a:t>Easy; obscure</a:t>
+            </a:r>
+          </a:p>
+          <a:p>
+            <a:r>
+              <a:rPr lang="en-US" dirty="0">
+                <a:latin typeface="Avenir Book" panose="02000503020000020003" pitchFamily="2" charset="0"/>
+              </a:rPr>
+              <a:t>Data portability</a:t>
+            </a:r>
+          </a:p>
+          <a:p>
+            <a:pPr lvl="1"/>
+            <a:r>
+              <a:rPr lang="en-US" dirty="0">
+                <a:latin typeface="Avenir Book" panose="02000503020000020003" pitchFamily="2" charset="0"/>
+              </a:rPr>
+              <a:t>Weak to nil</a:t>
+            </a:r>
+          </a:p>
+        </p:txBody>
+      </p:sp>
+      <p:sp>
+        <p:nvSpPr>
+          <p:cNvPr id="4" name="Slide Number Placeholder 3">
+            <a:extLst>
+              <a:ext uri="{FF2B5EF4-FFF2-40B4-BE49-F238E27FC236}">
+                <a16:creationId xmlns:a16="http://schemas.microsoft.com/office/drawing/2014/main" id="{F75D26E5-4B9C-AE7C-4F67-C282F63E900E}"/>
+              </a:ext>
+            </a:extLst>
+          </p:cNvPr>
+          <p:cNvSpPr>
+            <a:spLocks noGrp="1"/>
+          </p:cNvSpPr>
+          <p:nvPr>
+            <p:ph type="sldNum" idx="12"/>
+          </p:nvPr>
+        </p:nvSpPr>
+        <p:spPr/>
+        <p:txBody>
+          <a:bodyPr/>
+          <a:lstStyle/>
+          <a:p>
+            <a:pPr marL="0" lvl="0" indent="0" algn="r" rtl="0">
+              <a:spcBef>
+                <a:spcPts val="0"/>
+              </a:spcBef>
+              <a:spcAft>
+                <a:spcPts val="0"/>
+              </a:spcAft>
+              <a:buNone/>
+            </a:pPr>
+            <a:fld id="{00000000-1234-1234-1234-123412341234}" type="slidenum">
+              <a:rPr lang="en" smtClean="0"/>
+              <a:t>8</a:t>
+            </a:fld>
+            <a:endParaRPr lang="en" dirty="0"/>
+          </a:p>
+        </p:txBody>
+      </p:sp>
+    </p:spTree>
+    <p:extLst>
+      <p:ext uri="{BB962C8B-B14F-4D97-AF65-F5344CB8AC3E}">
+        <p14:creationId xmlns:p14="http://schemas.microsoft.com/office/powerpoint/2010/main" val="425826323"/>
+      </p:ext>
+    </p:extLst>
+  </p:cSld>
+  <p:clrMapOvr>
+    <a:masterClrMapping/>
+  </p:clrMapOvr>
+</p:sld>
+</file>
+
+<file path=ppt/slides/slide9.xml><?xml version="1.0" encoding="utf-8"?>
+<p:sld xmlns:a="http://schemas.openxmlformats.org/drawingml/2006/main" xmlns:r="http://schemas.openxmlformats.org/officeDocument/2006/relationships" xmlns:p="http://schemas.openxmlformats.org/presentationml/2006/main">
+  <p:cSld>
+    <p:spTree>
+      <p:nvGrpSpPr>
+        <p:cNvPr id="1" name=""/>
+        <p:cNvGrpSpPr/>
+        <p:nvPr/>
+      </p:nvGrpSpPr>
+      <p:grpSpPr>
+        <a:xfrm>
+          <a:off x="0" y="0"/>
+          <a:ext cx="0" cy="0"/>
+          <a:chOff x="0" y="0"/>
+          <a:chExt cx="0" cy="0"/>
+        </a:xfrm>
+      </p:grpSpPr>
+      <p:sp>
+        <p:nvSpPr>
+          <p:cNvPr id="2" name="Title 1">
+            <a:extLst>
+              <a:ext uri="{FF2B5EF4-FFF2-40B4-BE49-F238E27FC236}">
+                <a16:creationId xmlns:a16="http://schemas.microsoft.com/office/drawing/2014/main" id="{8AC5CCEB-A687-D6ED-B4AF-5079878958D3}"/>
+              </a:ext>
+            </a:extLst>
+          </p:cNvPr>
+          <p:cNvSpPr>
+            <a:spLocks noGrp="1"/>
+          </p:cNvSpPr>
+          <p:nvPr>
+            <p:ph type="title"/>
+          </p:nvPr>
+        </p:nvSpPr>
+        <p:spPr/>
+        <p:txBody>
+          <a:bodyPr/>
+          <a:lstStyle/>
+          <a:p>
+            <a:r>
+              <a:rPr lang="en-US" dirty="0"/>
+              <a:t>Our running</a:t>
+            </a:r>
+            <a:br>
+              <a:rPr lang="en-US" dirty="0"/>
+            </a:br>
+            <a:r>
+              <a:rPr lang="en-US" dirty="0"/>
+              <a:t>example</a:t>
+            </a:r>
+          </a:p>
+        </p:txBody>
+      </p:sp>
+      <p:sp>
+        <p:nvSpPr>
+          <p:cNvPr id="3" name="Text Placeholder 2">
+            <a:extLst>
+              <a:ext uri="{FF2B5EF4-FFF2-40B4-BE49-F238E27FC236}">
+                <a16:creationId xmlns:a16="http://schemas.microsoft.com/office/drawing/2014/main" id="{8D4858E6-4CF3-6CBA-F078-C3696711D9E1}"/>
+              </a:ext>
+            </a:extLst>
+          </p:cNvPr>
+          <p:cNvSpPr>
+            <a:spLocks noGrp="1"/>
+          </p:cNvSpPr>
+          <p:nvPr>
+            <p:ph type="body" idx="1"/>
+          </p:nvPr>
+        </p:nvSpPr>
+        <p:spPr/>
+        <p:txBody>
+          <a:bodyPr/>
+          <a:lstStyle/>
+          <a:p>
+            <a:endParaRPr lang="en-US" dirty="0"/>
+          </a:p>
+          <a:p>
+            <a:endParaRPr lang="en-US" dirty="0"/>
+          </a:p>
+          <a:p>
+            <a:r>
+              <a:rPr lang="en-US" dirty="0"/>
+              <a:t>Crow’s foot: many side</a:t>
+            </a:r>
+            <a:br>
+              <a:rPr lang="en-US" dirty="0"/>
+            </a:br>
+            <a:r>
+              <a:rPr lang="en-US" dirty="0"/>
+              <a:t>of many-to-one</a:t>
+            </a:r>
+            <a:br>
+              <a:rPr lang="en-US" dirty="0"/>
+            </a:br>
+            <a:r>
+              <a:rPr lang="en-US" dirty="0"/>
+              <a:t>relationship</a:t>
+            </a:r>
+          </a:p>
+          <a:p>
+            <a:r>
+              <a:rPr lang="en-US" dirty="0"/>
+              <a:t>Primary keys in bold</a:t>
+            </a:r>
+          </a:p>
+        </p:txBody>
+      </p:sp>
+      <p:sp>
+        <p:nvSpPr>
+          <p:cNvPr id="4" name="Slide Number Placeholder 3">
+            <a:extLst>
+              <a:ext uri="{FF2B5EF4-FFF2-40B4-BE49-F238E27FC236}">
+                <a16:creationId xmlns:a16="http://schemas.microsoft.com/office/drawing/2014/main" id="{FE817B71-1919-0615-A618-ECA54F9954BE}"/>
+              </a:ext>
+            </a:extLst>
+          </p:cNvPr>
+          <p:cNvSpPr>
+            <a:spLocks noGrp="1"/>
+          </p:cNvSpPr>
+          <p:nvPr>
+            <p:ph type="sldNum" idx="12"/>
+          </p:nvPr>
+        </p:nvSpPr>
+        <p:spPr/>
+        <p:txBody>
+          <a:bodyPr/>
+          <a:lstStyle/>
+          <a:p>
+            <a:pPr marL="0" lvl="0" indent="0" algn="r" rtl="0">
+              <a:spcBef>
+                <a:spcPts val="0"/>
+              </a:spcBef>
+              <a:spcAft>
+                <a:spcPts val="0"/>
+              </a:spcAft>
+              <a:buNone/>
+            </a:pPr>
+            <a:fld id="{00000000-1234-1234-1234-123412341234}" type="slidenum">
+              <a:rPr lang="en" smtClean="0"/>
+              <a:t>9</a:t>
+            </a:fld>
+            <a:endParaRPr lang="en" dirty="0"/>
+          </a:p>
+        </p:txBody>
+      </p:sp>
+      <p:pic>
+        <p:nvPicPr>
+          <p:cNvPr id="6" name="Picture 5">
+            <a:extLst>
+              <a:ext uri="{FF2B5EF4-FFF2-40B4-BE49-F238E27FC236}">
+                <a16:creationId xmlns:a16="http://schemas.microsoft.com/office/drawing/2014/main" id="{22F1DBE0-0A13-753A-6AE0-935AF8A47957}"/>
+              </a:ext>
+            </a:extLst>
+          </p:cNvPr>
+          <p:cNvPicPr>
+            <a:picLocks noChangeAspect="1"/>
+          </p:cNvPicPr>
+          <p:nvPr/>
+        </p:nvPicPr>
+        <p:blipFill>
+          <a:blip r:embed="rId2"/>
+          <a:stretch>
+            <a:fillRect/>
+          </a:stretch>
+        </p:blipFill>
+        <p:spPr>
+          <a:xfrm>
+            <a:off x="3582876" y="4"/>
+            <a:ext cx="5062409" cy="5143500"/>
+          </a:xfrm>
+          <a:prstGeom prst="rect">
+            <a:avLst/>
+          </a:prstGeom>
+        </p:spPr>
+      </p:pic>
+    </p:spTree>
+    <p:extLst>
+      <p:ext uri="{BB962C8B-B14F-4D97-AF65-F5344CB8AC3E}">
+        <p14:creationId xmlns:p14="http://schemas.microsoft.com/office/powerpoint/2010/main" val="2204738551"/>
       </p:ext>
     </p:extLst>
   </p:cSld>

</xml_diff>